<commit_message>
Added updated presentation slide
</commit_message>
<xml_diff>
--- a/presentation/mega_sharks_trading_evaluator.pptx
+++ b/presentation/mega_sharks_trading_evaluator.pptx
@@ -5,20 +5,21 @@
     <p:sldMasterId id="2147483828" r:id="rId4"/>
   </p:sldMasterIdLst>
   <p:notesMasterIdLst>
-    <p:notesMasterId r:id="rId13"/>
+    <p:notesMasterId r:id="rId14"/>
   </p:notesMasterIdLst>
   <p:handoutMasterIdLst>
-    <p:handoutMasterId r:id="rId14"/>
+    <p:handoutMasterId r:id="rId15"/>
   </p:handoutMasterIdLst>
   <p:sldIdLst>
     <p:sldId id="256" r:id="rId5"/>
-    <p:sldId id="257" r:id="rId6"/>
-    <p:sldId id="261" r:id="rId7"/>
-    <p:sldId id="259" r:id="rId8"/>
-    <p:sldId id="264" r:id="rId9"/>
-    <p:sldId id="265" r:id="rId10"/>
-    <p:sldId id="262" r:id="rId11"/>
-    <p:sldId id="260" r:id="rId12"/>
+    <p:sldId id="266" r:id="rId6"/>
+    <p:sldId id="257" r:id="rId7"/>
+    <p:sldId id="261" r:id="rId8"/>
+    <p:sldId id="259" r:id="rId9"/>
+    <p:sldId id="264" r:id="rId10"/>
+    <p:sldId id="265" r:id="rId11"/>
+    <p:sldId id="262" r:id="rId12"/>
+    <p:sldId id="260" r:id="rId13"/>
   </p:sldIdLst>
   <p:sldSz cx="12192000" cy="6858000"/>
   <p:notesSz cx="6858000" cy="9144000"/>
@@ -126,6 +127,14 @@
     </p:ext>
   </p:extLst>
 </p:presentation>
+</file>
+
+<file path=ppt/revisionInfo.xml><?xml version="1.0" encoding="utf-8"?>
+<p1510:revInfo xmlns:a="http://schemas.openxmlformats.org/drawingml/2006/main" xmlns:r="http://schemas.openxmlformats.org/officeDocument/2006/relationships" xmlns:p1510="http://schemas.microsoft.com/office/powerpoint/2015/10/main">
+  <p1510:revLst>
+    <p1510:client id="{E14E42F7-53AE-4D53-881E-6126CD0D7AFF}" v="539" dt="2022-01-12T02:25:23.358"/>
+  </p1510:revLst>
+</p1510:revInfo>
 </file>
 
 <file path=ppt/diagrams/colors1.xml><?xml version="1.0" encoding="utf-8"?>
@@ -4281,13 +4290,6 @@
         </dgm:presLayoutVars>
       </dgm:prSet>
       <dgm:spPr/>
-      <dgm:t>
-        <a:bodyPr/>
-        <a:lstStyle/>
-        <a:p>
-          <a:endParaRPr lang="en-US"/>
-        </a:p>
-      </dgm:t>
     </dgm:pt>
     <dgm:pt modelId="{7D1F47A2-8F6C-4C7F-B3B3-2100C986DE32}" type="pres">
       <dgm:prSet presAssocID="{B633A646-2062-4841-AF18-847B074C6716}" presName="compNode" presStyleCnt="0"/>
@@ -4316,7 +4318,7 @@
                 <a14:useLocalDpi xmlns:a14="http://schemas.microsoft.com/office/drawing/2010/main"/>
               </a:ext>
               <a:ext uri="{96DAC541-7B7A-43D3-8B79-37D633B846F1}">
-                <asvg:svgBlip xmlns:asvg="http://schemas.microsoft.com/office/drawing/2016/SVG/main" xmlns="" r:embed="rId2"/>
+                <asvg:svgBlip xmlns:asvg="http://schemas.microsoft.com/office/drawing/2016/SVG/main" r:embed="rId2"/>
               </a:ext>
             </a:extLst>
           </a:blip>
@@ -4346,13 +4348,6 @@
         </dgm:presLayoutVars>
       </dgm:prSet>
       <dgm:spPr/>
-      <dgm:t>
-        <a:bodyPr/>
-        <a:lstStyle/>
-        <a:p>
-          <a:endParaRPr lang="en-US"/>
-        </a:p>
-      </dgm:t>
     </dgm:pt>
     <dgm:pt modelId="{51DD96AA-8DD7-4B07-A561-5C9B41ACFA3C}" type="pres">
       <dgm:prSet presAssocID="{1397C75F-5FD8-4120-9A24-A246D042942B}" presName="sibTrans" presStyleCnt="0"/>
@@ -4393,7 +4388,7 @@
                 <a14:useLocalDpi xmlns:a14="http://schemas.microsoft.com/office/drawing/2010/main" val="0"/>
               </a:ext>
               <a:ext uri="{96DAC541-7B7A-43D3-8B79-37D633B846F1}">
-                <asvg:svgBlip xmlns:asvg="http://schemas.microsoft.com/office/drawing/2016/SVG/main" xmlns="" r:embed="rId4"/>
+                <asvg:svgBlip xmlns:asvg="http://schemas.microsoft.com/office/drawing/2016/SVG/main" r:embed="rId4"/>
               </a:ext>
             </a:extLst>
           </a:blip>
@@ -4423,13 +4418,6 @@
         </dgm:presLayoutVars>
       </dgm:prSet>
       <dgm:spPr/>
-      <dgm:t>
-        <a:bodyPr/>
-        <a:lstStyle/>
-        <a:p>
-          <a:endParaRPr lang="en-US"/>
-        </a:p>
-      </dgm:t>
     </dgm:pt>
     <dgm:pt modelId="{1375F890-B8F8-4966-ABCD-B672FD4512B7}" type="pres">
       <dgm:prSet presAssocID="{7519C821-85FB-4CA3-BEB5-E4BFBC529B83}" presName="sibTrans" presStyleCnt="0"/>
@@ -4470,7 +4458,7 @@
                 <a14:useLocalDpi xmlns:a14="http://schemas.microsoft.com/office/drawing/2010/main"/>
               </a:ext>
               <a:ext uri="{96DAC541-7B7A-43D3-8B79-37D633B846F1}">
-                <asvg:svgBlip xmlns:asvg="http://schemas.microsoft.com/office/drawing/2016/SVG/main" xmlns="" r:embed="rId6"/>
+                <asvg:svgBlip xmlns:asvg="http://schemas.microsoft.com/office/drawing/2016/SVG/main" r:embed="rId6"/>
               </a:ext>
             </a:extLst>
           </a:blip>
@@ -4500,23 +4488,16 @@
         </dgm:presLayoutVars>
       </dgm:prSet>
       <dgm:spPr/>
-      <dgm:t>
-        <a:bodyPr/>
-        <a:lstStyle/>
-        <a:p>
-          <a:endParaRPr lang="en-US"/>
-        </a:p>
-      </dgm:t>
     </dgm:pt>
   </dgm:ptLst>
   <dgm:cxnLst>
-    <dgm:cxn modelId="{0F0438E4-D0CA-47DC-8484-BFD8CF753812}" type="presOf" srcId="{C6D21269-399B-4BA2-8621-C7B9DA1E1B8F}" destId="{D5847293-6F0A-4807-B203-585610F4F535}" srcOrd="0" destOrd="0" presId="urn:microsoft.com/office/officeart/2018/2/layout/IconVerticalSolidList"/>
-    <dgm:cxn modelId="{EB9839C5-F324-41C4-8950-5284E09FB71E}" srcId="{E1B432F4-5FDB-4518-9272-2F3934AC6AA2}" destId="{14BC708E-A0A1-4102-88E4-E75128B4E51E}" srcOrd="1" destOrd="0" parTransId="{CF221EFF-354A-47A9-A498-1F0BBF01ECB8}" sibTransId="{7519C821-85FB-4CA3-BEB5-E4BFBC529B83}"/>
-    <dgm:cxn modelId="{E4AD895B-72A4-4A6B-A7F4-C77A53EC51BC}" srcId="{E1B432F4-5FDB-4518-9272-2F3934AC6AA2}" destId="{C6D21269-399B-4BA2-8621-C7B9DA1E1B8F}" srcOrd="2" destOrd="0" parTransId="{AA3929B3-1058-4240-AD5D-9518D4976567}" sibTransId="{C79B0F2C-DDB4-44EB-89F7-717146B88B10}"/>
-    <dgm:cxn modelId="{282E4C31-D2E4-4F2E-B7E4-7F072B61355B}" type="presOf" srcId="{E1B432F4-5FDB-4518-9272-2F3934AC6AA2}" destId="{D40A0249-41A7-44A6-A657-361E8C18FD42}" srcOrd="0" destOrd="0" presId="urn:microsoft.com/office/officeart/2018/2/layout/IconVerticalSolidList"/>
     <dgm:cxn modelId="{944ABB28-0B7D-40F0-8726-3385D62BD567}" type="presOf" srcId="{B633A646-2062-4841-AF18-847B074C6716}" destId="{C95AF6F0-F4DA-48FE-85EB-61ADFB42AA13}" srcOrd="0" destOrd="0" presId="urn:microsoft.com/office/officeart/2018/2/layout/IconVerticalSolidList"/>
     <dgm:cxn modelId="{56ADA02B-9055-4F39-B74D-2D556F11DDB6}" srcId="{E1B432F4-5FDB-4518-9272-2F3934AC6AA2}" destId="{B633A646-2062-4841-AF18-847B074C6716}" srcOrd="0" destOrd="0" parTransId="{DB4A5689-BD48-4D3D-8017-D1E3C49B0DDB}" sibTransId="{1397C75F-5FD8-4120-9A24-A246D042942B}"/>
+    <dgm:cxn modelId="{282E4C31-D2E4-4F2E-B7E4-7F072B61355B}" type="presOf" srcId="{E1B432F4-5FDB-4518-9272-2F3934AC6AA2}" destId="{D40A0249-41A7-44A6-A657-361E8C18FD42}" srcOrd="0" destOrd="0" presId="urn:microsoft.com/office/officeart/2018/2/layout/IconVerticalSolidList"/>
+    <dgm:cxn modelId="{E4AD895B-72A4-4A6B-A7F4-C77A53EC51BC}" srcId="{E1B432F4-5FDB-4518-9272-2F3934AC6AA2}" destId="{C6D21269-399B-4BA2-8621-C7B9DA1E1B8F}" srcOrd="2" destOrd="0" parTransId="{AA3929B3-1058-4240-AD5D-9518D4976567}" sibTransId="{C79B0F2C-DDB4-44EB-89F7-717146B88B10}"/>
+    <dgm:cxn modelId="{EB9839C5-F324-41C4-8950-5284E09FB71E}" srcId="{E1B432F4-5FDB-4518-9272-2F3934AC6AA2}" destId="{14BC708E-A0A1-4102-88E4-E75128B4E51E}" srcOrd="1" destOrd="0" parTransId="{CF221EFF-354A-47A9-A498-1F0BBF01ECB8}" sibTransId="{7519C821-85FB-4CA3-BEB5-E4BFBC529B83}"/>
     <dgm:cxn modelId="{4A4BD2E1-F579-4CB0-A349-6E4A603D3C1F}" type="presOf" srcId="{14BC708E-A0A1-4102-88E4-E75128B4E51E}" destId="{80F6AD63-74FB-40E4-9D40-4178AFD87F60}" srcOrd="0" destOrd="0" presId="urn:microsoft.com/office/officeart/2018/2/layout/IconVerticalSolidList"/>
+    <dgm:cxn modelId="{0F0438E4-D0CA-47DC-8484-BFD8CF753812}" type="presOf" srcId="{C6D21269-399B-4BA2-8621-C7B9DA1E1B8F}" destId="{D5847293-6F0A-4807-B203-585610F4F535}" srcOrd="0" destOrd="0" presId="urn:microsoft.com/office/officeart/2018/2/layout/IconVerticalSolidList"/>
     <dgm:cxn modelId="{07CEADA1-F123-4E4C-9E9E-EDC53C6A9D42}" type="presParOf" srcId="{D40A0249-41A7-44A6-A657-361E8C18FD42}" destId="{7D1F47A2-8F6C-4C7F-B3B3-2100C986DE32}" srcOrd="0" destOrd="0" presId="urn:microsoft.com/office/officeart/2018/2/layout/IconVerticalSolidList"/>
     <dgm:cxn modelId="{F2FB5DCA-E48C-4F18-9E21-40A8BA4E97C5}" type="presParOf" srcId="{7D1F47A2-8F6C-4C7F-B3B3-2100C986DE32}" destId="{EC4D957C-BFAC-446D-9573-48333BEC34E6}" srcOrd="0" destOrd="0" presId="urn:microsoft.com/office/officeart/2018/2/layout/IconVerticalSolidList"/>
     <dgm:cxn modelId="{A830D3AF-7E56-4163-A545-B5B0E5253A32}" type="presParOf" srcId="{7D1F47A2-8F6C-4C7F-B3B3-2100C986DE32}" destId="{BE6B2CCF-B717-4C6F-9115-44EF0ECE6018}" srcOrd="1" destOrd="0" presId="urn:microsoft.com/office/officeart/2018/2/layout/IconVerticalSolidList"/>
@@ -4560,10 +4541,9 @@
         <a:lstStyle/>
         <a:p>
           <a:r>
-            <a:rPr lang="en-US" dirty="0" smtClean="0"/>
+            <a:rPr lang="en-US" dirty="0"/>
             <a:t>Planning</a:t>
           </a:r>
-          <a:endParaRPr lang="en-US" dirty="0"/>
         </a:p>
       </dgm:t>
     </dgm:pt>
@@ -4597,10 +4577,9 @@
         <a:lstStyle/>
         <a:p>
           <a:r>
-            <a:rPr lang="en-US" dirty="0" smtClean="0"/>
+            <a:rPr lang="en-US" dirty="0"/>
             <a:t>User-driven data retrieval</a:t>
           </a:r>
-          <a:endParaRPr lang="en-US" dirty="0"/>
         </a:p>
       </dgm:t>
     </dgm:pt>
@@ -4634,10 +4613,9 @@
         <a:lstStyle/>
         <a:p>
           <a:r>
-            <a:rPr lang="en-US" dirty="0" smtClean="0"/>
+            <a:rPr lang="en-US" dirty="0"/>
             <a:t>Model-based results</a:t>
           </a:r>
-          <a:endParaRPr lang="en-US" dirty="0"/>
         </a:p>
       </dgm:t>
     </dgm:pt>
@@ -4675,13 +4653,6 @@
     <dgm:pt modelId="{7DCBF36C-E730-420A-A503-A8BBBDACEDC9}" type="pres">
       <dgm:prSet presAssocID="{C771D90E-85E6-474C-B2E2-FE63AABDA9DA}" presName="arrow" presStyleLbl="bgShp" presStyleIdx="0" presStyleCnt="1" custLinFactNeighborX="-1255" custLinFactNeighborY="-16725"/>
       <dgm:spPr/>
-      <dgm:t>
-        <a:bodyPr/>
-        <a:lstStyle/>
-        <a:p>
-          <a:endParaRPr lang="en-US"/>
-        </a:p>
-      </dgm:t>
     </dgm:pt>
     <dgm:pt modelId="{D4F59575-3EA5-4B06-8688-317AA0DA4FB1}" type="pres">
       <dgm:prSet presAssocID="{C771D90E-85E6-474C-B2E2-FE63AABDA9DA}" presName="linearProcess" presStyleCnt="0"/>
@@ -4718,23 +4689,16 @@
         </dgm:presLayoutVars>
       </dgm:prSet>
       <dgm:spPr/>
-      <dgm:t>
-        <a:bodyPr/>
-        <a:lstStyle/>
-        <a:p>
-          <a:endParaRPr lang="en-US"/>
-        </a:p>
-      </dgm:t>
     </dgm:pt>
   </dgm:ptLst>
   <dgm:cxnLst>
     <dgm:cxn modelId="{C8FC655F-5424-46A9-B110-272CBA980FC3}" type="presOf" srcId="{5AB3EE1C-DBB4-42C7-ABC8-24DE84BE5C38}" destId="{4F8CAB0C-349A-439F-BE9B-2D7A562FCA29}" srcOrd="0" destOrd="0" presId="urn:microsoft.com/office/officeart/2005/8/layout/hProcess9"/>
+    <dgm:cxn modelId="{88BC6443-3135-4BFC-906F-2855DA5A79FC}" type="presOf" srcId="{2908F278-E460-4371-80A3-E089666AF2CA}" destId="{20B4D02B-50E0-4A71-8004-E2CEFDAC1E3A}" srcOrd="0" destOrd="0" presId="urn:microsoft.com/office/officeart/2005/8/layout/hProcess9"/>
     <dgm:cxn modelId="{D64A4346-3D7C-452D-AD25-62BDF37F9EBD}" srcId="{C771D90E-85E6-474C-B2E2-FE63AABDA9DA}" destId="{5AB3EE1C-DBB4-42C7-ABC8-24DE84BE5C38}" srcOrd="2" destOrd="0" parTransId="{9A793B7E-2371-4810-B9E5-EFEF74AB4BC0}" sibTransId="{6B78FCCE-A27E-4CE5-AD50-985E8A8B5FFE}"/>
+    <dgm:cxn modelId="{BBFEA491-AD36-4E9D-9CB3-CAD8EBDE8491}" srcId="{C771D90E-85E6-474C-B2E2-FE63AABDA9DA}" destId="{99130C23-55C3-455C-9069-0646B9B7C0D8}" srcOrd="0" destOrd="0" parTransId="{F7AC381B-19E2-4A69-AC28-AB33CEE676CF}" sibTransId="{CECD594F-8550-47B0-AC84-440E9A767E74}"/>
+    <dgm:cxn modelId="{6B68EF9C-BC0F-40EB-A8A2-C443E876ECCC}" type="presOf" srcId="{99130C23-55C3-455C-9069-0646B9B7C0D8}" destId="{3E84C619-F613-4AD5-B038-BB67D0AAC7A2}" srcOrd="0" destOrd="0" presId="urn:microsoft.com/office/officeart/2005/8/layout/hProcess9"/>
+    <dgm:cxn modelId="{C3E14DC5-CE73-462B-AE22-942A687921DD}" srcId="{C771D90E-85E6-474C-B2E2-FE63AABDA9DA}" destId="{2908F278-E460-4371-80A3-E089666AF2CA}" srcOrd="1" destOrd="0" parTransId="{3C6CEDC9-F6C7-4BCF-8C38-D0B2B9F7CFAC}" sibTransId="{47EB7331-C517-4E27-B526-834D1C6E7CE7}"/>
     <dgm:cxn modelId="{CD7393EB-135B-46AB-8115-4F841493BA6C}" type="presOf" srcId="{C771D90E-85E6-474C-B2E2-FE63AABDA9DA}" destId="{38584EA1-4AC6-41D3-A92E-BE0179DFD2E8}" srcOrd="0" destOrd="0" presId="urn:microsoft.com/office/officeart/2005/8/layout/hProcess9"/>
-    <dgm:cxn modelId="{6B68EF9C-BC0F-40EB-A8A2-C443E876ECCC}" type="presOf" srcId="{99130C23-55C3-455C-9069-0646B9B7C0D8}" destId="{3E84C619-F613-4AD5-B038-BB67D0AAC7A2}" srcOrd="0" destOrd="0" presId="urn:microsoft.com/office/officeart/2005/8/layout/hProcess9"/>
-    <dgm:cxn modelId="{BBFEA491-AD36-4E9D-9CB3-CAD8EBDE8491}" srcId="{C771D90E-85E6-474C-B2E2-FE63AABDA9DA}" destId="{99130C23-55C3-455C-9069-0646B9B7C0D8}" srcOrd="0" destOrd="0" parTransId="{F7AC381B-19E2-4A69-AC28-AB33CEE676CF}" sibTransId="{CECD594F-8550-47B0-AC84-440E9A767E74}"/>
-    <dgm:cxn modelId="{88BC6443-3135-4BFC-906F-2855DA5A79FC}" type="presOf" srcId="{2908F278-E460-4371-80A3-E089666AF2CA}" destId="{20B4D02B-50E0-4A71-8004-E2CEFDAC1E3A}" srcOrd="0" destOrd="0" presId="urn:microsoft.com/office/officeart/2005/8/layout/hProcess9"/>
-    <dgm:cxn modelId="{C3E14DC5-CE73-462B-AE22-942A687921DD}" srcId="{C771D90E-85E6-474C-B2E2-FE63AABDA9DA}" destId="{2908F278-E460-4371-80A3-E089666AF2CA}" srcOrd="1" destOrd="0" parTransId="{3C6CEDC9-F6C7-4BCF-8C38-D0B2B9F7CFAC}" sibTransId="{47EB7331-C517-4E27-B526-834D1C6E7CE7}"/>
     <dgm:cxn modelId="{68FC2095-0F96-4593-B1EF-8EC0550AA71A}" type="presParOf" srcId="{38584EA1-4AC6-41D3-A92E-BE0179DFD2E8}" destId="{7DCBF36C-E730-420A-A503-A8BBBDACEDC9}" srcOrd="0" destOrd="0" presId="urn:microsoft.com/office/officeart/2005/8/layout/hProcess9"/>
     <dgm:cxn modelId="{96868DC4-BCDE-463C-A533-7966C211A3AF}" type="presParOf" srcId="{38584EA1-4AC6-41D3-A92E-BE0179DFD2E8}" destId="{D4F59575-3EA5-4B06-8688-317AA0DA4FB1}" srcOrd="1" destOrd="0" presId="urn:microsoft.com/office/officeart/2005/8/layout/hProcess9"/>
     <dgm:cxn modelId="{13FDC36F-8888-44DB-B472-038536D39BA1}" type="presParOf" srcId="{D4F59575-3EA5-4B06-8688-317AA0DA4FB1}" destId="{3E84C619-F613-4AD5-B038-BB67D0AAC7A2}" srcOrd="0" destOrd="0" presId="urn:microsoft.com/office/officeart/2005/8/layout/hProcess9"/>
@@ -4771,10 +4735,9 @@
         <a:lstStyle/>
         <a:p>
           <a:r>
-            <a:rPr lang="en-US" dirty="0" smtClean="0"/>
+            <a:rPr lang="en-US" dirty="0"/>
             <a:t>Sentiment Modeling</a:t>
           </a:r>
-          <a:endParaRPr lang="en-US" dirty="0"/>
         </a:p>
       </dgm:t>
     </dgm:pt>
@@ -4808,10 +4771,9 @@
         <a:lstStyle/>
         <a:p>
           <a:r>
-            <a:rPr lang="en-US" dirty="0" smtClean="0"/>
+            <a:rPr lang="en-US" dirty="0"/>
             <a:t>Sentiment Integration</a:t>
           </a:r>
-          <a:endParaRPr lang="en-US" dirty="0"/>
         </a:p>
       </dgm:t>
     </dgm:pt>
@@ -4845,10 +4807,9 @@
         <a:lstStyle/>
         <a:p>
           <a:r>
-            <a:rPr lang="en-US" dirty="0" smtClean="0"/>
+            <a:rPr lang="en-US" dirty="0"/>
             <a:t>Auto-selection of best model</a:t>
           </a:r>
-          <a:endParaRPr lang="en-US" dirty="0"/>
         </a:p>
       </dgm:t>
     </dgm:pt>
@@ -4893,13 +4854,6 @@
           </a:schemeClr>
         </a:solidFill>
       </dgm:spPr>
-      <dgm:t>
-        <a:bodyPr/>
-        <a:lstStyle/>
-        <a:p>
-          <a:endParaRPr lang="en-US"/>
-        </a:p>
-      </dgm:t>
     </dgm:pt>
     <dgm:pt modelId="{D4F59575-3EA5-4B06-8688-317AA0DA4FB1}" type="pres">
       <dgm:prSet presAssocID="{C771D90E-85E6-474C-B2E2-FE63AABDA9DA}" presName="linearProcess" presStyleCnt="0"/>
@@ -4912,13 +4866,6 @@
         </dgm:presLayoutVars>
       </dgm:prSet>
       <dgm:spPr/>
-      <dgm:t>
-        <a:bodyPr/>
-        <a:lstStyle/>
-        <a:p>
-          <a:endParaRPr lang="en-US"/>
-        </a:p>
-      </dgm:t>
     </dgm:pt>
     <dgm:pt modelId="{8BAB798F-F186-4C80-9E01-78ABCC56B6CC}" type="pres">
       <dgm:prSet presAssocID="{CECD594F-8550-47B0-AC84-440E9A767E74}" presName="sibTrans" presStyleCnt="0"/>
@@ -4931,13 +4878,6 @@
         </dgm:presLayoutVars>
       </dgm:prSet>
       <dgm:spPr/>
-      <dgm:t>
-        <a:bodyPr/>
-        <a:lstStyle/>
-        <a:p>
-          <a:endParaRPr lang="en-US"/>
-        </a:p>
-      </dgm:t>
     </dgm:pt>
     <dgm:pt modelId="{E829F1DE-2BB3-43BE-9F04-EADAEB2F366B}" type="pres">
       <dgm:prSet presAssocID="{47EB7331-C517-4E27-B526-834D1C6E7CE7}" presName="sibTrans" presStyleCnt="0"/>
@@ -4950,22 +4890,15 @@
         </dgm:presLayoutVars>
       </dgm:prSet>
       <dgm:spPr/>
-      <dgm:t>
-        <a:bodyPr/>
-        <a:lstStyle/>
-        <a:p>
-          <a:endParaRPr lang="en-US"/>
-        </a:p>
-      </dgm:t>
     </dgm:pt>
   </dgm:ptLst>
   <dgm:cxnLst>
     <dgm:cxn modelId="{326A412A-32C9-4D6F-A768-26B845FEA547}" type="presOf" srcId="{5AB3EE1C-DBB4-42C7-ABC8-24DE84BE5C38}" destId="{4F8CAB0C-349A-439F-BE9B-2D7A562FCA29}" srcOrd="0" destOrd="0" presId="urn:microsoft.com/office/officeart/2005/8/layout/hProcess9"/>
     <dgm:cxn modelId="{D64A4346-3D7C-452D-AD25-62BDF37F9EBD}" srcId="{C771D90E-85E6-474C-B2E2-FE63AABDA9DA}" destId="{5AB3EE1C-DBB4-42C7-ABC8-24DE84BE5C38}" srcOrd="2" destOrd="0" parTransId="{9A793B7E-2371-4810-B9E5-EFEF74AB4BC0}" sibTransId="{6B78FCCE-A27E-4CE5-AD50-985E8A8B5FFE}"/>
     <dgm:cxn modelId="{38038B7A-B077-4C36-B6F0-C71E6F376419}" type="presOf" srcId="{C771D90E-85E6-474C-B2E2-FE63AABDA9DA}" destId="{38584EA1-4AC6-41D3-A92E-BE0179DFD2E8}" srcOrd="0" destOrd="0" presId="urn:microsoft.com/office/officeart/2005/8/layout/hProcess9"/>
-    <dgm:cxn modelId="{A4A18EB1-CE20-495A-9E5A-A4845A124367}" type="presOf" srcId="{99130C23-55C3-455C-9069-0646B9B7C0D8}" destId="{3E84C619-F613-4AD5-B038-BB67D0AAC7A2}" srcOrd="0" destOrd="0" presId="urn:microsoft.com/office/officeart/2005/8/layout/hProcess9"/>
     <dgm:cxn modelId="{BBFEA491-AD36-4E9D-9CB3-CAD8EBDE8491}" srcId="{C771D90E-85E6-474C-B2E2-FE63AABDA9DA}" destId="{99130C23-55C3-455C-9069-0646B9B7C0D8}" srcOrd="0" destOrd="0" parTransId="{F7AC381B-19E2-4A69-AC28-AB33CEE676CF}" sibTransId="{CECD594F-8550-47B0-AC84-440E9A767E74}"/>
     <dgm:cxn modelId="{BBDA89A3-9444-4674-B588-DAD4AFAD08D2}" type="presOf" srcId="{2908F278-E460-4371-80A3-E089666AF2CA}" destId="{20B4D02B-50E0-4A71-8004-E2CEFDAC1E3A}" srcOrd="0" destOrd="0" presId="urn:microsoft.com/office/officeart/2005/8/layout/hProcess9"/>
+    <dgm:cxn modelId="{A4A18EB1-CE20-495A-9E5A-A4845A124367}" type="presOf" srcId="{99130C23-55C3-455C-9069-0646B9B7C0D8}" destId="{3E84C619-F613-4AD5-B038-BB67D0AAC7A2}" srcOrd="0" destOrd="0" presId="urn:microsoft.com/office/officeart/2005/8/layout/hProcess9"/>
     <dgm:cxn modelId="{C3E14DC5-CE73-462B-AE22-942A687921DD}" srcId="{C771D90E-85E6-474C-B2E2-FE63AABDA9DA}" destId="{2908F278-E460-4371-80A3-E089666AF2CA}" srcOrd="1" destOrd="0" parTransId="{3C6CEDC9-F6C7-4BCF-8C38-D0B2B9F7CFAC}" sibTransId="{47EB7331-C517-4E27-B526-834D1C6E7CE7}"/>
     <dgm:cxn modelId="{D0F4D27D-C28F-4135-A576-F610E47D376F}" type="presParOf" srcId="{38584EA1-4AC6-41D3-A92E-BE0179DFD2E8}" destId="{7DCBF36C-E730-420A-A503-A8BBBDACEDC9}" srcOrd="0" destOrd="0" presId="urn:microsoft.com/office/officeart/2005/8/layout/hProcess9"/>
     <dgm:cxn modelId="{EC352065-6351-456A-8DEE-680027798385}" type="presParOf" srcId="{38584EA1-4AC6-41D3-A92E-BE0179DFD2E8}" destId="{D4F59575-3EA5-4B06-8688-317AA0DA4FB1}" srcOrd="1" destOrd="0" presId="urn:microsoft.com/office/officeart/2005/8/layout/hProcess9"/>
@@ -5010,10 +4943,9 @@
         <a:lstStyle/>
         <a:p>
           <a:r>
-            <a:rPr lang="en-US" dirty="0" smtClean="0"/>
+            <a:rPr lang="en-US" dirty="0"/>
             <a:t>Sources</a:t>
           </a:r>
-          <a:endParaRPr lang="en-US" dirty="0"/>
         </a:p>
       </dgm:t>
     </dgm:pt>
@@ -5047,10 +4979,9 @@
         <a:lstStyle/>
         <a:p>
           <a:r>
-            <a:rPr lang="en-US" dirty="0" smtClean="0"/>
+            <a:rPr lang="en-US" sz="2100" dirty="0"/>
             <a:t>Yahoo! Finance API</a:t>
           </a:r>
-          <a:endParaRPr lang="en-US" dirty="0"/>
         </a:p>
       </dgm:t>
     </dgm:pt>
@@ -5077,17 +5008,24 @@
       </dgm:t>
     </dgm:pt>
     <dgm:pt modelId="{DAAA359D-9501-4F0D-8DEB-3253773E3957}">
-      <dgm:prSet phldrT="[Text]"/>
+      <dgm:prSet phldrT="[Text]" custT="1"/>
       <dgm:spPr/>
       <dgm:t>
         <a:bodyPr/>
         <a:lstStyle/>
         <a:p>
           <a:r>
-            <a:rPr lang="en-US" dirty="0" smtClean="0"/>
-            <a:t>CSVs for prototyping</a:t>
+            <a:rPr lang="en-US" sz="2100" dirty="0"/>
+            <a:t>CSVs for prototyping (</a:t>
           </a:r>
-          <a:endParaRPr lang="en-US" dirty="0"/>
+          <a:r>
+            <a:rPr lang="en-US" sz="1800" dirty="0" err="1"/>
+            <a:t>cnn.fg</a:t>
+          </a:r>
+          <a:r>
+            <a:rPr lang="en-US" sz="1800" dirty="0"/>
+            <a:t>, CBOE)</a:t>
+          </a:r>
         </a:p>
       </dgm:t>
     </dgm:pt>
@@ -5121,10 +5059,9 @@
         <a:lstStyle/>
         <a:p>
           <a:r>
-            <a:rPr lang="en-US" dirty="0" smtClean="0"/>
+            <a:rPr lang="en-US" dirty="0"/>
             <a:t>Prep</a:t>
           </a:r>
-          <a:endParaRPr lang="en-US" dirty="0"/>
         </a:p>
       </dgm:t>
     </dgm:pt>
@@ -5158,10 +5095,9 @@
         <a:lstStyle/>
         <a:p>
           <a:r>
-            <a:rPr lang="en-US" dirty="0" smtClean="0"/>
+            <a:rPr lang="en-US" dirty="0"/>
             <a:t>Date indexing</a:t>
           </a:r>
-          <a:endParaRPr lang="en-US" dirty="0"/>
         </a:p>
       </dgm:t>
     </dgm:pt>
@@ -5195,10 +5131,9 @@
         <a:lstStyle/>
         <a:p>
           <a:r>
-            <a:rPr lang="en-US" dirty="0" smtClean="0"/>
+            <a:rPr lang="en-US" dirty="0"/>
             <a:t>Results Delivery</a:t>
           </a:r>
-          <a:endParaRPr lang="en-US" dirty="0"/>
         </a:p>
       </dgm:t>
     </dgm:pt>
@@ -5232,10 +5167,9 @@
         <a:lstStyle/>
         <a:p>
           <a:r>
-            <a:rPr lang="en-US" dirty="0" smtClean="0"/>
+            <a:rPr lang="en-US" dirty="0"/>
             <a:t>Chart annotation</a:t>
           </a:r>
-          <a:endParaRPr lang="en-US" dirty="0"/>
         </a:p>
       </dgm:t>
     </dgm:pt>
@@ -5269,10 +5203,9 @@
         <a:lstStyle/>
         <a:p>
           <a:r>
-            <a:rPr lang="en-US" dirty="0" smtClean="0"/>
+            <a:rPr lang="en-US" dirty="0"/>
             <a:t>Number formatting</a:t>
           </a:r>
-          <a:endParaRPr lang="en-US" dirty="0"/>
         </a:p>
       </dgm:t>
     </dgm:pt>
@@ -5306,14 +5239,13 @@
         <a:lstStyle/>
         <a:p>
           <a:r>
-            <a:rPr lang="en-US" dirty="0" err="1" smtClean="0"/>
+            <a:rPr lang="en-US" dirty="0" err="1"/>
             <a:t>Streamlit</a:t>
           </a:r>
           <a:r>
-            <a:rPr lang="en-US" dirty="0" smtClean="0"/>
+            <a:rPr lang="en-US" dirty="0"/>
             <a:t> compatibility conversions</a:t>
           </a:r>
-          <a:endParaRPr lang="en-US" dirty="0"/>
         </a:p>
       </dgm:t>
     </dgm:pt>
@@ -5338,6 +5270,140 @@
           <a:endParaRPr lang="en-US"/>
         </a:p>
       </dgm:t>
+    </dgm:pt>
+    <dgm:pt modelId="{243E38D6-BD68-4C45-8024-7E8F66220D2F}">
+      <dgm:prSet phldrT="[Text]"/>
+      <dgm:spPr/>
+      <dgm:t>
+        <a:bodyPr/>
+        <a:lstStyle/>
+        <a:p>
+          <a:r>
+            <a:rPr lang="en-US" dirty="0"/>
+            <a:t>Concatenate CSV data sources</a:t>
+          </a:r>
+        </a:p>
+      </dgm:t>
+    </dgm:pt>
+    <dgm:pt modelId="{B7EBD62F-0752-46A0-8C7F-6DFA14C85E0B}" type="parTrans" cxnId="{2F4628FD-D35E-4620-8F97-3AAD8D9F7B46}">
+      <dgm:prSet/>
+      <dgm:spPr/>
+      <dgm:t>
+        <a:bodyPr/>
+        <a:lstStyle/>
+        <a:p>
+          <a:endParaRPr lang="en-US"/>
+        </a:p>
+      </dgm:t>
+    </dgm:pt>
+    <dgm:pt modelId="{B9470BDD-39C2-42C5-BB2B-E8AAE540B7AF}" type="sibTrans" cxnId="{2F4628FD-D35E-4620-8F97-3AAD8D9F7B46}">
+      <dgm:prSet/>
+      <dgm:spPr/>
+      <dgm:t>
+        <a:bodyPr/>
+        <a:lstStyle/>
+        <a:p>
+          <a:endParaRPr lang="en-US"/>
+        </a:p>
+      </dgm:t>
+    </dgm:pt>
+    <dgm:pt modelId="{B4E678C7-EEB6-4116-B6B6-412C6B0F5634}">
+      <dgm:prSet phldrT="[Text]"/>
+      <dgm:spPr/>
+      <dgm:t>
+        <a:bodyPr/>
+        <a:lstStyle/>
+        <a:p>
+          <a:r>
+            <a:rPr lang="en-US" dirty="0" err="1"/>
+            <a:t>Jupyter</a:t>
+          </a:r>
+          <a:r>
+            <a:rPr lang="en-US" dirty="0"/>
+            <a:t> Notebook for validation</a:t>
+          </a:r>
+        </a:p>
+      </dgm:t>
+    </dgm:pt>
+    <dgm:pt modelId="{95ADF24D-47E9-414A-A283-35683DACE912}" type="parTrans" cxnId="{B2DEAB26-6344-48EC-8440-F2FB82BEF9BD}">
+      <dgm:prSet/>
+      <dgm:spPr/>
+      <dgm:t>
+        <a:bodyPr/>
+        <a:lstStyle/>
+        <a:p>
+          <a:endParaRPr lang="en-US"/>
+        </a:p>
+      </dgm:t>
+    </dgm:pt>
+    <dgm:pt modelId="{D22CE8CC-85BC-4362-86F5-D05B34BC9D46}" type="sibTrans" cxnId="{B2DEAB26-6344-48EC-8440-F2FB82BEF9BD}">
+      <dgm:prSet/>
+      <dgm:spPr/>
+      <dgm:t>
+        <a:bodyPr/>
+        <a:lstStyle/>
+        <a:p>
+          <a:endParaRPr lang="en-US"/>
+        </a:p>
+      </dgm:t>
+    </dgm:pt>
+    <dgm:pt modelId="{7EE23DE4-9FB2-44A3-A135-65E3C8978804}">
+      <dgm:prSet phldrT="[Text]"/>
+      <dgm:spPr/>
+      <dgm:t>
+        <a:bodyPr/>
+        <a:lstStyle/>
+        <a:p>
+          <a:r>
+            <a:rPr lang="en-US" dirty="0"/>
+            <a:t>DataFrame creation</a:t>
+          </a:r>
+        </a:p>
+      </dgm:t>
+    </dgm:pt>
+    <dgm:pt modelId="{59AA1A61-2A2E-4212-AB22-50CB073A1986}" type="parTrans" cxnId="{74FD78AE-A3A9-477C-A5B3-B71B1AC042BD}">
+      <dgm:prSet/>
+      <dgm:spPr/>
+      <dgm:t>
+        <a:bodyPr/>
+        <a:lstStyle/>
+        <a:p>
+          <a:endParaRPr lang="en-US"/>
+        </a:p>
+      </dgm:t>
+    </dgm:pt>
+    <dgm:pt modelId="{9BF7A2C3-0271-4950-9BE4-E806EE8830C3}" type="sibTrans" cxnId="{74FD78AE-A3A9-477C-A5B3-B71B1AC042BD}">
+      <dgm:prSet/>
+      <dgm:spPr/>
+      <dgm:t>
+        <a:bodyPr/>
+        <a:lstStyle/>
+        <a:p>
+          <a:endParaRPr lang="en-US"/>
+        </a:p>
+      </dgm:t>
+    </dgm:pt>
+    <dgm:pt modelId="{74B7B62E-96F6-454C-8A67-2C047E104EE4}">
+      <dgm:prSet phldrT="[Text]"/>
+      <dgm:spPr/>
+      <dgm:t>
+        <a:bodyPr/>
+        <a:lstStyle/>
+        <a:p>
+          <a:r>
+            <a:rPr lang="en-US" dirty="0"/>
+            <a:t>Presentation ready DataFrame</a:t>
+          </a:r>
+        </a:p>
+      </dgm:t>
+    </dgm:pt>
+    <dgm:pt modelId="{344897A7-A278-4B4D-A601-1756D74B95FF}" type="parTrans" cxnId="{5EA22287-37E7-4257-A538-EEF84B3F7829}">
+      <dgm:prSet/>
+      <dgm:spPr/>
+    </dgm:pt>
+    <dgm:pt modelId="{78B6F1EB-AE83-498C-949B-45F777DE58DE}" type="sibTrans" cxnId="{5EA22287-37E7-4257-A538-EEF84B3F7829}">
+      <dgm:prSet/>
+      <dgm:spPr/>
     </dgm:pt>
     <dgm:pt modelId="{E9CE67FF-08A3-47FA-A404-9EF799F01098}" type="pres">
       <dgm:prSet presAssocID="{812956B4-3F78-4E10-99F5-5338A172153A}" presName="Name0" presStyleCnt="0">
@@ -5369,13 +5435,6 @@
         </dgm:presLayoutVars>
       </dgm:prSet>
       <dgm:spPr/>
-      <dgm:t>
-        <a:bodyPr/>
-        <a:lstStyle/>
-        <a:p>
-          <a:endParaRPr lang="en-US"/>
-        </a:p>
-      </dgm:t>
     </dgm:pt>
     <dgm:pt modelId="{C4CD1DB7-6507-4B3E-A521-573281CAC403}" type="pres">
       <dgm:prSet presAssocID="{0E4BD055-5145-4950-8DB9-A8B387800EFC}" presName="sp" presStyleCnt="0"/>
@@ -5401,13 +5460,6 @@
         </dgm:presLayoutVars>
       </dgm:prSet>
       <dgm:spPr/>
-      <dgm:t>
-        <a:bodyPr/>
-        <a:lstStyle/>
-        <a:p>
-          <a:endParaRPr lang="en-US"/>
-        </a:p>
-      </dgm:t>
     </dgm:pt>
     <dgm:pt modelId="{764A20B0-CBBE-44C1-B037-A2F404C2A940}" type="pres">
       <dgm:prSet presAssocID="{3CE20966-912E-415D-A8D9-2B786C2A6AD6}" presName="sp" presStyleCnt="0"/>
@@ -5425,13 +5477,6 @@
         </dgm:presLayoutVars>
       </dgm:prSet>
       <dgm:spPr/>
-      <dgm:t>
-        <a:bodyPr/>
-        <a:lstStyle/>
-        <a:p>
-          <a:endParaRPr lang="en-US"/>
-        </a:p>
-      </dgm:t>
     </dgm:pt>
     <dgm:pt modelId="{391F6830-9F41-4AD6-A4D1-F53354155151}" type="pres">
       <dgm:prSet presAssocID="{4528D8D3-2CE5-4668-AC47-9A6E5B0655D5}" presName="descendantText" presStyleLbl="alignAccFollowNode1" presStyleIdx="2" presStyleCnt="3">
@@ -5440,35 +5485,36 @@
         </dgm:presLayoutVars>
       </dgm:prSet>
       <dgm:spPr/>
-      <dgm:t>
-        <a:bodyPr/>
-        <a:lstStyle/>
-        <a:p>
-          <a:endParaRPr lang="en-US"/>
-        </a:p>
-      </dgm:t>
     </dgm:pt>
   </dgm:ptLst>
   <dgm:cxnLst>
+    <dgm:cxn modelId="{7241CD02-C776-42EF-BA59-CA0471EAD2C7}" type="presOf" srcId="{D8F6696C-DFDF-4E2A-B84F-C7BEDE475DA1}" destId="{C19F3D2B-90F6-4B59-AE4C-D6AE3AA1BCE2}" srcOrd="0" destOrd="0" presId="urn:microsoft.com/office/officeart/2005/8/layout/vList5"/>
+    <dgm:cxn modelId="{B8D6270D-F26F-43CA-BDB7-B3D6A411C136}" srcId="{4528D8D3-2CE5-4668-AC47-9A6E5B0655D5}" destId="{C0EE92D2-179A-40ED-AD52-02939E318A20}" srcOrd="0" destOrd="0" parTransId="{6E1D08D0-7596-48FE-8EA5-11A573162155}" sibTransId="{8AF998E1-9437-4597-BFB0-DD57ED3D14AF}"/>
+    <dgm:cxn modelId="{25064F1E-F978-4C70-9F8E-D50DEECD6FF7}" type="presOf" srcId="{FE5065ED-662D-4811-87D6-B0D3C479C07C}" destId="{391F6830-9F41-4AD6-A4D1-F53354155151}" srcOrd="0" destOrd="1" presId="urn:microsoft.com/office/officeart/2005/8/layout/vList5"/>
+    <dgm:cxn modelId="{E60B9C26-625A-48B2-B112-B6F405D47825}" srcId="{812956B4-3F78-4E10-99F5-5338A172153A}" destId="{471FA9C0-A153-4F94-9FBD-6C001600B398}" srcOrd="0" destOrd="0" parTransId="{9A67D294-31ED-4CE0-B4BB-75FC3A4DA3D5}" sibTransId="{0E4BD055-5145-4950-8DB9-A8B387800EFC}"/>
+    <dgm:cxn modelId="{B2DEAB26-6344-48EC-8440-F2FB82BEF9BD}" srcId="{D8F6696C-DFDF-4E2A-B84F-C7BEDE475DA1}" destId="{B4E678C7-EEB6-4116-B6B6-412C6B0F5634}" srcOrd="2" destOrd="0" parTransId="{95ADF24D-47E9-414A-A283-35683DACE912}" sibTransId="{D22CE8CC-85BC-4362-86F5-D05B34BC9D46}"/>
+    <dgm:cxn modelId="{5FD6D636-67CC-4E1B-867D-5404467D2927}" type="presOf" srcId="{C0EE92D2-179A-40ED-AD52-02939E318A20}" destId="{391F6830-9F41-4AD6-A4D1-F53354155151}" srcOrd="0" destOrd="0" presId="urn:microsoft.com/office/officeart/2005/8/layout/vList5"/>
     <dgm:cxn modelId="{FF04483F-B88A-4A27-A92D-5C294A9E85D3}" srcId="{812956B4-3F78-4E10-99F5-5338A172153A}" destId="{4528D8D3-2CE5-4668-AC47-9A6E5B0655D5}" srcOrd="2" destOrd="0" parTransId="{A63C1CDC-2311-4DB1-B02B-0DD900EA4A82}" sibTransId="{CF058F54-9B34-4D01-A063-8CC5ABE8CA69}"/>
+    <dgm:cxn modelId="{C5E74547-6B79-4F57-9EB3-A3D9268AC797}" srcId="{4528D8D3-2CE5-4668-AC47-9A6E5B0655D5}" destId="{FE5065ED-662D-4811-87D6-B0D3C479C07C}" srcOrd="1" destOrd="0" parTransId="{2C8B61D0-7483-4207-A933-063BD684A3B4}" sibTransId="{0150397E-5BC7-460E-9117-4BEE0665AD05}"/>
+    <dgm:cxn modelId="{A14EAD68-3293-4F2E-B4D8-8494C684B5A5}" type="presOf" srcId="{C165C16F-05A8-4E1F-9844-64136DCD4562}" destId="{F7D7D60D-A3C5-4EBC-949F-23A771DEF040}" srcOrd="0" destOrd="0" presId="urn:microsoft.com/office/officeart/2005/8/layout/vList5"/>
+    <dgm:cxn modelId="{18F38F4B-85EF-415E-A453-B63ABC1119C0}" type="presOf" srcId="{9A8A69A1-8175-45BD-9FB0-BF52197E46C4}" destId="{391F6830-9F41-4AD6-A4D1-F53354155151}" srcOrd="0" destOrd="2" presId="urn:microsoft.com/office/officeart/2005/8/layout/vList5"/>
+    <dgm:cxn modelId="{53C1CE6E-8A06-4BF2-BF69-10C60B01FD3F}" srcId="{D8F6696C-DFDF-4E2A-B84F-C7BEDE475DA1}" destId="{C165C16F-05A8-4E1F-9844-64136DCD4562}" srcOrd="0" destOrd="0" parTransId="{3B8B7541-2D76-4FE6-BD09-3332AA669FA4}" sibTransId="{9AFAB423-731E-4CC2-82CA-51AB510BC01C}"/>
     <dgm:cxn modelId="{4FC9A273-72EB-4456-B6D4-F760948F1C84}" srcId="{4528D8D3-2CE5-4668-AC47-9A6E5B0655D5}" destId="{9A8A69A1-8175-45BD-9FB0-BF52197E46C4}" srcOrd="2" destOrd="0" parTransId="{1924CF6C-B8DE-4234-AA02-AEF82270C5ED}" sibTransId="{E22E78D2-95E0-49E5-8DB2-97D0BFF170AF}"/>
-    <dgm:cxn modelId="{B8D6270D-F26F-43CA-BDB7-B3D6A411C136}" srcId="{4528D8D3-2CE5-4668-AC47-9A6E5B0655D5}" destId="{C0EE92D2-179A-40ED-AD52-02939E318A20}" srcOrd="0" destOrd="0" parTransId="{6E1D08D0-7596-48FE-8EA5-11A573162155}" sibTransId="{8AF998E1-9437-4597-BFB0-DD57ED3D14AF}"/>
+    <dgm:cxn modelId="{7378B879-51C7-40AD-B5D7-4F60357FC013}" type="presOf" srcId="{B4E678C7-EEB6-4116-B6B6-412C6B0F5634}" destId="{F7D7D60D-A3C5-4EBC-949F-23A771DEF040}" srcOrd="0" destOrd="2" presId="urn:microsoft.com/office/officeart/2005/8/layout/vList5"/>
+    <dgm:cxn modelId="{4C34D682-4D04-489A-8D81-4B3EC8F80669}" srcId="{471FA9C0-A153-4F94-9FBD-6C001600B398}" destId="{2C8D931F-0BB0-4E90-B548-BF8C42E3D3B0}" srcOrd="0" destOrd="0" parTransId="{4B8A6E23-6401-43C2-A1A7-8D8C4DDF6781}" sibTransId="{4E5871CB-81DC-46A7-AB67-434AC3ED4806}"/>
+    <dgm:cxn modelId="{5EA22287-37E7-4257-A538-EEF84B3F7829}" srcId="{4528D8D3-2CE5-4668-AC47-9A6E5B0655D5}" destId="{74B7B62E-96F6-454C-8A67-2C047E104EE4}" srcOrd="3" destOrd="0" parTransId="{344897A7-A278-4B4D-A601-1756D74B95FF}" sibTransId="{78B6F1EB-AE83-498C-949B-45F777DE58DE}"/>
+    <dgm:cxn modelId="{877E8C9E-7115-4B4D-B3EA-F7A4CA1125E3}" type="presOf" srcId="{471FA9C0-A153-4F94-9FBD-6C001600B398}" destId="{AC5DF425-B10F-41C2-9A21-566E2B120D68}" srcOrd="0" destOrd="0" presId="urn:microsoft.com/office/officeart/2005/8/layout/vList5"/>
+    <dgm:cxn modelId="{74FD78AE-A3A9-477C-A5B3-B71B1AC042BD}" srcId="{D8F6696C-DFDF-4E2A-B84F-C7BEDE475DA1}" destId="{7EE23DE4-9FB2-44A3-A135-65E3C8978804}" srcOrd="3" destOrd="0" parTransId="{59AA1A61-2A2E-4212-AB22-50CB073A1986}" sibTransId="{9BF7A2C3-0271-4950-9BE4-E806EE8830C3}"/>
     <dgm:cxn modelId="{5966AEBB-5BA6-4151-BB67-77B76AFB72BE}" type="presOf" srcId="{2C8D931F-0BB0-4E90-B548-BF8C42E3D3B0}" destId="{5717CE94-33AA-44D5-AFD0-9D50A22F5D24}" srcOrd="0" destOrd="0" presId="urn:microsoft.com/office/officeart/2005/8/layout/vList5"/>
-    <dgm:cxn modelId="{18F38F4B-85EF-415E-A453-B63ABC1119C0}" type="presOf" srcId="{9A8A69A1-8175-45BD-9FB0-BF52197E46C4}" destId="{391F6830-9F41-4AD6-A4D1-F53354155151}" srcOrd="0" destOrd="2" presId="urn:microsoft.com/office/officeart/2005/8/layout/vList5"/>
-    <dgm:cxn modelId="{C5E74547-6B79-4F57-9EB3-A3D9268AC797}" srcId="{4528D8D3-2CE5-4668-AC47-9A6E5B0655D5}" destId="{FE5065ED-662D-4811-87D6-B0D3C479C07C}" srcOrd="1" destOrd="0" parTransId="{2C8B61D0-7483-4207-A933-063BD684A3B4}" sibTransId="{0150397E-5BC7-460E-9117-4BEE0665AD05}"/>
+    <dgm:cxn modelId="{69164AC2-6462-4AA3-9460-00FAB4999E05}" srcId="{471FA9C0-A153-4F94-9FBD-6C001600B398}" destId="{DAAA359D-9501-4F0D-8DEB-3253773E3957}" srcOrd="1" destOrd="0" parTransId="{218C2A9D-EE65-462F-BF8B-AD04B783D217}" sibTransId="{903F3459-8D00-4DDA-8CE9-DFBCFE8AE613}"/>
     <dgm:cxn modelId="{FD477EC8-8122-4F83-B482-781BF9CE917F}" srcId="{812956B4-3F78-4E10-99F5-5338A172153A}" destId="{D8F6696C-DFDF-4E2A-B84F-C7BEDE475DA1}" srcOrd="1" destOrd="0" parTransId="{8032B5A6-3F61-4786-9A67-B128F189D0D1}" sibTransId="{3CE20966-912E-415D-A8D9-2B786C2A6AD6}"/>
-    <dgm:cxn modelId="{7241CD02-C776-42EF-BA59-CA0471EAD2C7}" type="presOf" srcId="{D8F6696C-DFDF-4E2A-B84F-C7BEDE475DA1}" destId="{C19F3D2B-90F6-4B59-AE4C-D6AE3AA1BCE2}" srcOrd="0" destOrd="0" presId="urn:microsoft.com/office/officeart/2005/8/layout/vList5"/>
+    <dgm:cxn modelId="{CF5BB5C8-24FB-47A5-9C92-380E29AD11B1}" type="presOf" srcId="{7EE23DE4-9FB2-44A3-A135-65E3C8978804}" destId="{F7D7D60D-A3C5-4EBC-949F-23A771DEF040}" srcOrd="0" destOrd="3" presId="urn:microsoft.com/office/officeart/2005/8/layout/vList5"/>
     <dgm:cxn modelId="{25BD57CB-0F20-43CC-9A5A-799ED2098F11}" type="presOf" srcId="{4528D8D3-2CE5-4668-AC47-9A6E5B0655D5}" destId="{4BEAAD7C-EA9D-4AB0-A183-A0A4D2C6100C}" srcOrd="0" destOrd="0" presId="urn:microsoft.com/office/officeart/2005/8/layout/vList5"/>
-    <dgm:cxn modelId="{53C1CE6E-8A06-4BF2-BF69-10C60B01FD3F}" srcId="{D8F6696C-DFDF-4E2A-B84F-C7BEDE475DA1}" destId="{C165C16F-05A8-4E1F-9844-64136DCD4562}" srcOrd="0" destOrd="0" parTransId="{3B8B7541-2D76-4FE6-BD09-3332AA669FA4}" sibTransId="{9AFAB423-731E-4CC2-82CA-51AB510BC01C}"/>
-    <dgm:cxn modelId="{5FD6D636-67CC-4E1B-867D-5404467D2927}" type="presOf" srcId="{C0EE92D2-179A-40ED-AD52-02939E318A20}" destId="{391F6830-9F41-4AD6-A4D1-F53354155151}" srcOrd="0" destOrd="0" presId="urn:microsoft.com/office/officeart/2005/8/layout/vList5"/>
-    <dgm:cxn modelId="{69164AC2-6462-4AA3-9460-00FAB4999E05}" srcId="{471FA9C0-A153-4F94-9FBD-6C001600B398}" destId="{DAAA359D-9501-4F0D-8DEB-3253773E3957}" srcOrd="1" destOrd="0" parTransId="{218C2A9D-EE65-462F-BF8B-AD04B783D217}" sibTransId="{903F3459-8D00-4DDA-8CE9-DFBCFE8AE613}"/>
-    <dgm:cxn modelId="{A14EAD68-3293-4F2E-B4D8-8494C684B5A5}" type="presOf" srcId="{C165C16F-05A8-4E1F-9844-64136DCD4562}" destId="{F7D7D60D-A3C5-4EBC-949F-23A771DEF040}" srcOrd="0" destOrd="0" presId="urn:microsoft.com/office/officeart/2005/8/layout/vList5"/>
-    <dgm:cxn modelId="{25064F1E-F978-4C70-9F8E-D50DEECD6FF7}" type="presOf" srcId="{FE5065ED-662D-4811-87D6-B0D3C479C07C}" destId="{391F6830-9F41-4AD6-A4D1-F53354155151}" srcOrd="0" destOrd="1" presId="urn:microsoft.com/office/officeart/2005/8/layout/vList5"/>
-    <dgm:cxn modelId="{877E8C9E-7115-4B4D-B3EA-F7A4CA1125E3}" type="presOf" srcId="{471FA9C0-A153-4F94-9FBD-6C001600B398}" destId="{AC5DF425-B10F-41C2-9A21-566E2B120D68}" srcOrd="0" destOrd="0" presId="urn:microsoft.com/office/officeart/2005/8/layout/vList5"/>
-    <dgm:cxn modelId="{4C34D682-4D04-489A-8D81-4B3EC8F80669}" srcId="{471FA9C0-A153-4F94-9FBD-6C001600B398}" destId="{2C8D931F-0BB0-4E90-B548-BF8C42E3D3B0}" srcOrd="0" destOrd="0" parTransId="{4B8A6E23-6401-43C2-A1A7-8D8C4DDF6781}" sibTransId="{4E5871CB-81DC-46A7-AB67-434AC3ED4806}"/>
-    <dgm:cxn modelId="{E60B9C26-625A-48B2-B112-B6F405D47825}" srcId="{812956B4-3F78-4E10-99F5-5338A172153A}" destId="{471FA9C0-A153-4F94-9FBD-6C001600B398}" srcOrd="0" destOrd="0" parTransId="{9A67D294-31ED-4CE0-B4BB-75FC3A4DA3D5}" sibTransId="{0E4BD055-5145-4950-8DB9-A8B387800EFC}"/>
+    <dgm:cxn modelId="{492420D7-52EA-43F6-B763-9598CE23F214}" type="presOf" srcId="{243E38D6-BD68-4C45-8024-7E8F66220D2F}" destId="{F7D7D60D-A3C5-4EBC-949F-23A771DEF040}" srcOrd="0" destOrd="1" presId="urn:microsoft.com/office/officeart/2005/8/layout/vList5"/>
     <dgm:cxn modelId="{D3AF2DD7-CE70-4D35-9F91-8FED8D1F5A0F}" type="presOf" srcId="{812956B4-3F78-4E10-99F5-5338A172153A}" destId="{E9CE67FF-08A3-47FA-A404-9EF799F01098}" srcOrd="0" destOrd="0" presId="urn:microsoft.com/office/officeart/2005/8/layout/vList5"/>
     <dgm:cxn modelId="{3D24EED8-516D-4588-8C63-688FB92EB4E7}" type="presOf" srcId="{DAAA359D-9501-4F0D-8DEB-3253773E3957}" destId="{5717CE94-33AA-44D5-AFD0-9D50A22F5D24}" srcOrd="0" destOrd="1" presId="urn:microsoft.com/office/officeart/2005/8/layout/vList5"/>
+    <dgm:cxn modelId="{AED1B7E7-7806-4D4C-84B4-9CD97BFD52B7}" type="presOf" srcId="{74B7B62E-96F6-454C-8A67-2C047E104EE4}" destId="{391F6830-9F41-4AD6-A4D1-F53354155151}" srcOrd="0" destOrd="3" presId="urn:microsoft.com/office/officeart/2005/8/layout/vList5"/>
+    <dgm:cxn modelId="{2F4628FD-D35E-4620-8F97-3AAD8D9F7B46}" srcId="{D8F6696C-DFDF-4E2A-B84F-C7BEDE475DA1}" destId="{243E38D6-BD68-4C45-8024-7E8F66220D2F}" srcOrd="1" destOrd="0" parTransId="{B7EBD62F-0752-46A0-8C7F-6DFA14C85E0B}" sibTransId="{B9470BDD-39C2-42C5-BB2B-E8AAE540B7AF}"/>
     <dgm:cxn modelId="{4D87B18B-2706-491B-A44F-36ACE9A44D67}" type="presParOf" srcId="{E9CE67FF-08A3-47FA-A404-9EF799F01098}" destId="{109C000A-0610-4585-9C46-266D79702813}" srcOrd="0" destOrd="0" presId="urn:microsoft.com/office/officeart/2005/8/layout/vList5"/>
     <dgm:cxn modelId="{B2F658B3-2179-4073-8A75-4223F597E622}" type="presParOf" srcId="{109C000A-0610-4585-9C46-266D79702813}" destId="{AC5DF425-B10F-41C2-9A21-566E2B120D68}" srcOrd="0" destOrd="0" presId="urn:microsoft.com/office/officeart/2005/8/layout/vList5"/>
     <dgm:cxn modelId="{FC32757F-EA68-4D34-ADDD-9F4D88F74BE4}" type="presParOf" srcId="{109C000A-0610-4585-9C46-266D79702813}" destId="{5717CE94-33AA-44D5-AFD0-9D50A22F5D24}" srcOrd="1" destOrd="0" presId="urn:microsoft.com/office/officeart/2005/8/layout/vList5"/>
@@ -5513,7 +5559,7 @@
         <a:lstStyle/>
         <a:p>
           <a:r>
-            <a:rPr lang="en-US" dirty="0" err="1" smtClean="0"/>
+            <a:rPr lang="en-US" dirty="0" err="1"/>
             <a:t>FBProphet</a:t>
           </a:r>
           <a:endParaRPr lang="en-US" dirty="0"/>
@@ -5550,10 +5596,9 @@
         <a:lstStyle/>
         <a:p>
           <a:r>
-            <a:rPr lang="en-US" dirty="0" smtClean="0"/>
-            <a:t>&lt;description&gt;</a:t>
+            <a:rPr lang="en-US" dirty="0"/>
+            <a:t>Price prediction</a:t>
           </a:r>
-          <a:endParaRPr lang="en-US" dirty="0"/>
         </a:p>
       </dgm:t>
     </dgm:pt>
@@ -5587,7 +5632,13 @@
         <a:lstStyle/>
         <a:p>
           <a:r>
-            <a:rPr lang="en-US" dirty="0" err="1" smtClean="0"/>
+            <a:rPr lang="en-US" dirty="0"/>
+            <a:t>BackTrader/</a:t>
+          </a:r>
+        </a:p>
+        <a:p>
+          <a:r>
+            <a:rPr lang="en-US" dirty="0" err="1"/>
             <a:t>Cerebro</a:t>
           </a:r>
           <a:endParaRPr lang="en-US" dirty="0"/>
@@ -5624,10 +5675,9 @@
         <a:lstStyle/>
         <a:p>
           <a:r>
-            <a:rPr lang="en-US" dirty="0" smtClean="0"/>
-            <a:t>&lt;description&gt;</a:t>
+            <a:rPr lang="en-US" dirty="0"/>
+            <a:t>ML trading strategies</a:t>
           </a:r>
-          <a:endParaRPr lang="en-US" dirty="0"/>
         </a:p>
       </dgm:t>
     </dgm:pt>
@@ -5661,10 +5711,9 @@
         <a:lstStyle/>
         <a:p>
           <a:r>
-            <a:rPr lang="en-US" dirty="0" smtClean="0"/>
+            <a:rPr lang="en-US" dirty="0"/>
             <a:t>Custom</a:t>
           </a:r>
-          <a:endParaRPr lang="en-US" dirty="0"/>
         </a:p>
       </dgm:t>
     </dgm:pt>
@@ -5698,10 +5747,9 @@
         <a:lstStyle/>
         <a:p>
           <a:r>
-            <a:rPr lang="en-US" dirty="0" smtClean="0"/>
-            <a:t>&lt;description&gt;</a:t>
+            <a:rPr lang="en-US" dirty="0"/>
+            <a:t>Generate trading signals</a:t>
           </a:r>
-          <a:endParaRPr lang="en-US" dirty="0"/>
         </a:p>
       </dgm:t>
     </dgm:pt>
@@ -5717,6 +5765,222 @@
       </dgm:t>
     </dgm:pt>
     <dgm:pt modelId="{8AF998E1-9437-4597-BFB0-DD57ED3D14AF}" type="sibTrans" cxnId="{B8D6270D-F26F-43CA-BDB7-B3D6A411C136}">
+      <dgm:prSet/>
+      <dgm:spPr/>
+      <dgm:t>
+        <a:bodyPr/>
+        <a:lstStyle/>
+        <a:p>
+          <a:endParaRPr lang="en-US"/>
+        </a:p>
+      </dgm:t>
+    </dgm:pt>
+    <dgm:pt modelId="{1603BFB6-DD8D-4281-A2E2-E23F748CA329}">
+      <dgm:prSet phldrT="[Text]"/>
+      <dgm:spPr/>
+      <dgm:t>
+        <a:bodyPr/>
+        <a:lstStyle/>
+        <a:p>
+          <a:r>
+            <a:rPr lang="en-US" dirty="0"/>
+            <a:t>Components trends</a:t>
+          </a:r>
+        </a:p>
+      </dgm:t>
+    </dgm:pt>
+    <dgm:pt modelId="{6F8B0729-99AB-4B34-9B25-A9EF3CBB73A1}" type="parTrans" cxnId="{EBCC8B73-B5A1-447C-8EC3-9D137EF13346}">
+      <dgm:prSet/>
+      <dgm:spPr/>
+      <dgm:t>
+        <a:bodyPr/>
+        <a:lstStyle/>
+        <a:p>
+          <a:endParaRPr lang="en-US"/>
+        </a:p>
+      </dgm:t>
+    </dgm:pt>
+    <dgm:pt modelId="{CBCDED9E-5C16-417F-BF0A-6BEE561C79FF}" type="sibTrans" cxnId="{EBCC8B73-B5A1-447C-8EC3-9D137EF13346}">
+      <dgm:prSet/>
+      <dgm:spPr/>
+      <dgm:t>
+        <a:bodyPr/>
+        <a:lstStyle/>
+        <a:p>
+          <a:endParaRPr lang="en-US"/>
+        </a:p>
+      </dgm:t>
+    </dgm:pt>
+    <dgm:pt modelId="{399EDBB7-BAC8-4319-8352-A95A2B1A7E1B}">
+      <dgm:prSet phldrT="[Text]"/>
+      <dgm:spPr/>
+      <dgm:t>
+        <a:bodyPr/>
+        <a:lstStyle/>
+        <a:p>
+          <a:r>
+            <a:rPr lang="en-US" dirty="0"/>
+            <a:t>Backtesting strategies</a:t>
+          </a:r>
+        </a:p>
+      </dgm:t>
+    </dgm:pt>
+    <dgm:pt modelId="{448BD3E6-5610-4CAE-B98C-DC982B8F5BAC}" type="parTrans" cxnId="{8CC4845D-4EA9-45B1-BA96-4C88407703C4}">
+      <dgm:prSet/>
+      <dgm:spPr/>
+      <dgm:t>
+        <a:bodyPr/>
+        <a:lstStyle/>
+        <a:p>
+          <a:endParaRPr lang="en-US"/>
+        </a:p>
+      </dgm:t>
+    </dgm:pt>
+    <dgm:pt modelId="{58FC7B61-3510-47A6-902C-54008C4CBC8A}" type="sibTrans" cxnId="{8CC4845D-4EA9-45B1-BA96-4C88407703C4}">
+      <dgm:prSet/>
+      <dgm:spPr/>
+      <dgm:t>
+        <a:bodyPr/>
+        <a:lstStyle/>
+        <a:p>
+          <a:endParaRPr lang="en-US"/>
+        </a:p>
+      </dgm:t>
+    </dgm:pt>
+    <dgm:pt modelId="{0BB40664-810B-48C9-A036-C87571EB4A5A}">
+      <dgm:prSet phldrT="[Text]"/>
+      <dgm:spPr/>
+      <dgm:t>
+        <a:bodyPr/>
+        <a:lstStyle/>
+        <a:p>
+          <a:r>
+            <a:rPr lang="en-US" dirty="0"/>
+            <a:t>Plotting strategy results</a:t>
+          </a:r>
+        </a:p>
+      </dgm:t>
+    </dgm:pt>
+    <dgm:pt modelId="{5D365541-B859-4B81-910F-C91AC2671BCB}" type="parTrans" cxnId="{FF6ADF45-22B0-43A3-B147-55A7585069B2}">
+      <dgm:prSet/>
+      <dgm:spPr/>
+      <dgm:t>
+        <a:bodyPr/>
+        <a:lstStyle/>
+        <a:p>
+          <a:endParaRPr lang="en-US"/>
+        </a:p>
+      </dgm:t>
+    </dgm:pt>
+    <dgm:pt modelId="{C3A603AF-4C38-44FD-A5AA-C23DC71EB215}" type="sibTrans" cxnId="{FF6ADF45-22B0-43A3-B147-55A7585069B2}">
+      <dgm:prSet/>
+      <dgm:spPr/>
+      <dgm:t>
+        <a:bodyPr/>
+        <a:lstStyle/>
+        <a:p>
+          <a:endParaRPr lang="en-US"/>
+        </a:p>
+      </dgm:t>
+    </dgm:pt>
+    <dgm:pt modelId="{F2F7E9DA-1283-4693-B1BE-5DB22CB6C5D8}">
+      <dgm:prSet phldrT="[Text]"/>
+      <dgm:spPr/>
+      <dgm:t>
+        <a:bodyPr/>
+        <a:lstStyle/>
+        <a:p>
+          <a:r>
+            <a:rPr lang="en-US" dirty="0"/>
+            <a:t>Identify Indicators</a:t>
+          </a:r>
+        </a:p>
+      </dgm:t>
+    </dgm:pt>
+    <dgm:pt modelId="{05BC4019-FF78-4CCF-B4A4-35D12DF5D7B2}" type="parTrans" cxnId="{18D32FF6-8822-4DA3-9148-9069DD188952}">
+      <dgm:prSet/>
+      <dgm:spPr/>
+      <dgm:t>
+        <a:bodyPr/>
+        <a:lstStyle/>
+        <a:p>
+          <a:endParaRPr lang="en-US"/>
+        </a:p>
+      </dgm:t>
+    </dgm:pt>
+    <dgm:pt modelId="{1117ED7C-37FF-4A99-8BA8-4C46C8D73424}" type="sibTrans" cxnId="{18D32FF6-8822-4DA3-9148-9069DD188952}">
+      <dgm:prSet/>
+      <dgm:spPr/>
+      <dgm:t>
+        <a:bodyPr/>
+        <a:lstStyle/>
+        <a:p>
+          <a:endParaRPr lang="en-US"/>
+        </a:p>
+      </dgm:t>
+    </dgm:pt>
+    <dgm:pt modelId="{6EF4F606-D2A0-479E-B026-7D14D6680824}">
+      <dgm:prSet phldrT="[Text]"/>
+      <dgm:spPr/>
+      <dgm:t>
+        <a:bodyPr/>
+        <a:lstStyle/>
+        <a:p>
+          <a:r>
+            <a:rPr lang="en-US" dirty="0"/>
+            <a:t>Backtesting</a:t>
+          </a:r>
+        </a:p>
+      </dgm:t>
+    </dgm:pt>
+    <dgm:pt modelId="{18C22E50-46EB-4D2B-B1A7-ACE61149FE67}" type="parTrans" cxnId="{B5EC618F-D74C-49CF-AD99-EBA6DB3FF765}">
+      <dgm:prSet/>
+      <dgm:spPr/>
+      <dgm:t>
+        <a:bodyPr/>
+        <a:lstStyle/>
+        <a:p>
+          <a:endParaRPr lang="en-US"/>
+        </a:p>
+      </dgm:t>
+    </dgm:pt>
+    <dgm:pt modelId="{0D7BD4E9-124A-42CF-84B3-F7C26EB8DE40}" type="sibTrans" cxnId="{B5EC618F-D74C-49CF-AD99-EBA6DB3FF765}">
+      <dgm:prSet/>
+      <dgm:spPr/>
+      <dgm:t>
+        <a:bodyPr/>
+        <a:lstStyle/>
+        <a:p>
+          <a:endParaRPr lang="en-US"/>
+        </a:p>
+      </dgm:t>
+    </dgm:pt>
+    <dgm:pt modelId="{14DE31EB-3947-4D93-96E8-32F66D895B6F}">
+      <dgm:prSet phldrT="[Text]"/>
+      <dgm:spPr/>
+      <dgm:t>
+        <a:bodyPr/>
+        <a:lstStyle/>
+        <a:p>
+          <a:r>
+            <a:rPr lang="en-US" dirty="0"/>
+            <a:t>Sentiment Analysis</a:t>
+          </a:r>
+        </a:p>
+      </dgm:t>
+    </dgm:pt>
+    <dgm:pt modelId="{0E0243A0-F50C-4311-8BEB-5EEC252C26AE}" type="parTrans" cxnId="{04143BA5-76DA-40BC-9F31-917EFE72E255}">
+      <dgm:prSet/>
+      <dgm:spPr/>
+      <dgm:t>
+        <a:bodyPr/>
+        <a:lstStyle/>
+        <a:p>
+          <a:endParaRPr lang="en-US"/>
+        </a:p>
+      </dgm:t>
+    </dgm:pt>
+    <dgm:pt modelId="{4586DC36-D816-4974-B0DB-A8BA50BAF5B1}" type="sibTrans" cxnId="{04143BA5-76DA-40BC-9F31-917EFE72E255}">
       <dgm:prSet/>
       <dgm:spPr/>
       <dgm:t>
@@ -5749,13 +6013,6 @@
         </dgm:presLayoutVars>
       </dgm:prSet>
       <dgm:spPr/>
-      <dgm:t>
-        <a:bodyPr/>
-        <a:lstStyle/>
-        <a:p>
-          <a:endParaRPr lang="en-US"/>
-        </a:p>
-      </dgm:t>
     </dgm:pt>
     <dgm:pt modelId="{5717CE94-33AA-44D5-AFD0-9D50A22F5D24}" type="pres">
       <dgm:prSet presAssocID="{471FA9C0-A153-4F94-9FBD-6C001600B398}" presName="descendantText" presStyleLbl="alignAccFollowNode1" presStyleIdx="0" presStyleCnt="3">
@@ -5764,13 +6021,6 @@
         </dgm:presLayoutVars>
       </dgm:prSet>
       <dgm:spPr/>
-      <dgm:t>
-        <a:bodyPr/>
-        <a:lstStyle/>
-        <a:p>
-          <a:endParaRPr lang="en-US"/>
-        </a:p>
-      </dgm:t>
     </dgm:pt>
     <dgm:pt modelId="{C4CD1DB7-6507-4B3E-A521-573281CAC403}" type="pres">
       <dgm:prSet presAssocID="{0E4BD055-5145-4950-8DB9-A8B387800EFC}" presName="sp" presStyleCnt="0"/>
@@ -5788,13 +6038,6 @@
         </dgm:presLayoutVars>
       </dgm:prSet>
       <dgm:spPr/>
-      <dgm:t>
-        <a:bodyPr/>
-        <a:lstStyle/>
-        <a:p>
-          <a:endParaRPr lang="en-US"/>
-        </a:p>
-      </dgm:t>
     </dgm:pt>
     <dgm:pt modelId="{F7D7D60D-A3C5-4EBC-949F-23A771DEF040}" type="pres">
       <dgm:prSet presAssocID="{D8F6696C-DFDF-4E2A-B84F-C7BEDE475DA1}" presName="descendantText" presStyleLbl="alignAccFollowNode1" presStyleIdx="1" presStyleCnt="3">
@@ -5803,13 +6046,6 @@
         </dgm:presLayoutVars>
       </dgm:prSet>
       <dgm:spPr/>
-      <dgm:t>
-        <a:bodyPr/>
-        <a:lstStyle/>
-        <a:p>
-          <a:endParaRPr lang="en-US"/>
-        </a:p>
-      </dgm:t>
     </dgm:pt>
     <dgm:pt modelId="{764A20B0-CBBE-44C1-B037-A2F404C2A940}" type="pres">
       <dgm:prSet presAssocID="{3CE20966-912E-415D-A8D9-2B786C2A6AD6}" presName="sp" presStyleCnt="0"/>
@@ -5827,44 +6063,42 @@
         </dgm:presLayoutVars>
       </dgm:prSet>
       <dgm:spPr/>
-      <dgm:t>
-        <a:bodyPr/>
-        <a:lstStyle/>
-        <a:p>
-          <a:endParaRPr lang="en-US"/>
-        </a:p>
-      </dgm:t>
     </dgm:pt>
     <dgm:pt modelId="{391F6830-9F41-4AD6-A4D1-F53354155151}" type="pres">
-      <dgm:prSet presAssocID="{4528D8D3-2CE5-4668-AC47-9A6E5B0655D5}" presName="descendantText" presStyleLbl="alignAccFollowNode1" presStyleIdx="2" presStyleCnt="3">
+      <dgm:prSet presAssocID="{4528D8D3-2CE5-4668-AC47-9A6E5B0655D5}" presName="descendantText" presStyleLbl="alignAccFollowNode1" presStyleIdx="2" presStyleCnt="3" custLinFactNeighborX="1" custLinFactNeighborY="-618">
         <dgm:presLayoutVars>
           <dgm:bulletEnabled val="1"/>
         </dgm:presLayoutVars>
       </dgm:prSet>
       <dgm:spPr/>
-      <dgm:t>
-        <a:bodyPr/>
-        <a:lstStyle/>
-        <a:p>
-          <a:endParaRPr lang="en-US"/>
-        </a:p>
-      </dgm:t>
     </dgm:pt>
   </dgm:ptLst>
   <dgm:cxnLst>
+    <dgm:cxn modelId="{D5BCF500-A08C-4C2E-BCF1-04092EA69FDF}" type="presOf" srcId="{1603BFB6-DD8D-4281-A2E2-E23F748CA329}" destId="{5717CE94-33AA-44D5-AFD0-9D50A22F5D24}" srcOrd="0" destOrd="1" presId="urn:microsoft.com/office/officeart/2005/8/layout/vList5"/>
+    <dgm:cxn modelId="{B8D6270D-F26F-43CA-BDB7-B3D6A411C136}" srcId="{4528D8D3-2CE5-4668-AC47-9A6E5B0655D5}" destId="{C0EE92D2-179A-40ED-AD52-02939E318A20}" srcOrd="1" destOrd="0" parTransId="{6E1D08D0-7596-48FE-8EA5-11A573162155}" sibTransId="{8AF998E1-9437-4597-BFB0-DD57ED3D14AF}"/>
+    <dgm:cxn modelId="{E60B9C26-625A-48B2-B112-B6F405D47825}" srcId="{812956B4-3F78-4E10-99F5-5338A172153A}" destId="{471FA9C0-A153-4F94-9FBD-6C001600B398}" srcOrd="0" destOrd="0" parTransId="{9A67D294-31ED-4CE0-B4BB-75FC3A4DA3D5}" sibTransId="{0E4BD055-5145-4950-8DB9-A8B387800EFC}"/>
+    <dgm:cxn modelId="{A4F3BE2F-C9E8-4A10-9C44-ACC5D96AF829}" type="presOf" srcId="{2C8D931F-0BB0-4E90-B548-BF8C42E3D3B0}" destId="{5717CE94-33AA-44D5-AFD0-9D50A22F5D24}" srcOrd="0" destOrd="0" presId="urn:microsoft.com/office/officeart/2005/8/layout/vList5"/>
     <dgm:cxn modelId="{FF04483F-B88A-4A27-A92D-5C294A9E85D3}" srcId="{812956B4-3F78-4E10-99F5-5338A172153A}" destId="{4528D8D3-2CE5-4668-AC47-9A6E5B0655D5}" srcOrd="2" destOrd="0" parTransId="{A63C1CDC-2311-4DB1-B02B-0DD900EA4A82}" sibTransId="{CF058F54-9B34-4D01-A063-8CC5ABE8CA69}"/>
+    <dgm:cxn modelId="{8CC4845D-4EA9-45B1-BA96-4C88407703C4}" srcId="{D8F6696C-DFDF-4E2A-B84F-C7BEDE475DA1}" destId="{399EDBB7-BAC8-4319-8352-A95A2B1A7E1B}" srcOrd="1" destOrd="0" parTransId="{448BD3E6-5610-4CAE-B98C-DC982B8F5BAC}" sibTransId="{58FC7B61-3510-47A6-902C-54008C4CBC8A}"/>
+    <dgm:cxn modelId="{DE3DFD60-7126-41C3-AFD1-BD9883A66643}" type="presOf" srcId="{C165C16F-05A8-4E1F-9844-64136DCD4562}" destId="{F7D7D60D-A3C5-4EBC-949F-23A771DEF040}" srcOrd="0" destOrd="0" presId="urn:microsoft.com/office/officeart/2005/8/layout/vList5"/>
+    <dgm:cxn modelId="{FF6ADF45-22B0-43A3-B147-55A7585069B2}" srcId="{D8F6696C-DFDF-4E2A-B84F-C7BEDE475DA1}" destId="{0BB40664-810B-48C9-A036-C87571EB4A5A}" srcOrd="2" destOrd="0" parTransId="{5D365541-B859-4B81-910F-C91AC2671BCB}" sibTransId="{C3A603AF-4C38-44FD-A5AA-C23DC71EB215}"/>
+    <dgm:cxn modelId="{7F678D4C-C176-4BD0-B91E-E93473D5590C}" type="presOf" srcId="{471FA9C0-A153-4F94-9FBD-6C001600B398}" destId="{AC5DF425-B10F-41C2-9A21-566E2B120D68}" srcOrd="0" destOrd="0" presId="urn:microsoft.com/office/officeart/2005/8/layout/vList5"/>
+    <dgm:cxn modelId="{53C1CE6E-8A06-4BF2-BF69-10C60B01FD3F}" srcId="{D8F6696C-DFDF-4E2A-B84F-C7BEDE475DA1}" destId="{C165C16F-05A8-4E1F-9844-64136DCD4562}" srcOrd="0" destOrd="0" parTransId="{3B8B7541-2D76-4FE6-BD09-3332AA669FA4}" sibTransId="{9AFAB423-731E-4CC2-82CA-51AB510BC01C}"/>
+    <dgm:cxn modelId="{EBCC8B73-B5A1-447C-8EC3-9D137EF13346}" srcId="{471FA9C0-A153-4F94-9FBD-6C001600B398}" destId="{1603BFB6-DD8D-4281-A2E2-E23F748CA329}" srcOrd="1" destOrd="0" parTransId="{6F8B0729-99AB-4B34-9B25-A9EF3CBB73A1}" sibTransId="{CBCDED9E-5C16-417F-BF0A-6BEE561C79FF}"/>
+    <dgm:cxn modelId="{926C2E82-2524-42DE-AD09-8088D5CA85C4}" type="presOf" srcId="{0BB40664-810B-48C9-A036-C87571EB4A5A}" destId="{F7D7D60D-A3C5-4EBC-949F-23A771DEF040}" srcOrd="0" destOrd="2" presId="urn:microsoft.com/office/officeart/2005/8/layout/vList5"/>
+    <dgm:cxn modelId="{4C34D682-4D04-489A-8D81-4B3EC8F80669}" srcId="{471FA9C0-A153-4F94-9FBD-6C001600B398}" destId="{2C8D931F-0BB0-4E90-B548-BF8C42E3D3B0}" srcOrd="0" destOrd="0" parTransId="{4B8A6E23-6401-43C2-A1A7-8D8C4DDF6781}" sibTransId="{4E5871CB-81DC-46A7-AB67-434AC3ED4806}"/>
+    <dgm:cxn modelId="{B5EC618F-D74C-49CF-AD99-EBA6DB3FF765}" srcId="{4528D8D3-2CE5-4668-AC47-9A6E5B0655D5}" destId="{6EF4F606-D2A0-479E-B026-7D14D6680824}" srcOrd="2" destOrd="0" parTransId="{18C22E50-46EB-4D2B-B1A7-ACE61149FE67}" sibTransId="{0D7BD4E9-124A-42CF-84B3-F7C26EB8DE40}"/>
+    <dgm:cxn modelId="{72FF159F-1877-4D28-B8C8-4968B34A4718}" type="presOf" srcId="{C0EE92D2-179A-40ED-AD52-02939E318A20}" destId="{391F6830-9F41-4AD6-A4D1-F53354155151}" srcOrd="0" destOrd="1" presId="urn:microsoft.com/office/officeart/2005/8/layout/vList5"/>
+    <dgm:cxn modelId="{04143BA5-76DA-40BC-9F31-917EFE72E255}" srcId="{D8F6696C-DFDF-4E2A-B84F-C7BEDE475DA1}" destId="{14DE31EB-3947-4D93-96E8-32F66D895B6F}" srcOrd="3" destOrd="0" parTransId="{0E0243A0-F50C-4311-8BEB-5EEC252C26AE}" sibTransId="{4586DC36-D816-4974-B0DB-A8BA50BAF5B1}"/>
     <dgm:cxn modelId="{B31D68C1-49AB-4AE6-BF59-8A62D41C37B4}" type="presOf" srcId="{812956B4-3F78-4E10-99F5-5338A172153A}" destId="{E9CE67FF-08A3-47FA-A404-9EF799F01098}" srcOrd="0" destOrd="0" presId="urn:microsoft.com/office/officeart/2005/8/layout/vList5"/>
-    <dgm:cxn modelId="{B8D6270D-F26F-43CA-BDB7-B3D6A411C136}" srcId="{4528D8D3-2CE5-4668-AC47-9A6E5B0655D5}" destId="{C0EE92D2-179A-40ED-AD52-02939E318A20}" srcOrd="0" destOrd="0" parTransId="{6E1D08D0-7596-48FE-8EA5-11A573162155}" sibTransId="{8AF998E1-9437-4597-BFB0-DD57ED3D14AF}"/>
-    <dgm:cxn modelId="{7F678D4C-C176-4BD0-B91E-E93473D5590C}" type="presOf" srcId="{471FA9C0-A153-4F94-9FBD-6C001600B398}" destId="{AC5DF425-B10F-41C2-9A21-566E2B120D68}" srcOrd="0" destOrd="0" presId="urn:microsoft.com/office/officeart/2005/8/layout/vList5"/>
-    <dgm:cxn modelId="{72FF159F-1877-4D28-B8C8-4968B34A4718}" type="presOf" srcId="{C0EE92D2-179A-40ED-AD52-02939E318A20}" destId="{391F6830-9F41-4AD6-A4D1-F53354155151}" srcOrd="0" destOrd="0" presId="urn:microsoft.com/office/officeart/2005/8/layout/vList5"/>
+    <dgm:cxn modelId="{682798C1-13D7-4309-85ED-5CC959D92FC2}" type="presOf" srcId="{399EDBB7-BAC8-4319-8352-A95A2B1A7E1B}" destId="{F7D7D60D-A3C5-4EBC-949F-23A771DEF040}" srcOrd="0" destOrd="1" presId="urn:microsoft.com/office/officeart/2005/8/layout/vList5"/>
+    <dgm:cxn modelId="{68885BC5-EAF0-48DD-A9FD-6E93D9001132}" type="presOf" srcId="{F2F7E9DA-1283-4693-B1BE-5DB22CB6C5D8}" destId="{391F6830-9F41-4AD6-A4D1-F53354155151}" srcOrd="0" destOrd="0" presId="urn:microsoft.com/office/officeart/2005/8/layout/vList5"/>
+    <dgm:cxn modelId="{FD477EC8-8122-4F83-B482-781BF9CE917F}" srcId="{812956B4-3F78-4E10-99F5-5338A172153A}" destId="{D8F6696C-DFDF-4E2A-B84F-C7BEDE475DA1}" srcOrd="1" destOrd="0" parTransId="{8032B5A6-3F61-4786-9A67-B128F189D0D1}" sibTransId="{3CE20966-912E-415D-A8D9-2B786C2A6AD6}"/>
+    <dgm:cxn modelId="{404F48DC-1954-43DD-98ED-0DC212F6BA66}" type="presOf" srcId="{6EF4F606-D2A0-479E-B026-7D14D6680824}" destId="{391F6830-9F41-4AD6-A4D1-F53354155151}" srcOrd="0" destOrd="2" presId="urn:microsoft.com/office/officeart/2005/8/layout/vList5"/>
+    <dgm:cxn modelId="{807F66DE-2449-45AF-A422-F5DAFA6B5576}" type="presOf" srcId="{4528D8D3-2CE5-4668-AC47-9A6E5B0655D5}" destId="{4BEAAD7C-EA9D-4AB0-A183-A0A4D2C6100C}" srcOrd="0" destOrd="0" presId="urn:microsoft.com/office/officeart/2005/8/layout/vList5"/>
     <dgm:cxn modelId="{75178CE8-77CB-4F4A-816D-94D093A5044E}" type="presOf" srcId="{D8F6696C-DFDF-4E2A-B84F-C7BEDE475DA1}" destId="{C19F3D2B-90F6-4B59-AE4C-D6AE3AA1BCE2}" srcOrd="0" destOrd="0" presId="urn:microsoft.com/office/officeart/2005/8/layout/vList5"/>
-    <dgm:cxn modelId="{FD477EC8-8122-4F83-B482-781BF9CE917F}" srcId="{812956B4-3F78-4E10-99F5-5338A172153A}" destId="{D8F6696C-DFDF-4E2A-B84F-C7BEDE475DA1}" srcOrd="1" destOrd="0" parTransId="{8032B5A6-3F61-4786-9A67-B128F189D0D1}" sibTransId="{3CE20966-912E-415D-A8D9-2B786C2A6AD6}"/>
-    <dgm:cxn modelId="{A4F3BE2F-C9E8-4A10-9C44-ACC5D96AF829}" type="presOf" srcId="{2C8D931F-0BB0-4E90-B548-BF8C42E3D3B0}" destId="{5717CE94-33AA-44D5-AFD0-9D50A22F5D24}" srcOrd="0" destOrd="0" presId="urn:microsoft.com/office/officeart/2005/8/layout/vList5"/>
-    <dgm:cxn modelId="{807F66DE-2449-45AF-A422-F5DAFA6B5576}" type="presOf" srcId="{4528D8D3-2CE5-4668-AC47-9A6E5B0655D5}" destId="{4BEAAD7C-EA9D-4AB0-A183-A0A4D2C6100C}" srcOrd="0" destOrd="0" presId="urn:microsoft.com/office/officeart/2005/8/layout/vList5"/>
-    <dgm:cxn modelId="{53C1CE6E-8A06-4BF2-BF69-10C60B01FD3F}" srcId="{D8F6696C-DFDF-4E2A-B84F-C7BEDE475DA1}" destId="{C165C16F-05A8-4E1F-9844-64136DCD4562}" srcOrd="0" destOrd="0" parTransId="{3B8B7541-2D76-4FE6-BD09-3332AA669FA4}" sibTransId="{9AFAB423-731E-4CC2-82CA-51AB510BC01C}"/>
-    <dgm:cxn modelId="{4C34D682-4D04-489A-8D81-4B3EC8F80669}" srcId="{471FA9C0-A153-4F94-9FBD-6C001600B398}" destId="{2C8D931F-0BB0-4E90-B548-BF8C42E3D3B0}" srcOrd="0" destOrd="0" parTransId="{4B8A6E23-6401-43C2-A1A7-8D8C4DDF6781}" sibTransId="{4E5871CB-81DC-46A7-AB67-434AC3ED4806}"/>
-    <dgm:cxn modelId="{DE3DFD60-7126-41C3-AFD1-BD9883A66643}" type="presOf" srcId="{C165C16F-05A8-4E1F-9844-64136DCD4562}" destId="{F7D7D60D-A3C5-4EBC-949F-23A771DEF040}" srcOrd="0" destOrd="0" presId="urn:microsoft.com/office/officeart/2005/8/layout/vList5"/>
-    <dgm:cxn modelId="{E60B9C26-625A-48B2-B112-B6F405D47825}" srcId="{812956B4-3F78-4E10-99F5-5338A172153A}" destId="{471FA9C0-A153-4F94-9FBD-6C001600B398}" srcOrd="0" destOrd="0" parTransId="{9A67D294-31ED-4CE0-B4BB-75FC3A4DA3D5}" sibTransId="{0E4BD055-5145-4950-8DB9-A8B387800EFC}"/>
+    <dgm:cxn modelId="{18D32FF6-8822-4DA3-9148-9069DD188952}" srcId="{4528D8D3-2CE5-4668-AC47-9A6E5B0655D5}" destId="{F2F7E9DA-1283-4693-B1BE-5DB22CB6C5D8}" srcOrd="0" destOrd="0" parTransId="{05BC4019-FF78-4CCF-B4A4-35D12DF5D7B2}" sibTransId="{1117ED7C-37FF-4A99-8BA8-4C46C8D73424}"/>
+    <dgm:cxn modelId="{532F4AF8-D842-4FE8-A710-73F07066D494}" type="presOf" srcId="{14DE31EB-3947-4D93-96E8-32F66D895B6F}" destId="{F7D7D60D-A3C5-4EBC-949F-23A771DEF040}" srcOrd="0" destOrd="3" presId="urn:microsoft.com/office/officeart/2005/8/layout/vList5"/>
     <dgm:cxn modelId="{52FCDBA2-928B-4CFB-B00E-6BDE1E353ACF}" type="presParOf" srcId="{E9CE67FF-08A3-47FA-A404-9EF799F01098}" destId="{109C000A-0610-4585-9C46-266D79702813}" srcOrd="0" destOrd="0" presId="urn:microsoft.com/office/officeart/2005/8/layout/vList5"/>
     <dgm:cxn modelId="{C79382FA-317C-4C35-B81B-7E30A856BCEA}" type="presParOf" srcId="{109C000A-0610-4585-9C46-266D79702813}" destId="{AC5DF425-B10F-41C2-9A21-566E2B120D68}" srcOrd="0" destOrd="0" presId="urn:microsoft.com/office/officeart/2005/8/layout/vList5"/>
     <dgm:cxn modelId="{34327D03-A1D8-4FA3-B4DF-C0C6E1BFE562}" type="presParOf" srcId="{109C000A-0610-4585-9C46-266D79702813}" destId="{5717CE94-33AA-44D5-AFD0-9D50A22F5D24}" srcOrd="1" destOrd="0" presId="urn:microsoft.com/office/officeart/2005/8/layout/vList5"/>
@@ -5951,7 +6185,7 @@
                 <a14:useLocalDpi xmlns:a14="http://schemas.microsoft.com/office/drawing/2010/main"/>
               </a:ext>
               <a:ext uri="{96DAC541-7B7A-43D3-8B79-37D633B846F1}">
-                <asvg:svgBlip xmlns:asvg="http://schemas.microsoft.com/office/drawing/2016/SVG/main" xmlns="" r:embed="rId2"/>
+                <asvg:svgBlip xmlns:asvg="http://schemas.microsoft.com/office/drawing/2016/SVG/main" r:embed="rId2"/>
               </a:ext>
             </a:extLst>
           </a:blip>
@@ -6016,7 +6250,7 @@
         </a:bodyPr>
         <a:lstStyle/>
         <a:p>
-          <a:pPr lvl="0" algn="l" defTabSz="1111250">
+          <a:pPr marL="0" lvl="0" indent="0" algn="l" defTabSz="1111250">
             <a:lnSpc>
               <a:spcPct val="100000"/>
             </a:lnSpc>
@@ -6026,6 +6260,7 @@
             <a:spcAft>
               <a:spcPct val="35000"/>
             </a:spcAft>
+            <a:buNone/>
           </a:pPr>
           <a:r>
             <a:rPr lang="en-US" sz="2500" kern="1200" noProof="0" dirty="0">
@@ -6105,7 +6340,7 @@
                 <a14:useLocalDpi xmlns:a14="http://schemas.microsoft.com/office/drawing/2010/main" val="0"/>
               </a:ext>
               <a:ext uri="{96DAC541-7B7A-43D3-8B79-37D633B846F1}">
-                <asvg:svgBlip xmlns:asvg="http://schemas.microsoft.com/office/drawing/2016/SVG/main" xmlns="" r:embed="rId4"/>
+                <asvg:svgBlip xmlns:asvg="http://schemas.microsoft.com/office/drawing/2016/SVG/main" r:embed="rId4"/>
               </a:ext>
             </a:extLst>
           </a:blip>
@@ -6170,7 +6405,7 @@
         </a:bodyPr>
         <a:lstStyle/>
         <a:p>
-          <a:pPr lvl="0" algn="l" defTabSz="1111250">
+          <a:pPr marL="0" lvl="0" indent="0" algn="l" defTabSz="1111250">
             <a:lnSpc>
               <a:spcPct val="100000"/>
             </a:lnSpc>
@@ -6180,6 +6415,7 @@
             <a:spcAft>
               <a:spcPct val="35000"/>
             </a:spcAft>
+            <a:buNone/>
           </a:pPr>
           <a:r>
             <a:rPr lang="en-US" sz="2500" kern="1200" noProof="0" dirty="0">
@@ -6259,7 +6495,7 @@
                 <a14:useLocalDpi xmlns:a14="http://schemas.microsoft.com/office/drawing/2010/main"/>
               </a:ext>
               <a:ext uri="{96DAC541-7B7A-43D3-8B79-37D633B846F1}">
-                <asvg:svgBlip xmlns:asvg="http://schemas.microsoft.com/office/drawing/2016/SVG/main" xmlns="" r:embed="rId6"/>
+                <asvg:svgBlip xmlns:asvg="http://schemas.microsoft.com/office/drawing/2016/SVG/main" r:embed="rId6"/>
               </a:ext>
             </a:extLst>
           </a:blip>
@@ -6324,7 +6560,7 @@
         </a:bodyPr>
         <a:lstStyle/>
         <a:p>
-          <a:pPr lvl="0" algn="l" defTabSz="1111250">
+          <a:pPr marL="0" lvl="0" indent="0" algn="l" defTabSz="1111250">
             <a:lnSpc>
               <a:spcPct val="100000"/>
             </a:lnSpc>
@@ -6334,6 +6570,7 @@
             <a:spcAft>
               <a:spcPct val="35000"/>
             </a:spcAft>
+            <a:buNone/>
           </a:pPr>
           <a:r>
             <a:rPr lang="en-US" sz="2500" kern="1200" noProof="0" dirty="0">
@@ -6463,7 +6700,7 @@
         </a:bodyPr>
         <a:lstStyle/>
         <a:p>
-          <a:pPr lvl="0" algn="ctr" defTabSz="666750">
+          <a:pPr marL="0" lvl="0" indent="0" algn="ctr" defTabSz="666750">
             <a:lnSpc>
               <a:spcPct val="90000"/>
             </a:lnSpc>
@@ -6473,12 +6710,12 @@
             <a:spcAft>
               <a:spcPct val="35000"/>
             </a:spcAft>
+            <a:buNone/>
           </a:pPr>
           <a:r>
-            <a:rPr lang="en-US" sz="1500" kern="1200" dirty="0" smtClean="0"/>
+            <a:rPr lang="en-US" sz="1500" kern="1200" dirty="0"/>
             <a:t>Planning</a:t>
           </a:r>
-          <a:endParaRPr lang="en-US" sz="1500" kern="1200" dirty="0"/>
         </a:p>
       </dsp:txBody>
       <dsp:txXfrm>
@@ -6540,7 +6777,7 @@
         </a:bodyPr>
         <a:lstStyle/>
         <a:p>
-          <a:pPr lvl="0" algn="ctr" defTabSz="666750">
+          <a:pPr marL="0" lvl="0" indent="0" algn="ctr" defTabSz="666750">
             <a:lnSpc>
               <a:spcPct val="90000"/>
             </a:lnSpc>
@@ -6550,12 +6787,12 @@
             <a:spcAft>
               <a:spcPct val="35000"/>
             </a:spcAft>
+            <a:buNone/>
           </a:pPr>
           <a:r>
-            <a:rPr lang="en-US" sz="1500" kern="1200" dirty="0" smtClean="0"/>
+            <a:rPr lang="en-US" sz="1500" kern="1200" dirty="0"/>
             <a:t>User-driven data retrieval</a:t>
           </a:r>
-          <a:endParaRPr lang="en-US" sz="1500" kern="1200" dirty="0"/>
         </a:p>
       </dsp:txBody>
       <dsp:txXfrm>
@@ -6617,7 +6854,7 @@
         </a:bodyPr>
         <a:lstStyle/>
         <a:p>
-          <a:pPr lvl="0" algn="ctr" defTabSz="666750">
+          <a:pPr marL="0" lvl="0" indent="0" algn="ctr" defTabSz="666750">
             <a:lnSpc>
               <a:spcPct val="90000"/>
             </a:lnSpc>
@@ -6627,12 +6864,12 @@
             <a:spcAft>
               <a:spcPct val="35000"/>
             </a:spcAft>
+            <a:buNone/>
           </a:pPr>
           <a:r>
-            <a:rPr lang="en-US" sz="1500" kern="1200" dirty="0" smtClean="0"/>
+            <a:rPr lang="en-US" sz="1500" kern="1200" dirty="0"/>
             <a:t>Model-based results</a:t>
           </a:r>
-          <a:endParaRPr lang="en-US" sz="1500" kern="1200" dirty="0"/>
         </a:p>
       </dsp:txBody>
       <dsp:txXfrm>
@@ -6743,7 +6980,7 @@
         </a:bodyPr>
         <a:lstStyle/>
         <a:p>
-          <a:pPr lvl="0" algn="ctr" defTabSz="666750">
+          <a:pPr marL="0" lvl="0" indent="0" algn="ctr" defTabSz="666750">
             <a:lnSpc>
               <a:spcPct val="90000"/>
             </a:lnSpc>
@@ -6753,12 +6990,12 @@
             <a:spcAft>
               <a:spcPct val="35000"/>
             </a:spcAft>
+            <a:buNone/>
           </a:pPr>
           <a:r>
-            <a:rPr lang="en-US" sz="1500" kern="1200" dirty="0" smtClean="0"/>
+            <a:rPr lang="en-US" sz="1500" kern="1200" dirty="0"/>
             <a:t>Sentiment Modeling</a:t>
           </a:r>
-          <a:endParaRPr lang="en-US" sz="1500" kern="1200" dirty="0"/>
         </a:p>
       </dsp:txBody>
       <dsp:txXfrm>
@@ -6820,7 +7057,7 @@
         </a:bodyPr>
         <a:lstStyle/>
         <a:p>
-          <a:pPr lvl="0" algn="ctr" defTabSz="666750">
+          <a:pPr marL="0" lvl="0" indent="0" algn="ctr" defTabSz="666750">
             <a:lnSpc>
               <a:spcPct val="90000"/>
             </a:lnSpc>
@@ -6830,12 +7067,12 @@
             <a:spcAft>
               <a:spcPct val="35000"/>
             </a:spcAft>
+            <a:buNone/>
           </a:pPr>
           <a:r>
-            <a:rPr lang="en-US" sz="1500" kern="1200" dirty="0" smtClean="0"/>
+            <a:rPr lang="en-US" sz="1500" kern="1200" dirty="0"/>
             <a:t>Sentiment Integration</a:t>
           </a:r>
-          <a:endParaRPr lang="en-US" sz="1500" kern="1200" dirty="0"/>
         </a:p>
       </dsp:txBody>
       <dsp:txXfrm>
@@ -6897,7 +7134,7 @@
         </a:bodyPr>
         <a:lstStyle/>
         <a:p>
-          <a:pPr lvl="0" algn="ctr" defTabSz="666750">
+          <a:pPr marL="0" lvl="0" indent="0" algn="ctr" defTabSz="666750">
             <a:lnSpc>
               <a:spcPct val="90000"/>
             </a:lnSpc>
@@ -6907,12 +7144,12 @@
             <a:spcAft>
               <a:spcPct val="35000"/>
             </a:spcAft>
+            <a:buNone/>
           </a:pPr>
           <a:r>
-            <a:rPr lang="en-US" sz="1500" kern="1200" dirty="0" smtClean="0"/>
+            <a:rPr lang="en-US" sz="1500" kern="1200" dirty="0"/>
             <a:t>Auto-selection of best model</a:t>
           </a:r>
-          <a:endParaRPr lang="en-US" sz="1500" kern="1200" dirty="0"/>
         </a:p>
       </dsp:txBody>
       <dsp:txXfrm>
@@ -6983,7 +7220,7 @@
         <a:fontRef idx="minor"/>
       </dsp:style>
       <dsp:txBody>
-        <a:bodyPr spcFirstLastPara="0" vert="horz" wrap="square" lIns="80010" tIns="40005" rIns="80010" bIns="40005" numCol="1" spcCol="1270" anchor="ctr" anchorCtr="0">
+        <a:bodyPr spcFirstLastPara="0" vert="horz" wrap="square" lIns="72390" tIns="36195" rIns="72390" bIns="36195" numCol="1" spcCol="1270" anchor="ctr" anchorCtr="0">
           <a:noAutofit/>
         </a:bodyPr>
         <a:lstStyle/>
@@ -6998,13 +7235,12 @@
             <a:spcAft>
               <a:spcPct val="15000"/>
             </a:spcAft>
-            <a:buChar char="••"/>
+            <a:buChar char="•"/>
           </a:pPr>
           <a:r>
-            <a:rPr lang="en-US" sz="2100" kern="1200" dirty="0" smtClean="0"/>
+            <a:rPr lang="en-US" sz="2100" kern="1200" dirty="0"/>
             <a:t>Yahoo! Finance API</a:t>
           </a:r>
-          <a:endParaRPr lang="en-US" sz="2100" kern="1200" dirty="0"/>
         </a:p>
         <a:p>
           <a:pPr marL="228600" lvl="1" indent="-228600" algn="l" defTabSz="933450">
@@ -7017,13 +7253,20 @@
             <a:spcAft>
               <a:spcPct val="15000"/>
             </a:spcAft>
-            <a:buChar char="••"/>
+            <a:buChar char="•"/>
           </a:pPr>
           <a:r>
-            <a:rPr lang="en-US" sz="2100" kern="1200" dirty="0" smtClean="0"/>
-            <a:t>CSVs for prototyping</a:t>
+            <a:rPr lang="en-US" sz="2100" kern="1200" dirty="0"/>
+            <a:t>CSVs for prototyping (</a:t>
           </a:r>
-          <a:endParaRPr lang="en-US" sz="2100" kern="1200" dirty="0"/>
+          <a:r>
+            <a:rPr lang="en-US" sz="1800" kern="1200" dirty="0" err="1"/>
+            <a:t>cnn.fg</a:t>
+          </a:r>
+          <a:r>
+            <a:rPr lang="en-US" sz="1800" kern="1200" dirty="0"/>
+            <a:t>, CBOE)</a:t>
+          </a:r>
         </a:p>
       </dsp:txBody>
       <dsp:txXfrm rot="-5400000">
@@ -7085,7 +7328,7 @@
         </a:bodyPr>
         <a:lstStyle/>
         <a:p>
-          <a:pPr lvl="0" algn="ctr" defTabSz="1866900">
+          <a:pPr marL="0" lvl="0" indent="0" algn="ctr" defTabSz="1866900">
             <a:lnSpc>
               <a:spcPct val="90000"/>
             </a:lnSpc>
@@ -7095,12 +7338,12 @@
             <a:spcAft>
               <a:spcPct val="35000"/>
             </a:spcAft>
+            <a:buNone/>
           </a:pPr>
           <a:r>
-            <a:rPr lang="en-US" sz="4200" kern="1200" dirty="0" smtClean="0"/>
+            <a:rPr lang="en-US" sz="4200" kern="1200" dirty="0"/>
             <a:t>Sources</a:t>
           </a:r>
-          <a:endParaRPr lang="en-US" sz="4200" kern="1200" dirty="0"/>
         </a:p>
       </dsp:txBody>
       <dsp:txXfrm>
@@ -7159,12 +7402,12 @@
         <a:fontRef idx="minor"/>
       </dsp:style>
       <dsp:txBody>
-        <a:bodyPr spcFirstLastPara="0" vert="horz" wrap="square" lIns="80010" tIns="40005" rIns="80010" bIns="40005" numCol="1" spcCol="1270" anchor="ctr" anchorCtr="0">
+        <a:bodyPr spcFirstLastPara="0" vert="horz" wrap="square" lIns="72390" tIns="36195" rIns="72390" bIns="36195" numCol="1" spcCol="1270" anchor="ctr" anchorCtr="0">
           <a:noAutofit/>
         </a:bodyPr>
         <a:lstStyle/>
         <a:p>
-          <a:pPr marL="228600" lvl="1" indent="-228600" algn="l" defTabSz="933450">
+          <a:pPr marL="171450" lvl="1" indent="-171450" algn="l" defTabSz="844550">
             <a:lnSpc>
               <a:spcPct val="90000"/>
             </a:lnSpc>
@@ -7174,13 +7417,70 @@
             <a:spcAft>
               <a:spcPct val="15000"/>
             </a:spcAft>
-            <a:buChar char="••"/>
+            <a:buChar char="•"/>
           </a:pPr>
           <a:r>
-            <a:rPr lang="en-US" sz="2100" kern="1200" dirty="0" smtClean="0"/>
+            <a:rPr lang="en-US" sz="1900" kern="1200" dirty="0"/>
             <a:t>Date indexing</a:t>
           </a:r>
-          <a:endParaRPr lang="en-US" sz="2100" kern="1200" dirty="0"/>
+        </a:p>
+        <a:p>
+          <a:pPr marL="171450" lvl="1" indent="-171450" algn="l" defTabSz="844550">
+            <a:lnSpc>
+              <a:spcPct val="90000"/>
+            </a:lnSpc>
+            <a:spcBef>
+              <a:spcPct val="0"/>
+            </a:spcBef>
+            <a:spcAft>
+              <a:spcPct val="15000"/>
+            </a:spcAft>
+            <a:buChar char="•"/>
+          </a:pPr>
+          <a:r>
+            <a:rPr lang="en-US" sz="1900" kern="1200" dirty="0"/>
+            <a:t>Concatenate CSV data sources</a:t>
+          </a:r>
+        </a:p>
+        <a:p>
+          <a:pPr marL="171450" lvl="1" indent="-171450" algn="l" defTabSz="844550">
+            <a:lnSpc>
+              <a:spcPct val="90000"/>
+            </a:lnSpc>
+            <a:spcBef>
+              <a:spcPct val="0"/>
+            </a:spcBef>
+            <a:spcAft>
+              <a:spcPct val="15000"/>
+            </a:spcAft>
+            <a:buChar char="•"/>
+          </a:pPr>
+          <a:r>
+            <a:rPr lang="en-US" sz="1900" kern="1200" dirty="0" err="1"/>
+            <a:t>Jupyter</a:t>
+          </a:r>
+          <a:r>
+            <a:rPr lang="en-US" sz="1900" kern="1200" dirty="0"/>
+            <a:t> Notebook for validation</a:t>
+          </a:r>
+        </a:p>
+        <a:p>
+          <a:pPr marL="171450" lvl="1" indent="-171450" algn="l" defTabSz="844550">
+            <a:lnSpc>
+              <a:spcPct val="90000"/>
+            </a:lnSpc>
+            <a:spcBef>
+              <a:spcPct val="0"/>
+            </a:spcBef>
+            <a:spcAft>
+              <a:spcPct val="15000"/>
+            </a:spcAft>
+            <a:buChar char="•"/>
+          </a:pPr>
+          <a:r>
+            <a:rPr lang="en-US" sz="1900" kern="1200" dirty="0"/>
+            <a:t>DataFrame creation</a:t>
+          </a:r>
         </a:p>
       </dsp:txBody>
       <dsp:txXfrm rot="-5400000">
@@ -7242,7 +7542,7 @@
         </a:bodyPr>
         <a:lstStyle/>
         <a:p>
-          <a:pPr lvl="0" algn="ctr" defTabSz="1866900">
+          <a:pPr marL="0" lvl="0" indent="0" algn="ctr" defTabSz="1866900">
             <a:lnSpc>
               <a:spcPct val="90000"/>
             </a:lnSpc>
@@ -7252,12 +7552,12 @@
             <a:spcAft>
               <a:spcPct val="35000"/>
             </a:spcAft>
+            <a:buNone/>
           </a:pPr>
           <a:r>
-            <a:rPr lang="en-US" sz="4200" kern="1200" dirty="0" smtClean="0"/>
+            <a:rPr lang="en-US" sz="4200" kern="1200" dirty="0"/>
             <a:t>Prep</a:t>
           </a:r>
-          <a:endParaRPr lang="en-US" sz="4200" kern="1200" dirty="0"/>
         </a:p>
       </dsp:txBody>
       <dsp:txXfrm>
@@ -7316,12 +7616,12 @@
         <a:fontRef idx="minor"/>
       </dsp:style>
       <dsp:txBody>
-        <a:bodyPr spcFirstLastPara="0" vert="horz" wrap="square" lIns="80010" tIns="40005" rIns="80010" bIns="40005" numCol="1" spcCol="1270" anchor="ctr" anchorCtr="0">
+        <a:bodyPr spcFirstLastPara="0" vert="horz" wrap="square" lIns="72390" tIns="36195" rIns="72390" bIns="36195" numCol="1" spcCol="1270" anchor="ctr" anchorCtr="0">
           <a:noAutofit/>
         </a:bodyPr>
         <a:lstStyle/>
         <a:p>
-          <a:pPr marL="228600" lvl="1" indent="-228600" algn="l" defTabSz="933450">
+          <a:pPr marL="171450" lvl="1" indent="-171450" algn="l" defTabSz="844550">
             <a:lnSpc>
               <a:spcPct val="90000"/>
             </a:lnSpc>
@@ -7331,16 +7631,15 @@
             <a:spcAft>
               <a:spcPct val="15000"/>
             </a:spcAft>
-            <a:buChar char="••"/>
+            <a:buChar char="•"/>
           </a:pPr>
           <a:r>
-            <a:rPr lang="en-US" sz="2100" kern="1200" dirty="0" smtClean="0"/>
+            <a:rPr lang="en-US" sz="1900" kern="1200" dirty="0"/>
             <a:t>Chart annotation</a:t>
           </a:r>
-          <a:endParaRPr lang="en-US" sz="2100" kern="1200" dirty="0"/>
         </a:p>
         <a:p>
-          <a:pPr marL="228600" lvl="1" indent="-228600" algn="l" defTabSz="933450">
+          <a:pPr marL="171450" lvl="1" indent="-171450" algn="l" defTabSz="844550">
             <a:lnSpc>
               <a:spcPct val="90000"/>
             </a:lnSpc>
@@ -7350,16 +7649,15 @@
             <a:spcAft>
               <a:spcPct val="15000"/>
             </a:spcAft>
-            <a:buChar char="••"/>
+            <a:buChar char="•"/>
           </a:pPr>
           <a:r>
-            <a:rPr lang="en-US" sz="2100" kern="1200" dirty="0" smtClean="0"/>
+            <a:rPr lang="en-US" sz="1900" kern="1200" dirty="0"/>
             <a:t>Number formatting</a:t>
           </a:r>
-          <a:endParaRPr lang="en-US" sz="2100" kern="1200" dirty="0"/>
         </a:p>
         <a:p>
-          <a:pPr marL="228600" lvl="1" indent="-228600" algn="l" defTabSz="933450">
+          <a:pPr marL="171450" lvl="1" indent="-171450" algn="l" defTabSz="844550">
             <a:lnSpc>
               <a:spcPct val="90000"/>
             </a:lnSpc>
@@ -7369,17 +7667,34 @@
             <a:spcAft>
               <a:spcPct val="15000"/>
             </a:spcAft>
-            <a:buChar char="••"/>
+            <a:buChar char="•"/>
           </a:pPr>
           <a:r>
-            <a:rPr lang="en-US" sz="2100" kern="1200" dirty="0" err="1" smtClean="0"/>
+            <a:rPr lang="en-US" sz="1900" kern="1200" dirty="0" err="1"/>
             <a:t>Streamlit</a:t>
           </a:r>
           <a:r>
-            <a:rPr lang="en-US" sz="2100" kern="1200" dirty="0" smtClean="0"/>
+            <a:rPr lang="en-US" sz="1900" kern="1200" dirty="0"/>
             <a:t> compatibility conversions</a:t>
           </a:r>
-          <a:endParaRPr lang="en-US" sz="2100" kern="1200" dirty="0"/>
+        </a:p>
+        <a:p>
+          <a:pPr marL="171450" lvl="1" indent="-171450" algn="l" defTabSz="844550">
+            <a:lnSpc>
+              <a:spcPct val="90000"/>
+            </a:lnSpc>
+            <a:spcBef>
+              <a:spcPct val="0"/>
+            </a:spcBef>
+            <a:spcAft>
+              <a:spcPct val="15000"/>
+            </a:spcAft>
+            <a:buChar char="•"/>
+          </a:pPr>
+          <a:r>
+            <a:rPr lang="en-US" sz="1900" kern="1200" dirty="0"/>
+            <a:t>Presentation ready DataFrame</a:t>
+          </a:r>
         </a:p>
       </dsp:txBody>
       <dsp:txXfrm rot="-5400000">
@@ -7441,7 +7756,7 @@
         </a:bodyPr>
         <a:lstStyle/>
         <a:p>
-          <a:pPr lvl="0" algn="ctr" defTabSz="1866900">
+          <a:pPr marL="0" lvl="0" indent="0" algn="ctr" defTabSz="1866900">
             <a:lnSpc>
               <a:spcPct val="90000"/>
             </a:lnSpc>
@@ -7451,12 +7766,12 @@
             <a:spcAft>
               <a:spcPct val="35000"/>
             </a:spcAft>
+            <a:buNone/>
           </a:pPr>
           <a:r>
-            <a:rPr lang="en-US" sz="4200" kern="1200" dirty="0" smtClean="0"/>
+            <a:rPr lang="en-US" sz="4200" kern="1200" dirty="0"/>
             <a:t>Results Delivery</a:t>
           </a:r>
-          <a:endParaRPr lang="en-US" sz="4200" kern="1200" dirty="0"/>
         </a:p>
       </dsp:txBody>
       <dsp:txXfrm>
@@ -7527,12 +7842,12 @@
         <a:fontRef idx="minor"/>
       </dsp:style>
       <dsp:txBody>
-        <a:bodyPr spcFirstLastPara="0" vert="horz" wrap="square" lIns="179070" tIns="89535" rIns="179070" bIns="89535" numCol="1" spcCol="1270" anchor="ctr" anchorCtr="0">
+        <a:bodyPr spcFirstLastPara="0" vert="horz" wrap="square" lIns="72390" tIns="36195" rIns="72390" bIns="36195" numCol="1" spcCol="1270" anchor="ctr" anchorCtr="0">
           <a:noAutofit/>
         </a:bodyPr>
         <a:lstStyle/>
         <a:p>
-          <a:pPr marL="285750" lvl="1" indent="-285750" algn="l" defTabSz="2089150">
+          <a:pPr marL="171450" lvl="1" indent="-171450" algn="l" defTabSz="844550">
             <a:lnSpc>
               <a:spcPct val="90000"/>
             </a:lnSpc>
@@ -7542,13 +7857,30 @@
             <a:spcAft>
               <a:spcPct val="15000"/>
             </a:spcAft>
-            <a:buChar char="••"/>
+            <a:buChar char="•"/>
           </a:pPr>
           <a:r>
-            <a:rPr lang="en-US" sz="4700" kern="1200" dirty="0" smtClean="0"/>
-            <a:t>&lt;description&gt;</a:t>
+            <a:rPr lang="en-US" sz="1900" kern="1200" dirty="0"/>
+            <a:t>Price prediction</a:t>
           </a:r>
-          <a:endParaRPr lang="en-US" sz="4700" kern="1200" dirty="0"/>
+        </a:p>
+        <a:p>
+          <a:pPr marL="171450" lvl="1" indent="-171450" algn="l" defTabSz="844550">
+            <a:lnSpc>
+              <a:spcPct val="90000"/>
+            </a:lnSpc>
+            <a:spcBef>
+              <a:spcPct val="0"/>
+            </a:spcBef>
+            <a:spcAft>
+              <a:spcPct val="15000"/>
+            </a:spcAft>
+            <a:buChar char="•"/>
+          </a:pPr>
+          <a:r>
+            <a:rPr lang="en-US" sz="1900" kern="1200" dirty="0"/>
+            <a:t>Components trends</a:t>
+          </a:r>
         </a:p>
       </dsp:txBody>
       <dsp:txXfrm rot="-5400000">
@@ -7605,12 +7937,12 @@
         </a:fontRef>
       </dsp:style>
       <dsp:txBody>
-        <a:bodyPr spcFirstLastPara="0" vert="horz" wrap="square" lIns="129540" tIns="64770" rIns="129540" bIns="64770" numCol="1" spcCol="1270" anchor="ctr" anchorCtr="0">
+        <a:bodyPr spcFirstLastPara="0" vert="horz" wrap="square" lIns="118110" tIns="59055" rIns="118110" bIns="59055" numCol="1" spcCol="1270" anchor="ctr" anchorCtr="0">
           <a:noAutofit/>
         </a:bodyPr>
         <a:lstStyle/>
         <a:p>
-          <a:pPr lvl="0" algn="ctr" defTabSz="1511300">
+          <a:pPr marL="0" lvl="0" indent="0" algn="ctr" defTabSz="1377950">
             <a:lnSpc>
               <a:spcPct val="90000"/>
             </a:lnSpc>
@@ -7620,12 +7952,13 @@
             <a:spcAft>
               <a:spcPct val="35000"/>
             </a:spcAft>
+            <a:buNone/>
           </a:pPr>
           <a:r>
-            <a:rPr lang="en-US" sz="3400" kern="1200" dirty="0" err="1" smtClean="0"/>
+            <a:rPr lang="en-US" sz="3100" kern="1200" dirty="0" err="1"/>
             <a:t>FBProphet</a:t>
           </a:r>
-          <a:endParaRPr lang="en-US" sz="3400" kern="1200" dirty="0"/>
+          <a:endParaRPr lang="en-US" sz="3100" kern="1200" dirty="0"/>
         </a:p>
       </dsp:txBody>
       <dsp:txXfrm>
@@ -7684,12 +8017,12 @@
         <a:fontRef idx="minor"/>
       </dsp:style>
       <dsp:txBody>
-        <a:bodyPr spcFirstLastPara="0" vert="horz" wrap="square" lIns="179070" tIns="89535" rIns="179070" bIns="89535" numCol="1" spcCol="1270" anchor="ctr" anchorCtr="0">
+        <a:bodyPr spcFirstLastPara="0" vert="horz" wrap="square" lIns="72390" tIns="36195" rIns="72390" bIns="36195" numCol="1" spcCol="1270" anchor="ctr" anchorCtr="0">
           <a:noAutofit/>
         </a:bodyPr>
         <a:lstStyle/>
         <a:p>
-          <a:pPr marL="285750" lvl="1" indent="-285750" algn="l" defTabSz="2089150">
+          <a:pPr marL="171450" lvl="1" indent="-171450" algn="l" defTabSz="844550">
             <a:lnSpc>
               <a:spcPct val="90000"/>
             </a:lnSpc>
@@ -7699,13 +8032,66 @@
             <a:spcAft>
               <a:spcPct val="15000"/>
             </a:spcAft>
-            <a:buChar char="••"/>
+            <a:buChar char="•"/>
           </a:pPr>
           <a:r>
-            <a:rPr lang="en-US" sz="4700" kern="1200" dirty="0" smtClean="0"/>
-            <a:t>&lt;description&gt;</a:t>
+            <a:rPr lang="en-US" sz="1900" kern="1200" dirty="0"/>
+            <a:t>ML trading strategies</a:t>
           </a:r>
-          <a:endParaRPr lang="en-US" sz="4700" kern="1200" dirty="0"/>
+        </a:p>
+        <a:p>
+          <a:pPr marL="171450" lvl="1" indent="-171450" algn="l" defTabSz="844550">
+            <a:lnSpc>
+              <a:spcPct val="90000"/>
+            </a:lnSpc>
+            <a:spcBef>
+              <a:spcPct val="0"/>
+            </a:spcBef>
+            <a:spcAft>
+              <a:spcPct val="15000"/>
+            </a:spcAft>
+            <a:buChar char="•"/>
+          </a:pPr>
+          <a:r>
+            <a:rPr lang="en-US" sz="1900" kern="1200" dirty="0"/>
+            <a:t>Backtesting strategies</a:t>
+          </a:r>
+        </a:p>
+        <a:p>
+          <a:pPr marL="171450" lvl="1" indent="-171450" algn="l" defTabSz="844550">
+            <a:lnSpc>
+              <a:spcPct val="90000"/>
+            </a:lnSpc>
+            <a:spcBef>
+              <a:spcPct val="0"/>
+            </a:spcBef>
+            <a:spcAft>
+              <a:spcPct val="15000"/>
+            </a:spcAft>
+            <a:buChar char="•"/>
+          </a:pPr>
+          <a:r>
+            <a:rPr lang="en-US" sz="1900" kern="1200" dirty="0"/>
+            <a:t>Plotting strategy results</a:t>
+          </a:r>
+        </a:p>
+        <a:p>
+          <a:pPr marL="171450" lvl="1" indent="-171450" algn="l" defTabSz="844550">
+            <a:lnSpc>
+              <a:spcPct val="90000"/>
+            </a:lnSpc>
+            <a:spcBef>
+              <a:spcPct val="0"/>
+            </a:spcBef>
+            <a:spcAft>
+              <a:spcPct val="15000"/>
+            </a:spcAft>
+            <a:buChar char="•"/>
+          </a:pPr>
+          <a:r>
+            <a:rPr lang="en-US" sz="1900" kern="1200" dirty="0"/>
+            <a:t>Sentiment Analysis</a:t>
+          </a:r>
         </a:p>
       </dsp:txBody>
       <dsp:txXfrm rot="-5400000">
@@ -7762,12 +8148,12 @@
         </a:fontRef>
       </dsp:style>
       <dsp:txBody>
-        <a:bodyPr spcFirstLastPara="0" vert="horz" wrap="square" lIns="129540" tIns="64770" rIns="129540" bIns="64770" numCol="1" spcCol="1270" anchor="ctr" anchorCtr="0">
+        <a:bodyPr spcFirstLastPara="0" vert="horz" wrap="square" lIns="118110" tIns="59055" rIns="118110" bIns="59055" numCol="1" spcCol="1270" anchor="ctr" anchorCtr="0">
           <a:noAutofit/>
         </a:bodyPr>
         <a:lstStyle/>
         <a:p>
-          <a:pPr lvl="0" algn="ctr" defTabSz="1511300">
+          <a:pPr marL="0" lvl="0" indent="0" algn="ctr" defTabSz="1377950">
             <a:lnSpc>
               <a:spcPct val="90000"/>
             </a:lnSpc>
@@ -7777,12 +8163,31 @@
             <a:spcAft>
               <a:spcPct val="35000"/>
             </a:spcAft>
+            <a:buNone/>
           </a:pPr>
           <a:r>
-            <a:rPr lang="en-US" sz="3400" kern="1200" dirty="0" err="1" smtClean="0"/>
+            <a:rPr lang="en-US" sz="3100" kern="1200" dirty="0"/>
+            <a:t>BackTrader/</a:t>
+          </a:r>
+        </a:p>
+        <a:p>
+          <a:pPr marL="0" lvl="0" indent="0" algn="ctr" defTabSz="1377950">
+            <a:lnSpc>
+              <a:spcPct val="90000"/>
+            </a:lnSpc>
+            <a:spcBef>
+              <a:spcPct val="0"/>
+            </a:spcBef>
+            <a:spcAft>
+              <a:spcPct val="35000"/>
+            </a:spcAft>
+            <a:buNone/>
+          </a:pPr>
+          <a:r>
+            <a:rPr lang="en-US" sz="3100" kern="1200" dirty="0" err="1"/>
             <a:t>Cerebro</a:t>
           </a:r>
-          <a:endParaRPr lang="en-US" sz="3400" kern="1200" dirty="0"/>
+          <a:endParaRPr lang="en-US" sz="3100" kern="1200" dirty="0"/>
         </a:p>
       </dsp:txBody>
       <dsp:txXfrm>
@@ -7797,7 +8202,7 @@
       </dsp:nvSpPr>
       <dsp:spPr>
         <a:xfrm rot="5400000">
-          <a:off x="3831377" y="2405838"/>
+          <a:off x="3831377" y="2397215"/>
           <a:ext cx="1395226" cy="4262579"/>
         </a:xfrm>
         <a:prstGeom prst="round2SameRect">
@@ -7841,12 +8246,12 @@
         <a:fontRef idx="minor"/>
       </dsp:style>
       <dsp:txBody>
-        <a:bodyPr spcFirstLastPara="0" vert="horz" wrap="square" lIns="179070" tIns="89535" rIns="179070" bIns="89535" numCol="1" spcCol="1270" anchor="ctr" anchorCtr="0">
+        <a:bodyPr spcFirstLastPara="0" vert="horz" wrap="square" lIns="72390" tIns="36195" rIns="72390" bIns="36195" numCol="1" spcCol="1270" anchor="ctr" anchorCtr="0">
           <a:noAutofit/>
         </a:bodyPr>
         <a:lstStyle/>
         <a:p>
-          <a:pPr marL="285750" lvl="1" indent="-285750" algn="l" defTabSz="2089150">
+          <a:pPr marL="171450" lvl="1" indent="-171450" algn="l" defTabSz="844550">
             <a:lnSpc>
               <a:spcPct val="90000"/>
             </a:lnSpc>
@@ -7856,17 +8261,52 @@
             <a:spcAft>
               <a:spcPct val="15000"/>
             </a:spcAft>
-            <a:buChar char="••"/>
+            <a:buChar char="•"/>
           </a:pPr>
           <a:r>
-            <a:rPr lang="en-US" sz="4700" kern="1200" dirty="0" smtClean="0"/>
-            <a:t>&lt;description&gt;</a:t>
+            <a:rPr lang="en-US" sz="1900" kern="1200" dirty="0"/>
+            <a:t>Identify Indicators</a:t>
           </a:r>
-          <a:endParaRPr lang="en-US" sz="4700" kern="1200" dirty="0"/>
+        </a:p>
+        <a:p>
+          <a:pPr marL="171450" lvl="1" indent="-171450" algn="l" defTabSz="844550">
+            <a:lnSpc>
+              <a:spcPct val="90000"/>
+            </a:lnSpc>
+            <a:spcBef>
+              <a:spcPct val="0"/>
+            </a:spcBef>
+            <a:spcAft>
+              <a:spcPct val="15000"/>
+            </a:spcAft>
+            <a:buChar char="•"/>
+          </a:pPr>
+          <a:r>
+            <a:rPr lang="en-US" sz="1900" kern="1200" dirty="0"/>
+            <a:t>Generate trading signals</a:t>
+          </a:r>
+        </a:p>
+        <a:p>
+          <a:pPr marL="171450" lvl="1" indent="-171450" algn="l" defTabSz="844550">
+            <a:lnSpc>
+              <a:spcPct val="90000"/>
+            </a:lnSpc>
+            <a:spcBef>
+              <a:spcPct val="0"/>
+            </a:spcBef>
+            <a:spcAft>
+              <a:spcPct val="15000"/>
+            </a:spcAft>
+            <a:buChar char="•"/>
+          </a:pPr>
+          <a:r>
+            <a:rPr lang="en-US" sz="1900" kern="1200" dirty="0"/>
+            <a:t>Backtesting</a:t>
+          </a:r>
         </a:p>
       </dsp:txBody>
       <dsp:txXfrm rot="-5400000">
-        <a:off x="2397701" y="3907624"/>
+        <a:off x="2397701" y="3899001"/>
         <a:ext cx="4194470" cy="1259008"/>
       </dsp:txXfrm>
     </dsp:sp>
@@ -7919,12 +8359,12 @@
         </a:fontRef>
       </dsp:style>
       <dsp:txBody>
-        <a:bodyPr spcFirstLastPara="0" vert="horz" wrap="square" lIns="129540" tIns="64770" rIns="129540" bIns="64770" numCol="1" spcCol="1270" anchor="ctr" anchorCtr="0">
+        <a:bodyPr spcFirstLastPara="0" vert="horz" wrap="square" lIns="118110" tIns="59055" rIns="118110" bIns="59055" numCol="1" spcCol="1270" anchor="ctr" anchorCtr="0">
           <a:noAutofit/>
         </a:bodyPr>
         <a:lstStyle/>
         <a:p>
-          <a:pPr lvl="0" algn="ctr" defTabSz="1511300">
+          <a:pPr marL="0" lvl="0" indent="0" algn="ctr" defTabSz="1377950">
             <a:lnSpc>
               <a:spcPct val="90000"/>
             </a:lnSpc>
@@ -7934,12 +8374,12 @@
             <a:spcAft>
               <a:spcPct val="35000"/>
             </a:spcAft>
+            <a:buNone/>
           </a:pPr>
           <a:r>
-            <a:rPr lang="en-US" sz="3400" kern="1200" dirty="0" smtClean="0"/>
+            <a:rPr lang="en-US" sz="3100" kern="1200" dirty="0"/>
             <a:t>Custom</a:t>
           </a:r>
-          <a:endParaRPr lang="en-US" sz="3400" kern="1200" dirty="0"/>
         </a:p>
       </dsp:txBody>
       <dsp:txXfrm>
@@ -8228,7 +8668,7 @@
   </dgm:layoutNode>
   <dgm:extLst>
     <a:ext uri="{68A01E43-0DF5-4B5B-8FA6-DAF915123BFB}">
-      <dgm1612:lstStyle xmlns:dgm1612="http://schemas.microsoft.com/office/drawing/2016/12/diagram" xmlns="">
+      <dgm1612:lstStyle xmlns:dgm1612="http://schemas.microsoft.com/office/drawing/2016/12/diagram">
         <a:lvl1pPr>
           <a:lnSpc>
             <a:spcPct val="100000"/>
@@ -14216,7 +14656,7 @@
           <p:cNvPr id="2" name="Header Placeholder 1">
             <a:extLst>
               <a:ext uri="{FF2B5EF4-FFF2-40B4-BE49-F238E27FC236}">
-                <a16:creationId xmlns:a16="http://schemas.microsoft.com/office/drawing/2014/main" xmlns="" id="{D3A62EC2-9403-4E3F-B9EE-AC16CAC60FB6}"/>
+                <a16:creationId xmlns:a16="http://schemas.microsoft.com/office/drawing/2014/main" id="{D3A62EC2-9403-4E3F-B9EE-AC16CAC60FB6}"/>
               </a:ext>
             </a:extLst>
           </p:cNvPr>
@@ -14253,7 +14693,7 @@
           <p:cNvPr id="3" name="Date Placeholder 2">
             <a:extLst>
               <a:ext uri="{FF2B5EF4-FFF2-40B4-BE49-F238E27FC236}">
-                <a16:creationId xmlns:a16="http://schemas.microsoft.com/office/drawing/2014/main" xmlns="" id="{FE89550C-613B-478E-B802-C73E62852423}"/>
+                <a16:creationId xmlns:a16="http://schemas.microsoft.com/office/drawing/2014/main" id="{FE89550C-613B-478E-B802-C73E62852423}"/>
               </a:ext>
             </a:extLst>
           </p:cNvPr>
@@ -14294,7 +14734,7 @@
           <p:cNvPr id="4" name="Footer Placeholder 3">
             <a:extLst>
               <a:ext uri="{FF2B5EF4-FFF2-40B4-BE49-F238E27FC236}">
-                <a16:creationId xmlns:a16="http://schemas.microsoft.com/office/drawing/2014/main" xmlns="" id="{D4013C7E-277B-477F-B8EF-FBEECB8A1FC4}"/>
+                <a16:creationId xmlns:a16="http://schemas.microsoft.com/office/drawing/2014/main" id="{D4013C7E-277B-477F-B8EF-FBEECB8A1FC4}"/>
               </a:ext>
             </a:extLst>
           </p:cNvPr>
@@ -14331,7 +14771,7 @@
           <p:cNvPr id="5" name="Slide Number Placeholder 4">
             <a:extLst>
               <a:ext uri="{FF2B5EF4-FFF2-40B4-BE49-F238E27FC236}">
-                <a16:creationId xmlns:a16="http://schemas.microsoft.com/office/drawing/2014/main" xmlns="" id="{66496058-9ECC-48B6-8A85-7E3A3E39E823}"/>
+                <a16:creationId xmlns:a16="http://schemas.microsoft.com/office/drawing/2014/main" id="{66496058-9ECC-48B6-8A85-7E3A3E39E823}"/>
               </a:ext>
             </a:extLst>
           </p:cNvPr>
@@ -14876,7 +15316,7 @@
           <a:p>
             <a:fld id="{CFED664B-377C-4B68-AF4E-EBDA643118DF}" type="slidenum">
               <a:rPr lang="en-US" smtClean="0"/>
-              <a:t>2</a:t>
+              <a:t>3</a:t>
             </a:fld>
             <a:endParaRPr lang="en-US" dirty="0"/>
           </a:p>
@@ -14960,7 +15400,7 @@
           <a:p>
             <a:fld id="{CFED664B-377C-4B68-AF4E-EBDA643118DF}" type="slidenum">
               <a:rPr lang="en-US" smtClean="0"/>
-              <a:t>4</a:t>
+              <a:t>5</a:t>
             </a:fld>
             <a:endParaRPr lang="en-US" dirty="0"/>
           </a:p>
@@ -15044,7 +15484,7 @@
           <a:p>
             <a:fld id="{CFED664B-377C-4B68-AF4E-EBDA643118DF}" type="slidenum">
               <a:rPr lang="en-US" smtClean="0"/>
-              <a:t>5</a:t>
+              <a:t>6</a:t>
             </a:fld>
             <a:endParaRPr lang="en-US" dirty="0"/>
           </a:p>
@@ -15128,7 +15568,7 @@
           <a:p>
             <a:fld id="{CFED664B-377C-4B68-AF4E-EBDA643118DF}" type="slidenum">
               <a:rPr lang="en-US" smtClean="0"/>
-              <a:t>6</a:t>
+              <a:t>7</a:t>
             </a:fld>
             <a:endParaRPr lang="en-US" dirty="0"/>
           </a:p>
@@ -15212,7 +15652,7 @@
           <a:p>
             <a:fld id="{CFED664B-377C-4B68-AF4E-EBDA643118DF}" type="slidenum">
               <a:rPr lang="en-US" smtClean="0"/>
-              <a:t>8</a:t>
+              <a:t>9</a:t>
             </a:fld>
             <a:endParaRPr lang="en-US" dirty="0"/>
           </a:p>
@@ -15295,7 +15735,7 @@
           </a:lstStyle>
           <a:p>
             <a:r>
-              <a:rPr lang="en-US" smtClean="0"/>
+              <a:rPr lang="en-US"/>
               <a:t>Click to edit Master title style</a:t>
             </a:r>
             <a:endParaRPr lang="en-US" dirty="0"/>
@@ -15370,7 +15810,7 @@
           </a:lstStyle>
           <a:p>
             <a:r>
-              <a:rPr lang="en-US" smtClean="0"/>
+              <a:rPr lang="en-US"/>
               <a:t>Click to edit Master subtitle style</a:t>
             </a:r>
             <a:endParaRPr lang="en-US" dirty="0"/>
@@ -15492,7 +15932,7 @@
           <a:lstStyle/>
           <a:p>
             <a:r>
-              <a:rPr lang="en-US" smtClean="0"/>
+              <a:rPr lang="en-US"/>
               <a:t>Click to edit Master title style</a:t>
             </a:r>
             <a:endParaRPr lang="en-US" dirty="0"/>
@@ -15516,35 +15956,35 @@
           <a:p>
             <a:pPr lvl="0"/>
             <a:r>
-              <a:rPr lang="en-US" smtClean="0"/>
+              <a:rPr lang="en-US"/>
               <a:t>Click to edit Master text styles</a:t>
             </a:r>
           </a:p>
           <a:p>
             <a:pPr lvl="1"/>
             <a:r>
-              <a:rPr lang="en-US" smtClean="0"/>
+              <a:rPr lang="en-US"/>
               <a:t>Second level</a:t>
             </a:r>
           </a:p>
           <a:p>
             <a:pPr lvl="2"/>
             <a:r>
-              <a:rPr lang="en-US" smtClean="0"/>
+              <a:rPr lang="en-US"/>
               <a:t>Third level</a:t>
             </a:r>
           </a:p>
           <a:p>
             <a:pPr lvl="3"/>
             <a:r>
-              <a:rPr lang="en-US" smtClean="0"/>
+              <a:rPr lang="en-US"/>
               <a:t>Fourth level</a:t>
             </a:r>
           </a:p>
           <a:p>
             <a:pPr lvl="4"/>
             <a:r>
-              <a:rPr lang="en-US" smtClean="0"/>
+              <a:rPr lang="en-US"/>
               <a:t>Fifth level</a:t>
             </a:r>
             <a:endParaRPr lang="en-US" dirty="0"/>
@@ -15671,7 +16111,7 @@
           <a:lstStyle/>
           <a:p>
             <a:r>
-              <a:rPr lang="en-US" smtClean="0"/>
+              <a:rPr lang="en-US"/>
               <a:t>Click to edit Master title style</a:t>
             </a:r>
             <a:endParaRPr lang="en-US" dirty="0"/>
@@ -15700,35 +16140,35 @@
           <a:p>
             <a:pPr lvl="0"/>
             <a:r>
-              <a:rPr lang="en-US" smtClean="0"/>
+              <a:rPr lang="en-US"/>
               <a:t>Click to edit Master text styles</a:t>
             </a:r>
           </a:p>
           <a:p>
             <a:pPr lvl="1"/>
             <a:r>
-              <a:rPr lang="en-US" smtClean="0"/>
+              <a:rPr lang="en-US"/>
               <a:t>Second level</a:t>
             </a:r>
           </a:p>
           <a:p>
             <a:pPr lvl="2"/>
             <a:r>
-              <a:rPr lang="en-US" smtClean="0"/>
+              <a:rPr lang="en-US"/>
               <a:t>Third level</a:t>
             </a:r>
           </a:p>
           <a:p>
             <a:pPr lvl="3"/>
             <a:r>
-              <a:rPr lang="en-US" smtClean="0"/>
+              <a:rPr lang="en-US"/>
               <a:t>Fourth level</a:t>
             </a:r>
           </a:p>
           <a:p>
             <a:pPr lvl="4"/>
             <a:r>
-              <a:rPr lang="en-US" smtClean="0"/>
+              <a:rPr lang="en-US"/>
               <a:t>Fifth level</a:t>
             </a:r>
             <a:endParaRPr lang="en-US" dirty="0"/>
@@ -15850,7 +16290,7 @@
           <a:lstStyle/>
           <a:p>
             <a:r>
-              <a:rPr lang="en-US" smtClean="0"/>
+              <a:rPr lang="en-US"/>
               <a:t>Click to edit Master title style</a:t>
             </a:r>
             <a:endParaRPr lang="en-US" dirty="0"/>
@@ -15874,35 +16314,35 @@
           <a:p>
             <a:pPr lvl="0"/>
             <a:r>
-              <a:rPr lang="en-US" smtClean="0"/>
+              <a:rPr lang="en-US"/>
               <a:t>Click to edit Master text styles</a:t>
             </a:r>
           </a:p>
           <a:p>
             <a:pPr lvl="1"/>
             <a:r>
-              <a:rPr lang="en-US" smtClean="0"/>
+              <a:rPr lang="en-US"/>
               <a:t>Second level</a:t>
             </a:r>
           </a:p>
           <a:p>
             <a:pPr lvl="2"/>
             <a:r>
-              <a:rPr lang="en-US" smtClean="0"/>
+              <a:rPr lang="en-US"/>
               <a:t>Third level</a:t>
             </a:r>
           </a:p>
           <a:p>
             <a:pPr lvl="3"/>
             <a:r>
-              <a:rPr lang="en-US" smtClean="0"/>
+              <a:rPr lang="en-US"/>
               <a:t>Fourth level</a:t>
             </a:r>
           </a:p>
           <a:p>
             <a:pPr lvl="4"/>
             <a:r>
-              <a:rPr lang="en-US" smtClean="0"/>
+              <a:rPr lang="en-US"/>
               <a:t>Fifth level</a:t>
             </a:r>
             <a:endParaRPr lang="en-US" dirty="0"/>
@@ -16055,7 +16495,7 @@
           </a:lstStyle>
           <a:p>
             <a:r>
-              <a:rPr lang="en-US" smtClean="0"/>
+              <a:rPr lang="en-US"/>
               <a:t>Click to edit Master title style</a:t>
             </a:r>
             <a:endParaRPr lang="en-US" dirty="0"/>
@@ -16175,7 +16615,7 @@
           <a:p>
             <a:pPr lvl="0"/>
             <a:r>
-              <a:rPr lang="en-US" smtClean="0"/>
+              <a:rPr lang="en-US"/>
               <a:t>Click to edit Master text styles</a:t>
             </a:r>
           </a:p>
@@ -16296,7 +16736,7 @@
           <a:lstStyle/>
           <a:p>
             <a:r>
-              <a:rPr lang="en-US" smtClean="0"/>
+              <a:rPr lang="en-US"/>
               <a:t>Click to edit Master title style</a:t>
             </a:r>
             <a:endParaRPr lang="en-US" dirty="0"/>
@@ -16325,35 +16765,35 @@
           <a:p>
             <a:pPr lvl="0"/>
             <a:r>
-              <a:rPr lang="en-US" smtClean="0"/>
+              <a:rPr lang="en-US"/>
               <a:t>Click to edit Master text styles</a:t>
             </a:r>
           </a:p>
           <a:p>
             <a:pPr lvl="1"/>
             <a:r>
-              <a:rPr lang="en-US" smtClean="0"/>
+              <a:rPr lang="en-US"/>
               <a:t>Second level</a:t>
             </a:r>
           </a:p>
           <a:p>
             <a:pPr lvl="2"/>
             <a:r>
-              <a:rPr lang="en-US" smtClean="0"/>
+              <a:rPr lang="en-US"/>
               <a:t>Third level</a:t>
             </a:r>
           </a:p>
           <a:p>
             <a:pPr lvl="3"/>
             <a:r>
-              <a:rPr lang="en-US" smtClean="0"/>
+              <a:rPr lang="en-US"/>
               <a:t>Fourth level</a:t>
             </a:r>
           </a:p>
           <a:p>
             <a:pPr lvl="4"/>
             <a:r>
-              <a:rPr lang="en-US" smtClean="0"/>
+              <a:rPr lang="en-US"/>
               <a:t>Fifth level</a:t>
             </a:r>
             <a:endParaRPr lang="en-US" dirty="0"/>
@@ -16382,35 +16822,35 @@
           <a:p>
             <a:pPr lvl="0"/>
             <a:r>
-              <a:rPr lang="en-US" smtClean="0"/>
+              <a:rPr lang="en-US"/>
               <a:t>Click to edit Master text styles</a:t>
             </a:r>
           </a:p>
           <a:p>
             <a:pPr lvl="1"/>
             <a:r>
-              <a:rPr lang="en-US" smtClean="0"/>
+              <a:rPr lang="en-US"/>
               <a:t>Second level</a:t>
             </a:r>
           </a:p>
           <a:p>
             <a:pPr lvl="2"/>
             <a:r>
-              <a:rPr lang="en-US" smtClean="0"/>
+              <a:rPr lang="en-US"/>
               <a:t>Third level</a:t>
             </a:r>
           </a:p>
           <a:p>
             <a:pPr lvl="3"/>
             <a:r>
-              <a:rPr lang="en-US" smtClean="0"/>
+              <a:rPr lang="en-US"/>
               <a:t>Fourth level</a:t>
             </a:r>
           </a:p>
           <a:p>
             <a:pPr lvl="4"/>
             <a:r>
-              <a:rPr lang="en-US" smtClean="0"/>
+              <a:rPr lang="en-US"/>
               <a:t>Fifth level</a:t>
             </a:r>
             <a:endParaRPr lang="en-US" dirty="0"/>
@@ -16583,7 +17023,7 @@
           <a:p>
             <a:pPr lvl="0"/>
             <a:r>
-              <a:rPr lang="en-US" smtClean="0"/>
+              <a:rPr lang="en-US"/>
               <a:t>Click to edit Master text styles</a:t>
             </a:r>
           </a:p>
@@ -16611,35 +17051,35 @@
           <a:p>
             <a:pPr lvl="0"/>
             <a:r>
-              <a:rPr lang="en-US" smtClean="0"/>
+              <a:rPr lang="en-US"/>
               <a:t>Click to edit Master text styles</a:t>
             </a:r>
           </a:p>
           <a:p>
             <a:pPr lvl="1"/>
             <a:r>
-              <a:rPr lang="en-US" smtClean="0"/>
+              <a:rPr lang="en-US"/>
               <a:t>Second level</a:t>
             </a:r>
           </a:p>
           <a:p>
             <a:pPr lvl="2"/>
             <a:r>
-              <a:rPr lang="en-US" smtClean="0"/>
+              <a:rPr lang="en-US"/>
               <a:t>Third level</a:t>
             </a:r>
           </a:p>
           <a:p>
             <a:pPr lvl="3"/>
             <a:r>
-              <a:rPr lang="en-US" smtClean="0"/>
+              <a:rPr lang="en-US"/>
               <a:t>Fourth level</a:t>
             </a:r>
           </a:p>
           <a:p>
             <a:pPr lvl="4"/>
             <a:r>
-              <a:rPr lang="en-US" smtClean="0"/>
+              <a:rPr lang="en-US"/>
               <a:t>Fifth level</a:t>
             </a:r>
             <a:endParaRPr lang="en-US" dirty="0"/>
@@ -16672,35 +17112,35 @@
           <a:p>
             <a:pPr lvl="0"/>
             <a:r>
-              <a:rPr lang="en-US" smtClean="0"/>
+              <a:rPr lang="en-US"/>
               <a:t>Click to edit Master text styles</a:t>
             </a:r>
           </a:p>
           <a:p>
             <a:pPr lvl="1"/>
             <a:r>
-              <a:rPr lang="en-US" smtClean="0"/>
+              <a:rPr lang="en-US"/>
               <a:t>Second level</a:t>
             </a:r>
           </a:p>
           <a:p>
             <a:pPr lvl="2"/>
             <a:r>
-              <a:rPr lang="en-US" smtClean="0"/>
+              <a:rPr lang="en-US"/>
               <a:t>Third level</a:t>
             </a:r>
           </a:p>
           <a:p>
             <a:pPr lvl="3"/>
             <a:r>
-              <a:rPr lang="en-US" smtClean="0"/>
+              <a:rPr lang="en-US"/>
               <a:t>Fourth level</a:t>
             </a:r>
           </a:p>
           <a:p>
             <a:pPr lvl="4"/>
             <a:r>
-              <a:rPr lang="en-US" smtClean="0"/>
+              <a:rPr lang="en-US"/>
               <a:t>Fifth level</a:t>
             </a:r>
             <a:endParaRPr lang="en-US" dirty="0"/>
@@ -16774,7 +17214,7 @@
           <a:p>
             <a:pPr lvl="0"/>
             <a:r>
-              <a:rPr lang="en-US" smtClean="0"/>
+              <a:rPr lang="en-US"/>
               <a:t>Click to edit Master text styles</a:t>
             </a:r>
           </a:p>
@@ -16866,7 +17306,7 @@
           <a:lstStyle/>
           <a:p>
             <a:r>
-              <a:rPr lang="en-US" smtClean="0"/>
+              <a:rPr lang="en-US"/>
               <a:t>Click to edit Master title style</a:t>
             </a:r>
             <a:endParaRPr lang="en-US" dirty="0"/>
@@ -16920,7 +17360,7 @@
           <a:lstStyle/>
           <a:p>
             <a:r>
-              <a:rPr lang="en-US" smtClean="0"/>
+              <a:rPr lang="en-US"/>
               <a:t>Click to edit Master title style</a:t>
             </a:r>
             <a:endParaRPr lang="en-US" dirty="0"/>
@@ -17202,7 +17642,7 @@
           </a:lstStyle>
           <a:p>
             <a:r>
-              <a:rPr lang="en-US" smtClean="0"/>
+              <a:rPr lang="en-US"/>
               <a:t>Click to edit Master title style</a:t>
             </a:r>
             <a:endParaRPr lang="en-US" dirty="0"/>
@@ -17281,35 +17721,35 @@
           <a:p>
             <a:pPr lvl="0"/>
             <a:r>
-              <a:rPr lang="en-US" smtClean="0"/>
+              <a:rPr lang="en-US"/>
               <a:t>Click to edit Master text styles</a:t>
             </a:r>
           </a:p>
           <a:p>
             <a:pPr lvl="1"/>
             <a:r>
-              <a:rPr lang="en-US" smtClean="0"/>
+              <a:rPr lang="en-US"/>
               <a:t>Second level</a:t>
             </a:r>
           </a:p>
           <a:p>
             <a:pPr lvl="2"/>
             <a:r>
-              <a:rPr lang="en-US" smtClean="0"/>
+              <a:rPr lang="en-US"/>
               <a:t>Third level</a:t>
             </a:r>
           </a:p>
           <a:p>
             <a:pPr lvl="3"/>
             <a:r>
-              <a:rPr lang="en-US" smtClean="0"/>
+              <a:rPr lang="en-US"/>
               <a:t>Fourth level</a:t>
             </a:r>
           </a:p>
           <a:p>
             <a:pPr lvl="4"/>
             <a:r>
-              <a:rPr lang="en-US" smtClean="0"/>
+              <a:rPr lang="en-US"/>
               <a:t>Fifth level</a:t>
             </a:r>
             <a:endParaRPr lang="en-US" dirty="0"/>
@@ -17381,7 +17821,7 @@
           <a:p>
             <a:pPr lvl="0"/>
             <a:r>
-              <a:rPr lang="en-US" smtClean="0"/>
+              <a:rPr lang="en-US"/>
               <a:t>Click to edit Master text styles</a:t>
             </a:r>
           </a:p>
@@ -17578,7 +18018,7 @@
           </a:lstStyle>
           <a:p>
             <a:r>
-              <a:rPr lang="en-US" smtClean="0"/>
+              <a:rPr lang="en-US"/>
               <a:t>Click to edit Master title style</a:t>
             </a:r>
             <a:endParaRPr lang="en-US" dirty="0"/>
@@ -17655,7 +18095,7 @@
           </a:lstStyle>
           <a:p>
             <a:r>
-              <a:rPr lang="en-US" smtClean="0"/>
+              <a:rPr lang="en-US"/>
               <a:t>Click icon to add picture</a:t>
             </a:r>
             <a:endParaRPr lang="en-US" dirty="0"/>
@@ -17727,7 +18167,7 @@
           <a:p>
             <a:pPr lvl="0"/>
             <a:r>
-              <a:rPr lang="en-US" smtClean="0"/>
+              <a:rPr lang="en-US"/>
               <a:t>Click to edit Master text styles</a:t>
             </a:r>
           </a:p>
@@ -17907,7 +18347,7 @@
           <a:lstStyle/>
           <a:p>
             <a:r>
-              <a:rPr lang="en-US" smtClean="0"/>
+              <a:rPr lang="en-US"/>
               <a:t>Click to edit Master title style</a:t>
             </a:r>
             <a:endParaRPr lang="en-US" dirty="0"/>
@@ -17941,35 +18381,35 @@
           <a:p>
             <a:pPr lvl="0"/>
             <a:r>
-              <a:rPr lang="en-US" smtClean="0"/>
+              <a:rPr lang="en-US"/>
               <a:t>Click to edit Master text styles</a:t>
             </a:r>
           </a:p>
           <a:p>
             <a:pPr lvl="1"/>
             <a:r>
-              <a:rPr lang="en-US" smtClean="0"/>
+              <a:rPr lang="en-US"/>
               <a:t>Second level</a:t>
             </a:r>
           </a:p>
           <a:p>
             <a:pPr lvl="2"/>
             <a:r>
-              <a:rPr lang="en-US" smtClean="0"/>
+              <a:rPr lang="en-US"/>
               <a:t>Third level</a:t>
             </a:r>
           </a:p>
           <a:p>
             <a:pPr lvl="3"/>
             <a:r>
-              <a:rPr lang="en-US" smtClean="0"/>
+              <a:rPr lang="en-US"/>
               <a:t>Fourth level</a:t>
             </a:r>
           </a:p>
           <a:p>
             <a:pPr lvl="4"/>
             <a:r>
-              <a:rPr lang="en-US" smtClean="0"/>
+              <a:rPr lang="en-US"/>
               <a:t>Fifth level</a:t>
             </a:r>
             <a:endParaRPr lang="en-US" dirty="0"/>
@@ -18482,10 +18922,10 @@
           <p:cNvPr id="10" name="Rectangle 9">
             <a:extLst>
               <a:ext uri="{FF2B5EF4-FFF2-40B4-BE49-F238E27FC236}">
-                <a16:creationId xmlns:a16="http://schemas.microsoft.com/office/drawing/2014/main" xmlns="" id="{6981E6A2-4656-4CFE-9BF4-39D81EE2CA9B}"/>
+                <a16:creationId xmlns:a16="http://schemas.microsoft.com/office/drawing/2014/main" id="{6981E6A2-4656-4CFE-9BF4-39D81EE2CA9B}"/>
               </a:ext>
               <a:ext uri="{C183D7F6-B498-43B3-948B-1728B52AA6E4}">
-                <adec:decorative xmlns:adec="http://schemas.microsoft.com/office/drawing/2017/decorative" xmlns="" val="1"/>
+                <adec:decorative xmlns:adec="http://schemas.microsoft.com/office/drawing/2017/decorative" val="1"/>
               </a:ext>
             </a:extLst>
           </p:cNvPr>
@@ -18495,7 +18935,7 @@
           <p:nvPr>
             <p:extLst>
               <p:ext uri="{386F3935-93C4-4BCD-93E2-E3B085C9AB24}">
-                <p16:designElem xmlns:p16="http://schemas.microsoft.com/office/powerpoint/2015/main" xmlns="" val="1"/>
+                <p16:designElem xmlns:p16="http://schemas.microsoft.com/office/powerpoint/2015/main" val="1"/>
               </p:ext>
             </p:extLst>
           </p:nvPr>
@@ -18577,7 +19017,7 @@
           <p:cNvPr id="2" name="Title 1">
             <a:extLst>
               <a:ext uri="{FF2B5EF4-FFF2-40B4-BE49-F238E27FC236}">
-                <a16:creationId xmlns:a16="http://schemas.microsoft.com/office/drawing/2014/main" xmlns="" id="{050E78D6-F072-48E7-8270-20EFBDD26F36}"/>
+                <a16:creationId xmlns:a16="http://schemas.microsoft.com/office/drawing/2014/main" id="{050E78D6-F072-48E7-8270-20EFBDD26F36}"/>
               </a:ext>
             </a:extLst>
           </p:cNvPr>
@@ -18614,7 +19054,7 @@
           <a:lstStyle/>
           <a:p>
             <a:r>
-              <a:rPr lang="en-US" sz="3000" dirty="0" smtClean="0">
+              <a:rPr lang="en-US" sz="3000" dirty="0">
                 <a:solidFill>
                   <a:srgbClr val="00B0F0"/>
                 </a:solidFill>
@@ -18622,18 +19062,13 @@
               <a:t>MEGA SHARKS </a:t>
             </a:r>
             <a:r>
-              <a:rPr lang="en-US" sz="3000" dirty="0" smtClean="0">
+              <a:rPr lang="en-US" sz="3000" dirty="0">
                 <a:solidFill>
                   <a:schemeClr val="tx1"/>
                 </a:solidFill>
               </a:rPr>
               <a:t>TRADING STRATEGY EVALUATOR</a:t>
             </a:r>
-            <a:endParaRPr lang="en-US" sz="3000" dirty="0">
-              <a:solidFill>
-                <a:schemeClr val="tx1"/>
-              </a:solidFill>
-            </a:endParaRPr>
           </a:p>
         </p:txBody>
       </p:sp>
@@ -18642,7 +19077,7 @@
           <p:cNvPr id="3" name="Subtitle 2">
             <a:extLst>
               <a:ext uri="{FF2B5EF4-FFF2-40B4-BE49-F238E27FC236}">
-                <a16:creationId xmlns:a16="http://schemas.microsoft.com/office/drawing/2014/main" xmlns="" id="{3FC7BD98-5486-489C-BAA0-A69CEFF691B3}"/>
+                <a16:creationId xmlns:a16="http://schemas.microsoft.com/office/drawing/2014/main" id="{3FC7BD98-5486-489C-BAA0-A69CEFF691B3}"/>
               </a:ext>
             </a:extLst>
           </p:cNvPr>
@@ -18666,18 +19101,13 @@
           <a:lstStyle/>
           <a:p>
             <a:r>
-              <a:rPr lang="en-US" sz="1800" dirty="0" smtClean="0">
+              <a:rPr lang="en-US" sz="1800" dirty="0">
                 <a:solidFill>
                   <a:schemeClr val="accent1"/>
                 </a:solidFill>
               </a:rPr>
               <a:t>Dynamic Machine Learning-Based Stock Trading Model Evaluation</a:t>
             </a:r>
-            <a:endParaRPr lang="en-US" sz="1800" dirty="0">
-              <a:solidFill>
-                <a:schemeClr val="accent1"/>
-              </a:solidFill>
-            </a:endParaRPr>
           </a:p>
         </p:txBody>
       </p:sp>
@@ -18686,7 +19116,7 @@
           <p:cNvPr id="5" name="Picture 4" descr="Finance trade numbers">
             <a:extLst>
               <a:ext uri="{FF2B5EF4-FFF2-40B4-BE49-F238E27FC236}">
-                <a16:creationId xmlns:a16="http://schemas.microsoft.com/office/drawing/2014/main" xmlns="" id="{112B9624-F8A1-4831-AE43-1D9E266CFF3E}"/>
+                <a16:creationId xmlns:a16="http://schemas.microsoft.com/office/drawing/2014/main" id="{112B9624-F8A1-4831-AE43-1D9E266CFF3E}"/>
               </a:ext>
             </a:extLst>
           </p:cNvPr>
@@ -18726,17 +19156,82 @@
   <p:clrMapOvr>
     <a:masterClrMapping/>
   </p:clrMapOvr>
-  <p:timing>
-    <p:tnLst>
-      <p:par>
-        <p:cTn id="1" dur="indefinite" restart="never" nodeType="tmRoot"/>
-      </p:par>
-    </p:tnLst>
-  </p:timing>
 </p:sld>
 </file>
 
 <file path=ppt/slides/slide2.xml><?xml version="1.0" encoding="utf-8"?>
+<p:sld xmlns:a="http://schemas.openxmlformats.org/drawingml/2006/main" xmlns:r="http://schemas.openxmlformats.org/officeDocument/2006/relationships" xmlns:p="http://schemas.openxmlformats.org/presentationml/2006/main">
+  <p:cSld>
+    <p:bg>
+      <p:bgPr>
+        <a:solidFill>
+          <a:schemeClr val="bg1">
+            <a:lumMod val="95000"/>
+          </a:schemeClr>
+        </a:solidFill>
+        <a:effectLst/>
+      </p:bgPr>
+    </p:bg>
+    <p:spTree>
+      <p:nvGrpSpPr>
+        <p:cNvPr id="1" name=""/>
+        <p:cNvGrpSpPr/>
+        <p:nvPr/>
+      </p:nvGrpSpPr>
+      <p:grpSpPr>
+        <a:xfrm>
+          <a:off x="0" y="0"/>
+          <a:ext cx="0" cy="0"/>
+          <a:chOff x="0" y="0"/>
+          <a:chExt cx="0" cy="0"/>
+        </a:xfrm>
+      </p:grpSpPr>
+      <p:pic>
+        <p:nvPicPr>
+          <p:cNvPr id="4" name="Content Placeholder 3">
+            <a:extLst>
+              <a:ext uri="{FF2B5EF4-FFF2-40B4-BE49-F238E27FC236}">
+                <a16:creationId xmlns:a16="http://schemas.microsoft.com/office/drawing/2014/main" id="{7F9ACEE8-80F4-4602-BE12-2BF867B9C9B9}"/>
+              </a:ext>
+            </a:extLst>
+          </p:cNvPr>
+          <p:cNvPicPr>
+            <a:picLocks noGrp="1" noChangeAspect="1"/>
+          </p:cNvPicPr>
+          <p:nvPr>
+            <p:ph idx="1"/>
+          </p:nvPr>
+        </p:nvPicPr>
+        <p:blipFill>
+          <a:blip r:embed="rId2"/>
+          <a:stretch>
+            <a:fillRect/>
+          </a:stretch>
+        </p:blipFill>
+        <p:spPr>
+          <a:xfrm>
+            <a:off x="1609391" y="804334"/>
+            <a:ext cx="8973217" cy="5249332"/>
+          </a:xfrm>
+          <a:prstGeom prst="rect">
+            <a:avLst/>
+          </a:prstGeom>
+        </p:spPr>
+      </p:pic>
+    </p:spTree>
+    <p:extLst>
+      <p:ext uri="{BB962C8B-B14F-4D97-AF65-F5344CB8AC3E}">
+        <p14:creationId xmlns:p14="http://schemas.microsoft.com/office/powerpoint/2010/main" val="3274057386"/>
+      </p:ext>
+    </p:extLst>
+  </p:cSld>
+  <p:clrMapOvr>
+    <a:masterClrMapping/>
+  </p:clrMapOvr>
+</p:sld>
+</file>
+
+<file path=ppt/slides/slide3.xml><?xml version="1.0" encoding="utf-8"?>
 <p:sld xmlns:a="http://schemas.openxmlformats.org/drawingml/2006/main" xmlns:r="http://schemas.openxmlformats.org/officeDocument/2006/relationships" xmlns:p="http://schemas.openxmlformats.org/presentationml/2006/main">
   <p:cSld>
     <p:bg>
@@ -18766,10 +19261,10 @@
           <p:cNvPr id="10" name="Rectangle 9">
             <a:extLst>
               <a:ext uri="{FF2B5EF4-FFF2-40B4-BE49-F238E27FC236}">
-                <a16:creationId xmlns:a16="http://schemas.microsoft.com/office/drawing/2014/main" xmlns="" id="{93F0ADB5-A0B4-4B01-A8C4-FDC34CE22BD4}"/>
+                <a16:creationId xmlns:a16="http://schemas.microsoft.com/office/drawing/2014/main" id="{93F0ADB5-A0B4-4B01-A8C4-FDC34CE22BD4}"/>
               </a:ext>
               <a:ext uri="{C183D7F6-B498-43B3-948B-1728B52AA6E4}">
-                <adec:decorative xmlns:adec="http://schemas.microsoft.com/office/drawing/2017/decorative" xmlns="" val="1"/>
+                <adec:decorative xmlns:adec="http://schemas.microsoft.com/office/drawing/2017/decorative" val="1"/>
               </a:ext>
             </a:extLst>
           </p:cNvPr>
@@ -18779,7 +19274,7 @@
           <p:nvPr>
             <p:extLst>
               <p:ext uri="{386F3935-93C4-4BCD-93E2-E3B085C9AB24}">
-                <p16:designElem xmlns:p16="http://schemas.microsoft.com/office/powerpoint/2015/main" xmlns="" val="1"/>
+                <p16:designElem xmlns:p16="http://schemas.microsoft.com/office/powerpoint/2015/main" val="1"/>
               </p:ext>
             </p:extLst>
           </p:nvPr>
@@ -18826,10 +19321,10 @@
           <p:cNvPr id="12" name="Rectangle 11">
             <a:extLst>
               <a:ext uri="{FF2B5EF4-FFF2-40B4-BE49-F238E27FC236}">
-                <a16:creationId xmlns:a16="http://schemas.microsoft.com/office/drawing/2014/main" xmlns="" id="{AA6D0FDE-0241-4C21-A720-A69475358235}"/>
+                <a16:creationId xmlns:a16="http://schemas.microsoft.com/office/drawing/2014/main" id="{AA6D0FDE-0241-4C21-A720-A69475358235}"/>
               </a:ext>
               <a:ext uri="{C183D7F6-B498-43B3-948B-1728B52AA6E4}">
-                <adec:decorative xmlns:adec="http://schemas.microsoft.com/office/drawing/2017/decorative" xmlns="" val="1"/>
+                <adec:decorative xmlns:adec="http://schemas.microsoft.com/office/drawing/2017/decorative" val="1"/>
               </a:ext>
             </a:extLst>
           </p:cNvPr>
@@ -18839,7 +19334,7 @@
           <p:nvPr>
             <p:extLst>
               <p:ext uri="{386F3935-93C4-4BCD-93E2-E3B085C9AB24}">
-                <p16:designElem xmlns:p16="http://schemas.microsoft.com/office/powerpoint/2015/main" xmlns="" val="1"/>
+                <p16:designElem xmlns:p16="http://schemas.microsoft.com/office/powerpoint/2015/main" val="1"/>
               </p:ext>
             </p:extLst>
           </p:nvPr>
@@ -18890,7 +19385,7 @@
           <p:cNvPr id="2" name="Title 1">
             <a:extLst>
               <a:ext uri="{FF2B5EF4-FFF2-40B4-BE49-F238E27FC236}">
-                <a16:creationId xmlns:a16="http://schemas.microsoft.com/office/drawing/2014/main" xmlns="" id="{9C9DE503-F7C2-4A40-83F4-4DE931E7D9DE}"/>
+                <a16:creationId xmlns:a16="http://schemas.microsoft.com/office/drawing/2014/main" id="{9C9DE503-F7C2-4A40-83F4-4DE931E7D9DE}"/>
               </a:ext>
             </a:extLst>
           </p:cNvPr>
@@ -18927,7 +19422,7 @@
           <a:lstStyle/>
           <a:p>
             <a:r>
-              <a:rPr lang="en-US" dirty="0" smtClean="0">
+              <a:rPr lang="en-US" dirty="0">
                 <a:solidFill>
                   <a:schemeClr val="bg1"/>
                 </a:solidFill>
@@ -18935,41 +19430,20 @@
               <a:t>OBJECTIVE:</a:t>
             </a:r>
             <a:br>
-              <a:rPr lang="en-US" dirty="0" smtClean="0">
+              <a:rPr lang="en-US" dirty="0">
                 <a:solidFill>
                   <a:schemeClr val="bg1"/>
                 </a:solidFill>
               </a:rPr>
             </a:br>
             <a:r>
-              <a:rPr lang="en-US" dirty="0" smtClean="0">
-                <a:solidFill>
-                  <a:schemeClr val="bg1"/>
-                </a:solidFill>
-              </a:rPr>
-              <a:t>Because Investors Need </a:t>
-            </a:r>
-            <a:r>
               <a:rPr lang="en-US" dirty="0">
                 <a:solidFill>
                   <a:schemeClr val="bg1"/>
                 </a:solidFill>
               </a:rPr>
-              <a:t>to </a:t>
+              <a:t>To Remove all emotion in deciding …</a:t>
             </a:r>
-            <a:r>
-              <a:rPr lang="en-US" dirty="0" smtClean="0">
-                <a:solidFill>
-                  <a:schemeClr val="bg1"/>
-                </a:solidFill>
-              </a:rPr>
-              <a:t>know…</a:t>
-            </a:r>
-            <a:endParaRPr lang="en-US" dirty="0">
-              <a:solidFill>
-                <a:schemeClr val="bg1"/>
-              </a:solidFill>
-            </a:endParaRPr>
           </a:p>
         </p:txBody>
       </p:sp>
@@ -18978,7 +19452,7 @@
           <p:cNvPr id="4" name="Picture 3" descr="Finance trade numbers">
             <a:extLst>
               <a:ext uri="{FF2B5EF4-FFF2-40B4-BE49-F238E27FC236}">
-                <a16:creationId xmlns:a16="http://schemas.microsoft.com/office/drawing/2014/main" xmlns="" id="{32F354A1-38C7-4598-A0E1-7A286A3019B8}"/>
+                <a16:creationId xmlns:a16="http://schemas.microsoft.com/office/drawing/2014/main" id="{32F354A1-38C7-4598-A0E1-7A286A3019B8}"/>
               </a:ext>
             </a:extLst>
           </p:cNvPr>
@@ -19013,7 +19487,7 @@
           <p:cNvPr id="5" name="Content Placeholder 2" descr="Icon Bullets">
             <a:extLst>
               <a:ext uri="{FF2B5EF4-FFF2-40B4-BE49-F238E27FC236}">
-                <a16:creationId xmlns:a16="http://schemas.microsoft.com/office/drawing/2014/main" xmlns="" id="{51938B4F-26EE-4238-880D-3CE26A7E4AED}"/>
+                <a16:creationId xmlns:a16="http://schemas.microsoft.com/office/drawing/2014/main" id="{51938B4F-26EE-4238-880D-3CE26A7E4AED}"/>
               </a:ext>
             </a:extLst>
           </p:cNvPr>
@@ -19049,17 +19523,10 @@
   <p:clrMapOvr>
     <a:masterClrMapping/>
   </p:clrMapOvr>
-  <p:timing>
-    <p:tnLst>
-      <p:par>
-        <p:cTn id="1" dur="indefinite" restart="never" nodeType="tmRoot"/>
-      </p:par>
-    </p:tnLst>
-  </p:timing>
 </p:sld>
 </file>
 
-<file path=ppt/slides/slide3.xml><?xml version="1.0" encoding="utf-8"?>
+<file path=ppt/slides/slide4.xml><?xml version="1.0" encoding="utf-8"?>
 <p:sld xmlns:a="http://schemas.openxmlformats.org/drawingml/2006/main" xmlns:r="http://schemas.openxmlformats.org/officeDocument/2006/relationships" xmlns:p="http://schemas.openxmlformats.org/presentationml/2006/main">
   <p:cSld>
     <p:spTree>
@@ -19092,10 +19559,9 @@
           <a:lstStyle/>
           <a:p>
             <a:r>
-              <a:rPr lang="en-US" dirty="0" smtClean="0"/>
+              <a:rPr lang="en-US" dirty="0"/>
               <a:t>Agenda</a:t>
             </a:r>
-            <a:endParaRPr lang="en-US" dirty="0"/>
           </a:p>
         </p:txBody>
       </p:sp>
@@ -19109,7 +19575,7 @@
             <p:ph idx="1"/>
             <p:extLst>
               <p:ext uri="{D42A27DB-BD31-4B8C-83A1-F6EECF244321}">
-                <p14:modId xmlns:p14="http://schemas.microsoft.com/office/powerpoint/2010/main" val="1869235162"/>
+                <p14:modId xmlns:p14="http://schemas.microsoft.com/office/powerpoint/2010/main" val="2645194236"/>
               </p:ext>
             </p:extLst>
           </p:nvPr>
@@ -19125,8 +19591,20 @@
                 <a:tableStyleId>{5C22544A-7EE6-4342-B048-85BDC9FD1C3A}</a:tableStyleId>
               </a:tblPr>
               <a:tblGrid>
-                <a:gridCol w="2082770"/>
-                <a:gridCol w="5648356"/>
+                <a:gridCol w="2082770">
+                  <a:extLst>
+                    <a:ext uri="{9D8B030D-6E8A-4147-A177-3AD203B41FA5}">
+                      <a16:colId xmlns:a16="http://schemas.microsoft.com/office/drawing/2014/main" val="20000"/>
+                    </a:ext>
+                  </a:extLst>
+                </a:gridCol>
+                <a:gridCol w="5648356">
+                  <a:extLst>
+                    <a:ext uri="{9D8B030D-6E8A-4147-A177-3AD203B41FA5}">
+                      <a16:colId xmlns:a16="http://schemas.microsoft.com/office/drawing/2014/main" val="20001"/>
+                    </a:ext>
+                  </a:extLst>
+                </a:gridCol>
               </a:tblGrid>
               <a:tr h="370840">
                 <a:tc>
@@ -19135,10 +19613,9 @@
                     <a:lstStyle/>
                     <a:p>
                       <a:r>
-                        <a:rPr lang="en-US" dirty="0" smtClean="0"/>
+                        <a:rPr lang="en-US" dirty="0"/>
                         <a:t>Time (minutes)</a:t>
                       </a:r>
-                      <a:endParaRPr lang="en-US" dirty="0"/>
                     </a:p>
                   </a:txBody>
                   <a:tcPr/>
@@ -19149,14 +19626,18 @@
                     <a:lstStyle/>
                     <a:p>
                       <a:r>
-                        <a:rPr lang="en-US" dirty="0" smtClean="0"/>
+                        <a:rPr lang="en-US" dirty="0"/>
                         <a:t>Topic</a:t>
                       </a:r>
-                      <a:endParaRPr lang="en-US" dirty="0"/>
                     </a:p>
                   </a:txBody>
                   <a:tcPr/>
                 </a:tc>
+                <a:extLst>
+                  <a:ext uri="{0D108BD9-81ED-4DB2-BD59-A6C34878D82A}">
+                    <a16:rowId xmlns:a16="http://schemas.microsoft.com/office/drawing/2014/main" val="10000"/>
+                  </a:ext>
+                </a:extLst>
               </a:tr>
               <a:tr h="370840">
                 <a:tc>
@@ -19166,10 +19647,9 @@
                     <a:p>
                       <a:pPr algn="ctr"/>
                       <a:r>
-                        <a:rPr lang="en-US" dirty="0" smtClean="0"/>
+                        <a:rPr lang="en-US" dirty="0"/>
                         <a:t>1</a:t>
                       </a:r>
-                      <a:endParaRPr lang="en-US" dirty="0"/>
                     </a:p>
                   </a:txBody>
                   <a:tcPr/>
@@ -19180,14 +19660,18 @@
                     <a:lstStyle/>
                     <a:p>
                       <a:r>
-                        <a:rPr lang="en-US" dirty="0" smtClean="0"/>
+                        <a:rPr lang="en-US" dirty="0"/>
                         <a:t>Project Roadmap</a:t>
                       </a:r>
-                      <a:endParaRPr lang="en-US" dirty="0"/>
                     </a:p>
                   </a:txBody>
                   <a:tcPr/>
                 </a:tc>
+                <a:extLst>
+                  <a:ext uri="{0D108BD9-81ED-4DB2-BD59-A6C34878D82A}">
+                    <a16:rowId xmlns:a16="http://schemas.microsoft.com/office/drawing/2014/main" val="10001"/>
+                  </a:ext>
+                </a:extLst>
               </a:tr>
               <a:tr h="370840">
                 <a:tc>
@@ -19197,10 +19681,9 @@
                     <a:p>
                       <a:pPr algn="ctr"/>
                       <a:r>
-                        <a:rPr lang="en-US" dirty="0" smtClean="0"/>
-                        <a:t>2</a:t>
+                        <a:rPr lang="en-US" dirty="0"/>
+                        <a:t>1</a:t>
                       </a:r>
-                      <a:endParaRPr lang="en-US" dirty="0"/>
                     </a:p>
                   </a:txBody>
                   <a:tcPr/>
@@ -19211,14 +19694,18 @@
                     <a:lstStyle/>
                     <a:p>
                       <a:r>
-                        <a:rPr lang="en-US" dirty="0" smtClean="0"/>
+                        <a:rPr lang="en-US" dirty="0"/>
                         <a:t>Data Preparation</a:t>
                       </a:r>
-                      <a:endParaRPr lang="en-US" dirty="0"/>
                     </a:p>
                   </a:txBody>
                   <a:tcPr/>
                 </a:tc>
+                <a:extLst>
+                  <a:ext uri="{0D108BD9-81ED-4DB2-BD59-A6C34878D82A}">
+                    <a16:rowId xmlns:a16="http://schemas.microsoft.com/office/drawing/2014/main" val="10002"/>
+                  </a:ext>
+                </a:extLst>
               </a:tr>
               <a:tr h="370840">
                 <a:tc>
@@ -19228,10 +19715,9 @@
                     <a:p>
                       <a:pPr algn="ctr"/>
                       <a:r>
-                        <a:rPr lang="en-US" dirty="0" smtClean="0"/>
-                        <a:t>2</a:t>
+                        <a:rPr lang="en-US" dirty="0"/>
+                        <a:t>1</a:t>
                       </a:r>
-                      <a:endParaRPr lang="en-US" dirty="0"/>
                     </a:p>
                   </a:txBody>
                   <a:tcPr/>
@@ -19242,11 +19728,11 @@
                     <a:lstStyle/>
                     <a:p>
                       <a:r>
-                        <a:rPr lang="en-US" dirty="0" smtClean="0"/>
+                        <a:rPr lang="en-US" dirty="0"/>
                         <a:t>Machine</a:t>
                       </a:r>
                       <a:r>
-                        <a:rPr lang="en-US" baseline="0" dirty="0" smtClean="0"/>
+                        <a:rPr lang="en-US" baseline="0" dirty="0"/>
                         <a:t> Learning technology employed</a:t>
                       </a:r>
                       <a:endParaRPr lang="en-US" dirty="0"/>
@@ -19254,6 +19740,11 @@
                   </a:txBody>
                   <a:tcPr/>
                 </a:tc>
+                <a:extLst>
+                  <a:ext uri="{0D108BD9-81ED-4DB2-BD59-A6C34878D82A}">
+                    <a16:rowId xmlns:a16="http://schemas.microsoft.com/office/drawing/2014/main" val="10003"/>
+                  </a:ext>
+                </a:extLst>
               </a:tr>
               <a:tr h="370840">
                 <a:tc>
@@ -19263,10 +19754,9 @@
                     <a:p>
                       <a:pPr algn="ctr"/>
                       <a:r>
-                        <a:rPr lang="en-US" dirty="0" smtClean="0"/>
-                        <a:t>5</a:t>
+                        <a:rPr lang="en-US" dirty="0"/>
+                        <a:t>7</a:t>
                       </a:r>
-                      <a:endParaRPr lang="en-US" dirty="0"/>
                     </a:p>
                   </a:txBody>
                   <a:tcPr/>
@@ -19277,11 +19767,11 @@
                     <a:lstStyle/>
                     <a:p>
                       <a:r>
-                        <a:rPr lang="en-US" dirty="0" smtClean="0"/>
+                        <a:rPr lang="en-US" dirty="0"/>
                         <a:t>Live Demo: Meg</a:t>
                       </a:r>
                       <a:r>
-                        <a:rPr lang="en-US" baseline="0" dirty="0" smtClean="0"/>
+                        <a:rPr lang="en-US" baseline="0" dirty="0"/>
                         <a:t>a Sharks Trading Strategy Evaluator</a:t>
                       </a:r>
                       <a:endParaRPr lang="en-US" dirty="0"/>
@@ -19289,6 +19779,11 @@
                   </a:txBody>
                   <a:tcPr/>
                 </a:tc>
+                <a:extLst>
+                  <a:ext uri="{0D108BD9-81ED-4DB2-BD59-A6C34878D82A}">
+                    <a16:rowId xmlns:a16="http://schemas.microsoft.com/office/drawing/2014/main" val="10004"/>
+                  </a:ext>
+                </a:extLst>
               </a:tr>
             </a:tbl>
           </a:graphicData>
@@ -19304,17 +19799,10 @@
   <p:clrMapOvr>
     <a:masterClrMapping/>
   </p:clrMapOvr>
-  <p:timing>
-    <p:tnLst>
-      <p:par>
-        <p:cTn id="1" dur="indefinite" restart="never" nodeType="tmRoot"/>
-      </p:par>
-    </p:tnLst>
-  </p:timing>
 </p:sld>
 </file>
 
-<file path=ppt/slides/slide4.xml><?xml version="1.0" encoding="utf-8"?>
+<file path=ppt/slides/slide5.xml><?xml version="1.0" encoding="utf-8"?>
 <p:sld xmlns:a="http://schemas.openxmlformats.org/drawingml/2006/main" xmlns:r="http://schemas.openxmlformats.org/officeDocument/2006/relationships" xmlns:p="http://schemas.openxmlformats.org/presentationml/2006/main">
   <p:cSld>
     <p:bg>
@@ -19344,10 +19832,10 @@
           <p:cNvPr id="20" name="Rectangle 19">
             <a:extLst>
               <a:ext uri="{FF2B5EF4-FFF2-40B4-BE49-F238E27FC236}">
-                <a16:creationId xmlns:a16="http://schemas.microsoft.com/office/drawing/2014/main" xmlns="" id="{AA6D0FDE-0241-4C21-A720-A69475358235}"/>
+                <a16:creationId xmlns:a16="http://schemas.microsoft.com/office/drawing/2014/main" id="{AA6D0FDE-0241-4C21-A720-A69475358235}"/>
               </a:ext>
               <a:ext uri="{C183D7F6-B498-43B3-948B-1728B52AA6E4}">
-                <adec:decorative xmlns:adec="http://schemas.microsoft.com/office/drawing/2017/decorative" xmlns="" val="1"/>
+                <adec:decorative xmlns:adec="http://schemas.microsoft.com/office/drawing/2017/decorative" val="1"/>
               </a:ext>
             </a:extLst>
           </p:cNvPr>
@@ -19357,7 +19845,7 @@
           <p:nvPr>
             <p:extLst>
               <p:ext uri="{386F3935-93C4-4BCD-93E2-E3B085C9AB24}">
-                <p16:designElem xmlns:p16="http://schemas.microsoft.com/office/powerpoint/2015/main" xmlns="" val="1"/>
+                <p16:designElem xmlns:p16="http://schemas.microsoft.com/office/powerpoint/2015/main" val="1"/>
               </p:ext>
             </p:extLst>
           </p:nvPr>
@@ -19408,7 +19896,7 @@
           <p:cNvPr id="2" name="Title 1">
             <a:extLst>
               <a:ext uri="{FF2B5EF4-FFF2-40B4-BE49-F238E27FC236}">
-                <a16:creationId xmlns:a16="http://schemas.microsoft.com/office/drawing/2014/main" xmlns="" id="{15115107-5DA3-4397-A1DA-67705DAE1EC2}"/>
+                <a16:creationId xmlns:a16="http://schemas.microsoft.com/office/drawing/2014/main" id="{15115107-5DA3-4397-A1DA-67705DAE1EC2}"/>
               </a:ext>
             </a:extLst>
           </p:cNvPr>
@@ -19446,18 +19934,13 @@
           <a:lstStyle/>
           <a:p>
             <a:r>
-              <a:rPr lang="en-US" dirty="0" smtClean="0">
+              <a:rPr lang="en-US" dirty="0">
                 <a:solidFill>
                   <a:srgbClr val="FFFFFF"/>
                 </a:solidFill>
               </a:rPr>
               <a:t>Project Roadmap</a:t>
             </a:r>
-            <a:endParaRPr lang="en-US" dirty="0">
-              <a:solidFill>
-                <a:srgbClr val="FFFFFF"/>
-              </a:solidFill>
-            </a:endParaRPr>
           </a:p>
         </p:txBody>
       </p:sp>
@@ -19697,18 +20180,13 @@
           <a:lstStyle/>
           <a:p>
             <a:r>
-              <a:rPr lang="en-US" sz="3200" dirty="0" smtClean="0">
+              <a:rPr lang="en-US" sz="3200" dirty="0">
                 <a:solidFill>
                   <a:schemeClr val="accent5"/>
                 </a:solidFill>
               </a:rPr>
               <a:t>Milestone 1</a:t>
             </a:r>
-            <a:endParaRPr lang="en-US" sz="3200" dirty="0">
-              <a:solidFill>
-                <a:schemeClr val="accent5"/>
-              </a:solidFill>
-            </a:endParaRPr>
           </a:p>
         </p:txBody>
       </p:sp>
@@ -19735,18 +20213,13 @@
           <a:lstStyle/>
           <a:p>
             <a:r>
-              <a:rPr lang="en-US" sz="3200" dirty="0" smtClean="0">
+              <a:rPr lang="en-US" sz="3200" dirty="0">
                 <a:solidFill>
                   <a:schemeClr val="accent5"/>
                 </a:solidFill>
               </a:rPr>
               <a:t>Milestone 2</a:t>
             </a:r>
-            <a:endParaRPr lang="en-US" sz="3200" dirty="0">
-              <a:solidFill>
-                <a:schemeClr val="accent5"/>
-              </a:solidFill>
-            </a:endParaRPr>
           </a:p>
         </p:txBody>
       </p:sp>
@@ -19773,10 +20246,9 @@
           <a:lstStyle/>
           <a:p>
             <a:r>
-              <a:rPr lang="en-US" sz="1400" dirty="0" smtClean="0"/>
+              <a:rPr lang="en-US" sz="1400" dirty="0"/>
               <a:t>Conception</a:t>
             </a:r>
-            <a:endParaRPr lang="en-US" sz="1400" dirty="0"/>
           </a:p>
         </p:txBody>
       </p:sp>
@@ -19803,10 +20275,9 @@
           <a:lstStyle/>
           <a:p>
             <a:r>
-              <a:rPr lang="en-US" sz="1400" dirty="0" smtClean="0"/>
+              <a:rPr lang="en-US" sz="1400" dirty="0"/>
               <a:t>Commercialization</a:t>
             </a:r>
-            <a:endParaRPr lang="en-US" sz="1400" dirty="0"/>
           </a:p>
         </p:txBody>
       </p:sp>
@@ -19820,17 +20291,10 @@
   <p:clrMapOvr>
     <a:masterClrMapping/>
   </p:clrMapOvr>
-  <p:timing>
-    <p:tnLst>
-      <p:par>
-        <p:cTn id="1" dur="indefinite" restart="never" nodeType="tmRoot"/>
-      </p:par>
-    </p:tnLst>
-  </p:timing>
 </p:sld>
 </file>
 
-<file path=ppt/slides/slide5.xml><?xml version="1.0" encoding="utf-8"?>
+<file path=ppt/slides/slide6.xml><?xml version="1.0" encoding="utf-8"?>
 <p:sld xmlns:a="http://schemas.openxmlformats.org/drawingml/2006/main" xmlns:r="http://schemas.openxmlformats.org/officeDocument/2006/relationships" xmlns:p="http://schemas.openxmlformats.org/presentationml/2006/main">
   <p:cSld>
     <p:spTree>
@@ -19852,10 +20316,10 @@
           <p:cNvPr id="18" name="Rectangle 17">
             <a:extLst>
               <a:ext uri="{FF2B5EF4-FFF2-40B4-BE49-F238E27FC236}">
-                <a16:creationId xmlns:a16="http://schemas.microsoft.com/office/drawing/2014/main" xmlns="" id="{93F0ADB5-A0B4-4B01-A8C4-FDC34CE22BD4}"/>
+                <a16:creationId xmlns:a16="http://schemas.microsoft.com/office/drawing/2014/main" id="{93F0ADB5-A0B4-4B01-A8C4-FDC34CE22BD4}"/>
               </a:ext>
               <a:ext uri="{C183D7F6-B498-43B3-948B-1728B52AA6E4}">
-                <adec:decorative xmlns:adec="http://schemas.microsoft.com/office/drawing/2017/decorative" xmlns="" val="1"/>
+                <adec:decorative xmlns:adec="http://schemas.microsoft.com/office/drawing/2017/decorative" val="1"/>
               </a:ext>
             </a:extLst>
           </p:cNvPr>
@@ -19865,7 +20329,7 @@
           <p:nvPr>
             <p:extLst>
               <p:ext uri="{386F3935-93C4-4BCD-93E2-E3B085C9AB24}">
-                <p16:designElem xmlns:p16="http://schemas.microsoft.com/office/powerpoint/2015/main" xmlns="" val="1"/>
+                <p16:designElem xmlns:p16="http://schemas.microsoft.com/office/powerpoint/2015/main" val="1"/>
               </p:ext>
             </p:extLst>
           </p:nvPr>
@@ -19912,10 +20376,10 @@
           <p:cNvPr id="20" name="Rectangle 19">
             <a:extLst>
               <a:ext uri="{FF2B5EF4-FFF2-40B4-BE49-F238E27FC236}">
-                <a16:creationId xmlns:a16="http://schemas.microsoft.com/office/drawing/2014/main" xmlns="" id="{AA6D0FDE-0241-4C21-A720-A69475358235}"/>
+                <a16:creationId xmlns:a16="http://schemas.microsoft.com/office/drawing/2014/main" id="{AA6D0FDE-0241-4C21-A720-A69475358235}"/>
               </a:ext>
               <a:ext uri="{C183D7F6-B498-43B3-948B-1728B52AA6E4}">
-                <adec:decorative xmlns:adec="http://schemas.microsoft.com/office/drawing/2017/decorative" xmlns="" val="1"/>
+                <adec:decorative xmlns:adec="http://schemas.microsoft.com/office/drawing/2017/decorative" val="1"/>
               </a:ext>
             </a:extLst>
           </p:cNvPr>
@@ -19925,7 +20389,7 @@
           <p:nvPr>
             <p:extLst>
               <p:ext uri="{386F3935-93C4-4BCD-93E2-E3B085C9AB24}">
-                <p16:designElem xmlns:p16="http://schemas.microsoft.com/office/powerpoint/2015/main" xmlns="" val="1"/>
+                <p16:designElem xmlns:p16="http://schemas.microsoft.com/office/powerpoint/2015/main" val="1"/>
               </p:ext>
             </p:extLst>
           </p:nvPr>
@@ -19976,7 +20440,7 @@
           <p:cNvPr id="2" name="Title 1">
             <a:extLst>
               <a:ext uri="{FF2B5EF4-FFF2-40B4-BE49-F238E27FC236}">
-                <a16:creationId xmlns:a16="http://schemas.microsoft.com/office/drawing/2014/main" xmlns="" id="{15115107-5DA3-4397-A1DA-67705DAE1EC2}"/>
+                <a16:creationId xmlns:a16="http://schemas.microsoft.com/office/drawing/2014/main" id="{15115107-5DA3-4397-A1DA-67705DAE1EC2}"/>
               </a:ext>
             </a:extLst>
           </p:cNvPr>
@@ -20014,18 +20478,13 @@
           <a:lstStyle/>
           <a:p>
             <a:r>
-              <a:rPr lang="en-US" dirty="0" smtClean="0">
+              <a:rPr lang="en-US" dirty="0">
                 <a:solidFill>
                   <a:srgbClr val="FFFFFF"/>
                 </a:solidFill>
               </a:rPr>
               <a:t>Data Collection &amp;  Preparation</a:t>
             </a:r>
-            <a:endParaRPr lang="en-US" dirty="0">
-              <a:solidFill>
-                <a:srgbClr val="FFFFFF"/>
-              </a:solidFill>
-            </a:endParaRPr>
           </a:p>
         </p:txBody>
       </p:sp>
@@ -20039,7 +20498,7 @@
             <p:ph idx="1"/>
             <p:extLst>
               <p:ext uri="{D42A27DB-BD31-4B8C-83A1-F6EECF244321}">
-                <p14:modId xmlns:p14="http://schemas.microsoft.com/office/powerpoint/2010/main" val="1431573817"/>
+                <p14:modId xmlns:p14="http://schemas.microsoft.com/office/powerpoint/2010/main" val="4153820459"/>
               </p:ext>
             </p:extLst>
           </p:nvPr>
@@ -20064,17 +20523,10 @@
   <p:clrMapOvr>
     <a:masterClrMapping/>
   </p:clrMapOvr>
-  <p:timing>
-    <p:tnLst>
-      <p:par>
-        <p:cTn id="1" dur="indefinite" restart="never" nodeType="tmRoot"/>
-      </p:par>
-    </p:tnLst>
-  </p:timing>
 </p:sld>
 </file>
 
-<file path=ppt/slides/slide6.xml><?xml version="1.0" encoding="utf-8"?>
+<file path=ppt/slides/slide7.xml><?xml version="1.0" encoding="utf-8"?>
 <p:sld xmlns:a="http://schemas.openxmlformats.org/drawingml/2006/main" xmlns:r="http://schemas.openxmlformats.org/officeDocument/2006/relationships" xmlns:p="http://schemas.openxmlformats.org/presentationml/2006/main">
   <p:cSld>
     <p:spTree>
@@ -20096,10 +20548,10 @@
           <p:cNvPr id="18" name="Rectangle 17">
             <a:extLst>
               <a:ext uri="{FF2B5EF4-FFF2-40B4-BE49-F238E27FC236}">
-                <a16:creationId xmlns:a16="http://schemas.microsoft.com/office/drawing/2014/main" xmlns="" id="{93F0ADB5-A0B4-4B01-A8C4-FDC34CE22BD4}"/>
+                <a16:creationId xmlns:a16="http://schemas.microsoft.com/office/drawing/2014/main" id="{93F0ADB5-A0B4-4B01-A8C4-FDC34CE22BD4}"/>
               </a:ext>
               <a:ext uri="{C183D7F6-B498-43B3-948B-1728B52AA6E4}">
-                <adec:decorative xmlns:adec="http://schemas.microsoft.com/office/drawing/2017/decorative" xmlns="" val="1"/>
+                <adec:decorative xmlns:adec="http://schemas.microsoft.com/office/drawing/2017/decorative" val="1"/>
               </a:ext>
             </a:extLst>
           </p:cNvPr>
@@ -20109,7 +20561,7 @@
           <p:nvPr>
             <p:extLst>
               <p:ext uri="{386F3935-93C4-4BCD-93E2-E3B085C9AB24}">
-                <p16:designElem xmlns:p16="http://schemas.microsoft.com/office/powerpoint/2015/main" xmlns="" val="1"/>
+                <p16:designElem xmlns:p16="http://schemas.microsoft.com/office/powerpoint/2015/main" val="1"/>
               </p:ext>
             </p:extLst>
           </p:nvPr>
@@ -20156,10 +20608,10 @@
           <p:cNvPr id="20" name="Rectangle 19">
             <a:extLst>
               <a:ext uri="{FF2B5EF4-FFF2-40B4-BE49-F238E27FC236}">
-                <a16:creationId xmlns:a16="http://schemas.microsoft.com/office/drawing/2014/main" xmlns="" id="{AA6D0FDE-0241-4C21-A720-A69475358235}"/>
+                <a16:creationId xmlns:a16="http://schemas.microsoft.com/office/drawing/2014/main" id="{AA6D0FDE-0241-4C21-A720-A69475358235}"/>
               </a:ext>
               <a:ext uri="{C183D7F6-B498-43B3-948B-1728B52AA6E4}">
-                <adec:decorative xmlns:adec="http://schemas.microsoft.com/office/drawing/2017/decorative" xmlns="" val="1"/>
+                <adec:decorative xmlns:adec="http://schemas.microsoft.com/office/drawing/2017/decorative" val="1"/>
               </a:ext>
             </a:extLst>
           </p:cNvPr>
@@ -20169,7 +20621,7 @@
           <p:nvPr>
             <p:extLst>
               <p:ext uri="{386F3935-93C4-4BCD-93E2-E3B085C9AB24}">
-                <p16:designElem xmlns:p16="http://schemas.microsoft.com/office/powerpoint/2015/main" xmlns="" val="1"/>
+                <p16:designElem xmlns:p16="http://schemas.microsoft.com/office/powerpoint/2015/main" val="1"/>
               </p:ext>
             </p:extLst>
           </p:nvPr>
@@ -20220,7 +20672,7 @@
           <p:cNvPr id="2" name="Title 1">
             <a:extLst>
               <a:ext uri="{FF2B5EF4-FFF2-40B4-BE49-F238E27FC236}">
-                <a16:creationId xmlns:a16="http://schemas.microsoft.com/office/drawing/2014/main" xmlns="" id="{15115107-5DA3-4397-A1DA-67705DAE1EC2}"/>
+                <a16:creationId xmlns:a16="http://schemas.microsoft.com/office/drawing/2014/main" id="{15115107-5DA3-4397-A1DA-67705DAE1EC2}"/>
               </a:ext>
             </a:extLst>
           </p:cNvPr>
@@ -20258,18 +20710,13 @@
           <a:lstStyle/>
           <a:p>
             <a:r>
-              <a:rPr lang="en-US" dirty="0" smtClean="0">
+              <a:rPr lang="en-US" dirty="0">
                 <a:solidFill>
                   <a:srgbClr val="FFFFFF"/>
                 </a:solidFill>
               </a:rPr>
               <a:t>Machine Learning &amp; Custom Modeling</a:t>
             </a:r>
-            <a:endParaRPr lang="en-US" dirty="0">
-              <a:solidFill>
-                <a:srgbClr val="FFFFFF"/>
-              </a:solidFill>
-            </a:endParaRPr>
           </a:p>
         </p:txBody>
       </p:sp>
@@ -20283,7 +20730,7 @@
             <p:ph idx="1"/>
             <p:extLst>
               <p:ext uri="{D42A27DB-BD31-4B8C-83A1-F6EECF244321}">
-                <p14:modId xmlns:p14="http://schemas.microsoft.com/office/powerpoint/2010/main" val="4150720638"/>
+                <p14:modId xmlns:p14="http://schemas.microsoft.com/office/powerpoint/2010/main" val="2455058428"/>
               </p:ext>
             </p:extLst>
           </p:nvPr>
@@ -20308,17 +20755,10 @@
   <p:clrMapOvr>
     <a:masterClrMapping/>
   </p:clrMapOvr>
-  <p:timing>
-    <p:tnLst>
-      <p:par>
-        <p:cTn id="1" dur="indefinite" restart="never" nodeType="tmRoot"/>
-      </p:par>
-    </p:tnLst>
-  </p:timing>
 </p:sld>
 </file>
 
-<file path=ppt/slides/slide7.xml><?xml version="1.0" encoding="utf-8"?>
+<file path=ppt/slides/slide8.xml><?xml version="1.0" encoding="utf-8"?>
 <p:sld xmlns:a="http://schemas.openxmlformats.org/drawingml/2006/main" xmlns:r="http://schemas.openxmlformats.org/officeDocument/2006/relationships" xmlns:p="http://schemas.openxmlformats.org/presentationml/2006/main">
   <p:cSld>
     <p:spTree>
@@ -20351,10 +20791,9 @@
           <a:lstStyle/>
           <a:p>
             <a:r>
-              <a:rPr lang="en-US" dirty="0" smtClean="0"/>
+              <a:rPr lang="en-US" dirty="0"/>
               <a:t>Demo</a:t>
             </a:r>
-            <a:endParaRPr lang="en-US" dirty="0"/>
           </a:p>
         </p:txBody>
       </p:sp>
@@ -20382,18 +20821,17 @@
           <a:p>
             <a:pPr algn="ctr"/>
             <a:r>
-              <a:rPr lang="en-US" sz="1800" dirty="0" smtClean="0"/>
+              <a:rPr lang="en-US" sz="1800" dirty="0"/>
               <a:t>Please pardon the interruption as we transition to the </a:t>
             </a:r>
             <a:r>
-              <a:rPr lang="en-US" sz="1800" smtClean="0"/>
+              <a:rPr lang="en-US" sz="1800"/>
               <a:t>live Mega </a:t>
             </a:r>
             <a:r>
-              <a:rPr lang="en-US" sz="1800" dirty="0" smtClean="0"/>
+              <a:rPr lang="en-US" sz="1800" dirty="0"/>
               <a:t>Shark Trading Strategy Evaluator</a:t>
             </a:r>
-            <a:endParaRPr lang="en-US" sz="1800" dirty="0"/>
           </a:p>
         </p:txBody>
       </p:sp>
@@ -20407,17 +20845,10 @@
   <p:clrMapOvr>
     <a:masterClrMapping/>
   </p:clrMapOvr>
-  <p:timing>
-    <p:tnLst>
-      <p:par>
-        <p:cTn id="1" dur="indefinite" restart="never" nodeType="tmRoot"/>
-      </p:par>
-    </p:tnLst>
-  </p:timing>
 </p:sld>
 </file>
 
-<file path=ppt/slides/slide8.xml><?xml version="1.0" encoding="utf-8"?>
+<file path=ppt/slides/slide9.xml><?xml version="1.0" encoding="utf-8"?>
 <p:sld xmlns:a="http://schemas.openxmlformats.org/drawingml/2006/main" xmlns:r="http://schemas.openxmlformats.org/officeDocument/2006/relationships" xmlns:p="http://schemas.openxmlformats.org/presentationml/2006/main">
   <p:cSld>
     <p:bg>
@@ -20450,7 +20881,7 @@
           <p:cNvPr id="2" name="Title 1">
             <a:extLst>
               <a:ext uri="{FF2B5EF4-FFF2-40B4-BE49-F238E27FC236}">
-                <a16:creationId xmlns:a16="http://schemas.microsoft.com/office/drawing/2014/main" xmlns="" id="{51F70220-677A-411B-B416-94321A555329}"/>
+                <a16:creationId xmlns:a16="http://schemas.microsoft.com/office/drawing/2014/main" id="{51F70220-677A-411B-B416-94321A555329}"/>
               </a:ext>
             </a:extLst>
           </p:cNvPr>
@@ -20503,7 +20934,7 @@
           <p:cNvPr id="4" name="Picture 3" descr="Hand with pen pointing at financial numbers">
             <a:extLst>
               <a:ext uri="{FF2B5EF4-FFF2-40B4-BE49-F238E27FC236}">
-                <a16:creationId xmlns:a16="http://schemas.microsoft.com/office/drawing/2014/main" xmlns="" id="{AB2E0BE0-B684-4228-A4DF-58C8CAFFDF47}"/>
+                <a16:creationId xmlns:a16="http://schemas.microsoft.com/office/drawing/2014/main" id="{AB2E0BE0-B684-4228-A4DF-58C8CAFFDF47}"/>
               </a:ext>
             </a:extLst>
           </p:cNvPr>
@@ -20538,7 +20969,7 @@
           <p:cNvPr id="3" name="Content Placeholder 2">
             <a:extLst>
               <a:ext uri="{FF2B5EF4-FFF2-40B4-BE49-F238E27FC236}">
-                <a16:creationId xmlns:a16="http://schemas.microsoft.com/office/drawing/2014/main" xmlns="" id="{667D1328-A694-4327-A93A-3D919FD65B27}"/>
+                <a16:creationId xmlns:a16="http://schemas.microsoft.com/office/drawing/2014/main" id="{667D1328-A694-4327-A93A-3D919FD65B27}"/>
               </a:ext>
             </a:extLst>
           </p:cNvPr>
@@ -20563,7 +20994,7 @@
               <a:buNone/>
             </a:pPr>
             <a:r>
-              <a:rPr lang="en-US" u="sng" dirty="0" smtClean="0">
+              <a:rPr lang="en-US" u="sng" dirty="0">
                 <a:solidFill>
                   <a:schemeClr val="bg1"/>
                 </a:solidFill>
@@ -20573,7 +21004,7 @@
           </a:p>
           <a:p>
             <a:r>
-              <a:rPr lang="en-US" dirty="0" smtClean="0">
+              <a:rPr lang="en-US" dirty="0">
                 <a:solidFill>
                   <a:schemeClr val="bg1"/>
                 </a:solidFill>
@@ -20581,7 +21012,7 @@
               <a:t>Emmanuel George: </a:t>
             </a:r>
             <a:r>
-              <a:rPr lang="en-US" dirty="0" smtClean="0">
+              <a:rPr lang="en-US" dirty="0">
                 <a:solidFill>
                   <a:srgbClr val="00B0F0"/>
                 </a:solidFill>
@@ -20591,7 +21022,7 @@
           </a:p>
           <a:p>
             <a:r>
-              <a:rPr lang="en-US" dirty="0" smtClean="0">
+              <a:rPr lang="en-US" dirty="0">
                 <a:solidFill>
                   <a:schemeClr val="bg1"/>
                 </a:solidFill>
@@ -20599,7 +21030,7 @@
               <a:t>Jacob Rougeau: </a:t>
             </a:r>
             <a:r>
-              <a:rPr lang="en-US" dirty="0" smtClean="0">
+              <a:rPr lang="en-US" dirty="0">
                 <a:solidFill>
                   <a:schemeClr val="accent1"/>
                 </a:solidFill>
@@ -20609,41 +21040,7 @@
           </a:p>
           <a:p>
             <a:r>
-              <a:rPr lang="en-US" dirty="0" smtClean="0">
-                <a:solidFill>
-                  <a:schemeClr val="bg1"/>
-                </a:solidFill>
-              </a:rPr>
-              <a:t>Tony </a:t>
-            </a:r>
-            <a:r>
-              <a:rPr lang="en-US" dirty="0" err="1" smtClean="0">
-                <a:solidFill>
-                  <a:schemeClr val="bg1"/>
-                </a:solidFill>
-              </a:rPr>
-              <a:t>Landero</a:t>
-            </a:r>
-            <a:r>
-              <a:rPr lang="en-US" dirty="0" smtClean="0">
-                <a:solidFill>
-                  <a:schemeClr val="bg1"/>
-                </a:solidFill>
-              </a:rPr>
-              <a:t>: </a:t>
-            </a:r>
-            <a:r>
-              <a:rPr lang="en-US" dirty="0" smtClean="0">
-                <a:solidFill>
-                  <a:srgbClr val="92D050"/>
-                </a:solidFill>
-              </a:rPr>
-              <a:t>Lead Data Scientist</a:t>
-            </a:r>
-          </a:p>
-          <a:p>
-            <a:r>
-              <a:rPr lang="en-US" dirty="0" smtClean="0">
+              <a:rPr lang="en-US" dirty="0">
                 <a:solidFill>
                   <a:schemeClr val="bg1"/>
                 </a:solidFill>
@@ -20651,18 +21048,31 @@
               <a:t>Quentin Reynolds: </a:t>
             </a:r>
             <a:r>
-              <a:rPr lang="en-US" dirty="0" smtClean="0">
+              <a:rPr lang="en-US" dirty="0">
                 <a:solidFill>
                   <a:srgbClr val="C00000"/>
                 </a:solidFill>
               </a:rPr>
               <a:t>Lead Innovation Analyst</a:t>
             </a:r>
-            <a:endParaRPr lang="en-US" dirty="0">
-              <a:solidFill>
-                <a:srgbClr val="C00000"/>
-              </a:solidFill>
-            </a:endParaRPr>
+          </a:p>
+          <a:p>
+            <a:r>
+              <a:rPr lang="en-US" dirty="0">
+                <a:solidFill>
+                  <a:schemeClr val="bg1"/>
+                </a:solidFill>
+              </a:rPr>
+              <a:t>Tony Landero: </a:t>
+            </a:r>
+            <a:r>
+              <a:rPr lang="en-US" dirty="0">
+                <a:solidFill>
+                  <a:srgbClr val="92D050"/>
+                </a:solidFill>
+              </a:rPr>
+              <a:t>Lead Data Scientist</a:t>
+            </a:r>
           </a:p>
           <a:p>
             <a:endParaRPr lang="en-US" dirty="0">
@@ -20683,13 +21093,6 @@
   <p:clrMapOvr>
     <a:masterClrMapping/>
   </p:clrMapOvr>
-  <p:timing>
-    <p:tnLst>
-      <p:par>
-        <p:cTn id="1" dur="indefinite" restart="never" nodeType="tmRoot"/>
-      </p:par>
-    </p:tnLst>
-  </p:timing>
 </p:sld>
 </file>
 
@@ -21553,15 +21956,6 @@
 </file>
 
 <file path=customXml/item2.xml><?xml version="1.0" encoding="utf-8"?>
-<?mso-contentType ?>
-<FormTemplates xmlns="http://schemas.microsoft.com/sharepoint/v3/contenttype/forms">
-  <Display>DocumentLibraryForm</Display>
-  <Edit>DocumentLibraryForm</Edit>
-  <New>DocumentLibraryForm</New>
-</FormTemplates>
-</file>
-
-<file path=customXml/item3.xml><?xml version="1.0" encoding="utf-8"?>
 <ct:contentTypeSchema xmlns:ct="http://schemas.microsoft.com/office/2006/metadata/contentType" xmlns:ma="http://schemas.microsoft.com/office/2006/metadata/properties/metaAttributes" ct:_="" ma:_="" ma:contentTypeName="Document" ma:contentTypeID="0x01010079F111ED35F8CC479449609E8A0923A6" ma:contentTypeVersion="12" ma:contentTypeDescription="Create a new document." ma:contentTypeScope="" ma:versionID="b385d60f68dd989dca1fdc827799d853">
   <xsd:schema xmlns:xsd="http://www.w3.org/2001/XMLSchema" xmlns:xs="http://www.w3.org/2001/XMLSchema" xmlns:p="http://schemas.microsoft.com/office/2006/metadata/properties" xmlns:ns2="71af3243-3dd4-4a8d-8c0d-dd76da1f02a5" xmlns:ns3="16c05727-aa75-4e4a-9b5f-8a80a1165891" targetNamespace="http://schemas.microsoft.com/office/2006/metadata/properties" ma:root="true" ma:fieldsID="1911b479caf7b199da365455750e4572" ns2:_="" ns3:_="">
     <xsd:import namespace="71af3243-3dd4-4a8d-8c0d-dd76da1f02a5"/>
@@ -21782,6 +22176,15 @@
 </ct:contentTypeSchema>
 </file>
 
+<file path=customXml/item3.xml><?xml version="1.0" encoding="utf-8"?>
+<?mso-contentType ?>
+<FormTemplates xmlns="http://schemas.microsoft.com/sharepoint/v3/contenttype/forms">
+  <Display>DocumentLibraryForm</Display>
+  <Edit>DocumentLibraryForm</Edit>
+  <New>DocumentLibraryForm</New>
+</FormTemplates>
+</file>
+
 <file path=customXml/itemProps1.xml><?xml version="1.0" encoding="utf-8"?>
 <ds:datastoreItem xmlns:ds="http://schemas.openxmlformats.org/officeDocument/2006/customXml" ds:itemID="{69E38AEF-4E2D-4D00-9707-4356DDB77317}">
   <ds:schemaRefs>
@@ -21800,14 +22203,6 @@
 </file>
 
 <file path=customXml/itemProps2.xml><?xml version="1.0" encoding="utf-8"?>
-<ds:datastoreItem xmlns:ds="http://schemas.openxmlformats.org/officeDocument/2006/customXml" ds:itemID="{E7235C91-959C-45D9-B60A-005B894ACEE3}">
-  <ds:schemaRefs>
-    <ds:schemaRef ds:uri="http://schemas.microsoft.com/sharepoint/v3/contenttype/forms"/>
-  </ds:schemaRefs>
-</ds:datastoreItem>
-</file>
-
-<file path=customXml/itemProps3.xml><?xml version="1.0" encoding="utf-8"?>
 <ds:datastoreItem xmlns:ds="http://schemas.openxmlformats.org/officeDocument/2006/customXml" ds:itemID="{1EF06AFC-006B-4BB6-8B59-5A9E1B0534F1}">
   <ds:schemaRefs>
     <ds:schemaRef ds:uri="http://schemas.microsoft.com/office/2006/metadata/contentType"/>
@@ -21824,4 +22219,12 @@
     <ds:schemaRef ds:uri="http://schemas.microsoft.com/internal/obd"/>
   </ds:schemaRefs>
 </ds:datastoreItem>
+</file>
+
+<file path=customXml/itemProps3.xml><?xml version="1.0" encoding="utf-8"?>
+<ds:datastoreItem xmlns:ds="http://schemas.openxmlformats.org/officeDocument/2006/customXml" ds:itemID="{E7235C91-959C-45D9-B60A-005B894ACEE3}">
+  <ds:schemaRefs>
+    <ds:schemaRef ds:uri="http://schemas.microsoft.com/sharepoint/v3/contenttype/forms"/>
+  </ds:schemaRefs>
+</ds:datastoreItem>
 </file>
</xml_diff>

<commit_message>
add hyperlink to presentation
</commit_message>
<xml_diff>
--- a/presentation/mega_sharks_trading_evaluator.pptx
+++ b/presentation/mega_sharks_trading_evaluator.pptx
@@ -132,7 +132,7 @@
 <file path=ppt/revisionInfo.xml><?xml version="1.0" encoding="utf-8"?>
 <p1510:revInfo xmlns:a="http://schemas.openxmlformats.org/drawingml/2006/main" xmlns:r="http://schemas.openxmlformats.org/officeDocument/2006/relationships" xmlns:p1510="http://schemas.microsoft.com/office/powerpoint/2015/10/main">
   <p1510:revLst>
-    <p1510:client id="{E14E42F7-53AE-4D53-881E-6126CD0D7AFF}" v="539" dt="2022-01-12T02:25:23.358"/>
+    <p1510:client id="{E14E42F7-53AE-4D53-881E-6126CD0D7AFF}" v="544" dt="2022-01-12T02:59:18.296"/>
   </p1510:revLst>
 </p1510:revInfo>
 </file>
@@ -15379,6 +15379,266 @@
           <a:bodyPr/>
           <a:lstStyle/>
           <a:p>
+            <a:pPr marL="0" algn="l" rtl="0" eaLnBrk="1" fontAlgn="t" latinLnBrk="0" hangingPunct="1">
+              <a:spcBef>
+                <a:spcPts val="0"/>
+              </a:spcBef>
+              <a:spcAft>
+                <a:spcPts val="0"/>
+              </a:spcAft>
+            </a:pPr>
+            <a:r>
+              <a:rPr lang="en-US" dirty="0"/>
+              <a:t>Presenters:</a:t>
+            </a:r>
+            <a:endParaRPr lang="en-US" sz="1800" b="0" i="0" u="none" strike="noStrike" dirty="0">
+              <a:effectLst/>
+              <a:latin typeface="Arial" panose="020B0604020202020204" pitchFamily="34" charset="0"/>
+            </a:endParaRPr>
+          </a:p>
+          <a:p>
+            <a:pPr marL="0" algn="l" rtl="0" eaLnBrk="1" fontAlgn="t" latinLnBrk="0" hangingPunct="1">
+              <a:spcBef>
+                <a:spcPts val="0"/>
+              </a:spcBef>
+              <a:spcAft>
+                <a:spcPts val="0"/>
+              </a:spcAft>
+            </a:pPr>
+            <a:r>
+              <a:rPr lang="en-US" sz="1800" b="0" i="0" u="none" strike="noStrike" kern="1200" dirty="0">
+                <a:solidFill>
+                  <a:srgbClr val="000000"/>
+                </a:solidFill>
+                <a:effectLst/>
+                <a:latin typeface="Gill Sans MT" panose="020B0502020104020203" pitchFamily="34" charset="0"/>
+              </a:rPr>
+              <a:t>Slides 1-7 </a:t>
+            </a:r>
+          </a:p>
+          <a:p>
+            <a:pPr marL="0" algn="l" rtl="0" eaLnBrk="1" fontAlgn="t" latinLnBrk="0" hangingPunct="1">
+              <a:spcBef>
+                <a:spcPts val="0"/>
+              </a:spcBef>
+              <a:spcAft>
+                <a:spcPts val="0"/>
+              </a:spcAft>
+            </a:pPr>
+            <a:r>
+              <a:rPr lang="en-US" sz="1800" b="0" i="0" u="none" strike="noStrike" kern="1200" dirty="0">
+                <a:solidFill>
+                  <a:srgbClr val="000000"/>
+                </a:solidFill>
+                <a:effectLst/>
+                <a:latin typeface="Gill Sans MT" panose="020B0502020104020203" pitchFamily="34" charset="0"/>
+              </a:rPr>
+              <a:t>Project Roadmap </a:t>
+            </a:r>
+          </a:p>
+          <a:p>
+            <a:pPr marL="0" algn="l" rtl="0" eaLnBrk="1" fontAlgn="t" latinLnBrk="0" hangingPunct="1">
+              <a:spcBef>
+                <a:spcPts val="0"/>
+              </a:spcBef>
+              <a:spcAft>
+                <a:spcPts val="0"/>
+              </a:spcAft>
+            </a:pPr>
+            <a:r>
+              <a:rPr lang="en-US" sz="1800" b="0" i="0" u="none" strike="noStrike" kern="1200" dirty="0">
+                <a:solidFill>
+                  <a:srgbClr val="000000"/>
+                </a:solidFill>
+                <a:effectLst/>
+                <a:latin typeface="Gill Sans MT" panose="020B0502020104020203" pitchFamily="34" charset="0"/>
+              </a:rPr>
+              <a:t>Data Preparation</a:t>
+            </a:r>
+            <a:endParaRPr lang="en-US" sz="1800" b="0" i="0" u="none" strike="noStrike" dirty="0">
+              <a:effectLst/>
+              <a:latin typeface="Arial" panose="020B0604020202020204" pitchFamily="34" charset="0"/>
+            </a:endParaRPr>
+          </a:p>
+          <a:p>
+            <a:pPr marL="0" algn="l" rtl="0" eaLnBrk="1" fontAlgn="t" latinLnBrk="0" hangingPunct="1">
+              <a:spcBef>
+                <a:spcPts val="0"/>
+              </a:spcBef>
+              <a:spcAft>
+                <a:spcPts val="0"/>
+              </a:spcAft>
+            </a:pPr>
+            <a:r>
+              <a:rPr lang="en-US" sz="1800" b="0" i="0" u="none" strike="noStrike" kern="1200" dirty="0">
+                <a:solidFill>
+                  <a:srgbClr val="000000"/>
+                </a:solidFill>
+                <a:effectLst/>
+                <a:latin typeface="Gill Sans MT" panose="020B0502020104020203" pitchFamily="34" charset="0"/>
+              </a:rPr>
+              <a:t>Machine</a:t>
+            </a:r>
+            <a:r>
+              <a:rPr lang="en-US" sz="1800" b="0" i="0" u="none" strike="noStrike" kern="1200" baseline="0" dirty="0">
+                <a:solidFill>
+                  <a:srgbClr val="000000"/>
+                </a:solidFill>
+                <a:effectLst/>
+                <a:latin typeface="Gill Sans MT" panose="020B0502020104020203" pitchFamily="34" charset="0"/>
+              </a:rPr>
+              <a:t> Learning technology employed</a:t>
+            </a:r>
+          </a:p>
+          <a:p>
+            <a:pPr marL="0" algn="l" rtl="0" eaLnBrk="1" fontAlgn="t" latinLnBrk="0" hangingPunct="1">
+              <a:spcBef>
+                <a:spcPts val="0"/>
+              </a:spcBef>
+              <a:spcAft>
+                <a:spcPts val="0"/>
+              </a:spcAft>
+            </a:pPr>
+            <a:r>
+              <a:rPr lang="en-US" sz="1800" b="0" i="0" u="none" strike="noStrike" dirty="0">
+                <a:effectLst/>
+                <a:latin typeface="Arial" panose="020B0604020202020204" pitchFamily="34" charset="0"/>
+              </a:rPr>
+              <a:t>Slide  8</a:t>
+            </a:r>
+          </a:p>
+          <a:p>
+            <a:pPr marL="0" algn="l" rtl="0" eaLnBrk="1" fontAlgn="t" latinLnBrk="0" hangingPunct="1">
+              <a:spcBef>
+                <a:spcPts val="0"/>
+              </a:spcBef>
+              <a:spcAft>
+                <a:spcPts val="0"/>
+              </a:spcAft>
+            </a:pPr>
+            <a:r>
+              <a:rPr lang="en-US" sz="1800" b="0" i="0" u="none" strike="noStrike" kern="1200" dirty="0">
+                <a:solidFill>
+                  <a:srgbClr val="000000"/>
+                </a:solidFill>
+                <a:effectLst/>
+                <a:latin typeface="Gill Sans MT" panose="020B0502020104020203" pitchFamily="34" charset="0"/>
+              </a:rPr>
+              <a:t>Live Demo: Meg</a:t>
+            </a:r>
+            <a:r>
+              <a:rPr lang="en-US" sz="1800" b="0" i="0" u="none" strike="noStrike" kern="1200" baseline="0" dirty="0">
+                <a:solidFill>
+                  <a:srgbClr val="000000"/>
+                </a:solidFill>
+                <a:effectLst/>
+                <a:latin typeface="Gill Sans MT" panose="020B0502020104020203" pitchFamily="34" charset="0"/>
+              </a:rPr>
+              <a:t>a Sharks Trading Strategy Evaluator</a:t>
+            </a:r>
+          </a:p>
+          <a:p>
+            <a:pPr marL="0" algn="l" rtl="0" eaLnBrk="1" fontAlgn="t" latinLnBrk="0" hangingPunct="1">
+              <a:spcBef>
+                <a:spcPts val="0"/>
+              </a:spcBef>
+              <a:spcAft>
+                <a:spcPts val="0"/>
+              </a:spcAft>
+            </a:pPr>
+            <a:r>
+              <a:rPr lang="en-US" sz="1800" b="0" i="0" u="none" strike="noStrike" dirty="0">
+                <a:effectLst/>
+                <a:latin typeface="Arial" panose="020B0604020202020204" pitchFamily="34" charset="0"/>
+              </a:rPr>
+              <a:t> - </a:t>
+            </a:r>
+          </a:p>
+          <a:p>
+            <a:endParaRPr lang="en-US" dirty="0"/>
+          </a:p>
+        </p:txBody>
+      </p:sp>
+      <p:sp>
+        <p:nvSpPr>
+          <p:cNvPr id="4" name="Slide Number Placeholder 3"/>
+          <p:cNvSpPr>
+            <a:spLocks noGrp="1"/>
+          </p:cNvSpPr>
+          <p:nvPr>
+            <p:ph type="sldNum" sz="quarter" idx="5"/>
+          </p:nvPr>
+        </p:nvSpPr>
+        <p:spPr/>
+        <p:txBody>
+          <a:bodyPr/>
+          <a:lstStyle/>
+          <a:p>
+            <a:fld id="{CFED664B-377C-4B68-AF4E-EBDA643118DF}" type="slidenum">
+              <a:rPr lang="en-US" smtClean="0"/>
+              <a:t>4</a:t>
+            </a:fld>
+            <a:endParaRPr lang="en-US" dirty="0"/>
+          </a:p>
+        </p:txBody>
+      </p:sp>
+    </p:spTree>
+    <p:extLst>
+      <p:ext uri="{BB962C8B-B14F-4D97-AF65-F5344CB8AC3E}">
+        <p14:creationId xmlns:p14="http://schemas.microsoft.com/office/powerpoint/2010/main" val="3649832466"/>
+      </p:ext>
+    </p:extLst>
+  </p:cSld>
+  <p:clrMapOvr>
+    <a:masterClrMapping/>
+  </p:clrMapOvr>
+</p:notes>
+</file>
+
+<file path=ppt/notesSlides/notesSlide4.xml><?xml version="1.0" encoding="utf-8"?>
+<p:notes xmlns:a="http://schemas.openxmlformats.org/drawingml/2006/main" xmlns:r="http://schemas.openxmlformats.org/officeDocument/2006/relationships" xmlns:p="http://schemas.openxmlformats.org/presentationml/2006/main">
+  <p:cSld>
+    <p:spTree>
+      <p:nvGrpSpPr>
+        <p:cNvPr id="1" name=""/>
+        <p:cNvGrpSpPr/>
+        <p:nvPr/>
+      </p:nvGrpSpPr>
+      <p:grpSpPr>
+        <a:xfrm>
+          <a:off x="0" y="0"/>
+          <a:ext cx="0" cy="0"/>
+          <a:chOff x="0" y="0"/>
+          <a:chExt cx="0" cy="0"/>
+        </a:xfrm>
+      </p:grpSpPr>
+      <p:sp>
+        <p:nvSpPr>
+          <p:cNvPr id="2" name="Slide Image Placeholder 1"/>
+          <p:cNvSpPr>
+            <a:spLocks noGrp="1" noRot="1" noChangeAspect="1"/>
+          </p:cNvSpPr>
+          <p:nvPr>
+            <p:ph type="sldImg"/>
+          </p:nvPr>
+        </p:nvSpPr>
+        <p:spPr/>
+      </p:sp>
+      <p:sp>
+        <p:nvSpPr>
+          <p:cNvPr id="3" name="Notes Placeholder 2"/>
+          <p:cNvSpPr>
+            <a:spLocks noGrp="1"/>
+          </p:cNvSpPr>
+          <p:nvPr>
+            <p:ph type="body" idx="1"/>
+          </p:nvPr>
+        </p:nvSpPr>
+        <p:spPr/>
+        <p:txBody>
+          <a:bodyPr/>
+          <a:lstStyle/>
+          <a:p>
             <a:endParaRPr lang="en-US" dirty="0"/>
           </a:p>
         </p:txBody>
@@ -15419,7 +15679,7 @@
 </p:notes>
 </file>
 
-<file path=ppt/notesSlides/notesSlide4.xml><?xml version="1.0" encoding="utf-8"?>
+<file path=ppt/notesSlides/notesSlide5.xml><?xml version="1.0" encoding="utf-8"?>
 <p:notes xmlns:a="http://schemas.openxmlformats.org/drawingml/2006/main" xmlns:r="http://schemas.openxmlformats.org/officeDocument/2006/relationships" xmlns:p="http://schemas.openxmlformats.org/presentationml/2006/main">
   <p:cSld>
     <p:spTree>
@@ -15503,7 +15763,7 @@
 </p:notes>
 </file>
 
-<file path=ppt/notesSlides/notesSlide5.xml><?xml version="1.0" encoding="utf-8"?>
+<file path=ppt/notesSlides/notesSlide6.xml><?xml version="1.0" encoding="utf-8"?>
 <p:notes xmlns:a="http://schemas.openxmlformats.org/drawingml/2006/main" xmlns:r="http://schemas.openxmlformats.org/officeDocument/2006/relationships" xmlns:p="http://schemas.openxmlformats.org/presentationml/2006/main">
   <p:cSld>
     <p:spTree>
@@ -15587,7 +15847,91 @@
 </p:notes>
 </file>
 
-<file path=ppt/notesSlides/notesSlide6.xml><?xml version="1.0" encoding="utf-8"?>
+<file path=ppt/notesSlides/notesSlide7.xml><?xml version="1.0" encoding="utf-8"?>
+<p:notes xmlns:a="http://schemas.openxmlformats.org/drawingml/2006/main" xmlns:r="http://schemas.openxmlformats.org/officeDocument/2006/relationships" xmlns:p="http://schemas.openxmlformats.org/presentationml/2006/main">
+  <p:cSld>
+    <p:spTree>
+      <p:nvGrpSpPr>
+        <p:cNvPr id="1" name=""/>
+        <p:cNvGrpSpPr/>
+        <p:nvPr/>
+      </p:nvGrpSpPr>
+      <p:grpSpPr>
+        <a:xfrm>
+          <a:off x="0" y="0"/>
+          <a:ext cx="0" cy="0"/>
+          <a:chOff x="0" y="0"/>
+          <a:chExt cx="0" cy="0"/>
+        </a:xfrm>
+      </p:grpSpPr>
+      <p:sp>
+        <p:nvSpPr>
+          <p:cNvPr id="2" name="Slide Image Placeholder 1"/>
+          <p:cNvSpPr>
+            <a:spLocks noGrp="1" noRot="1" noChangeAspect="1"/>
+          </p:cNvSpPr>
+          <p:nvPr>
+            <p:ph type="sldImg"/>
+          </p:nvPr>
+        </p:nvSpPr>
+        <p:spPr/>
+      </p:sp>
+      <p:sp>
+        <p:nvSpPr>
+          <p:cNvPr id="3" name="Notes Placeholder 2"/>
+          <p:cNvSpPr>
+            <a:spLocks noGrp="1"/>
+          </p:cNvSpPr>
+          <p:nvPr>
+            <p:ph type="body" idx="1"/>
+          </p:nvPr>
+        </p:nvSpPr>
+        <p:spPr/>
+        <p:txBody>
+          <a:bodyPr/>
+          <a:lstStyle/>
+          <a:p>
+            <a:endParaRPr lang="en-US" dirty="0"/>
+          </a:p>
+        </p:txBody>
+      </p:sp>
+      <p:sp>
+        <p:nvSpPr>
+          <p:cNvPr id="4" name="Slide Number Placeholder 3"/>
+          <p:cNvSpPr>
+            <a:spLocks noGrp="1"/>
+          </p:cNvSpPr>
+          <p:nvPr>
+            <p:ph type="sldNum" sz="quarter" idx="5"/>
+          </p:nvPr>
+        </p:nvSpPr>
+        <p:spPr/>
+        <p:txBody>
+          <a:bodyPr/>
+          <a:lstStyle/>
+          <a:p>
+            <a:fld id="{CFED664B-377C-4B68-AF4E-EBDA643118DF}" type="slidenum">
+              <a:rPr lang="en-US" smtClean="0"/>
+              <a:t>8</a:t>
+            </a:fld>
+            <a:endParaRPr lang="en-US" dirty="0"/>
+          </a:p>
+        </p:txBody>
+      </p:sp>
+    </p:spTree>
+    <p:extLst>
+      <p:ext uri="{BB962C8B-B14F-4D97-AF65-F5344CB8AC3E}">
+        <p14:creationId xmlns:p14="http://schemas.microsoft.com/office/powerpoint/2010/main" val="1068441484"/>
+      </p:ext>
+    </p:extLst>
+  </p:cSld>
+  <p:clrMapOvr>
+    <a:masterClrMapping/>
+  </p:clrMapOvr>
+</p:notes>
+</file>
+
+<file path=ppt/notesSlides/notesSlide8.xml><?xml version="1.0" encoding="utf-8"?>
 <p:notes xmlns:a="http://schemas.openxmlformats.org/drawingml/2006/main" xmlns:r="http://schemas.openxmlformats.org/officeDocument/2006/relationships" xmlns:p="http://schemas.openxmlformats.org/presentationml/2006/main">
   <p:cSld>
     <p:spTree>
@@ -20787,13 +21131,24 @@
         </p:nvSpPr>
         <p:spPr/>
         <p:txBody>
-          <a:bodyPr/>
+          <a:bodyPr>
+            <a:normAutofit fontScale="90000"/>
+          </a:bodyPr>
           <a:lstStyle/>
           <a:p>
+            <a:br>
+              <a:rPr lang="en-US" cap="none" dirty="0"/>
+            </a:br>
             <a:r>
-              <a:rPr lang="en-US" dirty="0"/>
-              <a:t>Demo</a:t>
+              <a:rPr lang="en-US" cap="none" dirty="0" err="1">
+                <a:hlinkClick r:id="rId3"/>
+              </a:rPr>
+              <a:t>Streamlit</a:t>
             </a:r>
+            <a:br>
+              <a:rPr lang="en-US" cap="none" dirty="0"/>
+            </a:br>
+            <a:endParaRPr lang="en-US" cap="none" dirty="0"/>
           </a:p>
         </p:txBody>
       </p:sp>
@@ -21947,12 +22302,12 @@
 </file>
 
 <file path=customXml/item1.xml><?xml version="1.0" encoding="utf-8"?>
-<p:properties xmlns:p="http://schemas.microsoft.com/office/2006/metadata/properties" xmlns:xsi="http://www.w3.org/2001/XMLSchema-instance" xmlns:pc="http://schemas.microsoft.com/office/infopath/2007/PartnerControls">
-  <documentManagement>
-    <MediaServiceKeyPoints xmlns="71af3243-3dd4-4a8d-8c0d-dd76da1f02a5" xsi:nil="true"/>
-    <Status xmlns="71af3243-3dd4-4a8d-8c0d-dd76da1f02a5">Not started</Status>
-  </documentManagement>
-</p:properties>
+<?mso-contentType ?>
+<FormTemplates xmlns="http://schemas.microsoft.com/sharepoint/v3/contenttype/forms">
+  <Display>DocumentLibraryForm</Display>
+  <Edit>DocumentLibraryForm</Edit>
+  <New>DocumentLibraryForm</New>
+</FormTemplates>
 </file>
 
 <file path=customXml/item2.xml><?xml version="1.0" encoding="utf-8"?>
@@ -22177,27 +22532,18 @@
 </file>
 
 <file path=customXml/item3.xml><?xml version="1.0" encoding="utf-8"?>
-<?mso-contentType ?>
-<FormTemplates xmlns="http://schemas.microsoft.com/sharepoint/v3/contenttype/forms">
-  <Display>DocumentLibraryForm</Display>
-  <Edit>DocumentLibraryForm</Edit>
-  <New>DocumentLibraryForm</New>
-</FormTemplates>
+<p:properties xmlns:p="http://schemas.microsoft.com/office/2006/metadata/properties" xmlns:xsi="http://www.w3.org/2001/XMLSchema-instance" xmlns:pc="http://schemas.microsoft.com/office/infopath/2007/PartnerControls">
+  <documentManagement>
+    <MediaServiceKeyPoints xmlns="71af3243-3dd4-4a8d-8c0d-dd76da1f02a5" xsi:nil="true"/>
+    <Status xmlns="71af3243-3dd4-4a8d-8c0d-dd76da1f02a5">Not started</Status>
+  </documentManagement>
+</p:properties>
 </file>
 
 <file path=customXml/itemProps1.xml><?xml version="1.0" encoding="utf-8"?>
-<ds:datastoreItem xmlns:ds="http://schemas.openxmlformats.org/officeDocument/2006/customXml" ds:itemID="{69E38AEF-4E2D-4D00-9707-4356DDB77317}">
+<ds:datastoreItem xmlns:ds="http://schemas.openxmlformats.org/officeDocument/2006/customXml" ds:itemID="{E7235C91-959C-45D9-B60A-005B894ACEE3}">
   <ds:schemaRefs>
-    <ds:schemaRef ds:uri="http://schemas.microsoft.com/office/2006/documentManagement/types"/>
-    <ds:schemaRef ds:uri="http://purl.org/dc/terms/"/>
-    <ds:schemaRef ds:uri="http://schemas.microsoft.com/office/infopath/2007/PartnerControls"/>
-    <ds:schemaRef ds:uri="http://www.w3.org/XML/1998/namespace"/>
-    <ds:schemaRef ds:uri="http://purl.org/dc/elements/1.1/"/>
-    <ds:schemaRef ds:uri="16c05727-aa75-4e4a-9b5f-8a80a1165891"/>
-    <ds:schemaRef ds:uri="http://schemas.openxmlformats.org/package/2006/metadata/core-properties"/>
-    <ds:schemaRef ds:uri="71af3243-3dd4-4a8d-8c0d-dd76da1f02a5"/>
-    <ds:schemaRef ds:uri="http://schemas.microsoft.com/office/2006/metadata/properties"/>
-    <ds:schemaRef ds:uri="http://purl.org/dc/dcmitype/"/>
+    <ds:schemaRef ds:uri="http://schemas.microsoft.com/sharepoint/v3/contenttype/forms"/>
   </ds:schemaRefs>
 </ds:datastoreItem>
 </file>
@@ -22222,9 +22568,18 @@
 </file>
 
 <file path=customXml/itemProps3.xml><?xml version="1.0" encoding="utf-8"?>
-<ds:datastoreItem xmlns:ds="http://schemas.openxmlformats.org/officeDocument/2006/customXml" ds:itemID="{E7235C91-959C-45D9-B60A-005B894ACEE3}">
+<ds:datastoreItem xmlns:ds="http://schemas.openxmlformats.org/officeDocument/2006/customXml" ds:itemID="{69E38AEF-4E2D-4D00-9707-4356DDB77317}">
   <ds:schemaRefs>
-    <ds:schemaRef ds:uri="http://schemas.microsoft.com/sharepoint/v3/contenttype/forms"/>
+    <ds:schemaRef ds:uri="http://schemas.microsoft.com/office/2006/documentManagement/types"/>
+    <ds:schemaRef ds:uri="http://purl.org/dc/terms/"/>
+    <ds:schemaRef ds:uri="http://schemas.microsoft.com/office/infopath/2007/PartnerControls"/>
+    <ds:schemaRef ds:uri="http://www.w3.org/XML/1998/namespace"/>
+    <ds:schemaRef ds:uri="http://purl.org/dc/elements/1.1/"/>
+    <ds:schemaRef ds:uri="16c05727-aa75-4e4a-9b5f-8a80a1165891"/>
+    <ds:schemaRef ds:uri="http://schemas.openxmlformats.org/package/2006/metadata/core-properties"/>
+    <ds:schemaRef ds:uri="71af3243-3dd4-4a8d-8c0d-dd76da1f02a5"/>
+    <ds:schemaRef ds:uri="http://schemas.microsoft.com/office/2006/metadata/properties"/>
+    <ds:schemaRef ds:uri="http://purl.org/dc/dcmitype/"/>
   </ds:schemaRefs>
 </ds:datastoreItem>
 </file>
</xml_diff>